<commit_message>
Changed presentation  (waiting on Chris' results)
git-svn-id: file://localhost/tmp/svn2git/svn@2046 defb5e50-622e-49ec-a68e-d72c7db87b45
</commit_message>
<xml_diff>
--- a/papers/data_intensive/eScience09/RoyalSocietyPresentation.pptx
+++ b/papers/data_intensive/eScience09/RoyalSocietyPresentation.pptx
@@ -5,23 +5,26 @@
     <p:sldMasterId id="2147483660" r:id="rId1"/>
   </p:sldMasterIdLst>
   <p:notesMasterIdLst>
-    <p:notesMasterId r:id="rId16"/>
+    <p:notesMasterId r:id="rId19"/>
   </p:notesMasterIdLst>
   <p:sldIdLst>
     <p:sldId id="256" r:id="rId2"/>
-    <p:sldId id="258" r:id="rId3"/>
-    <p:sldId id="311" r:id="rId4"/>
-    <p:sldId id="312" r:id="rId5"/>
-    <p:sldId id="314" r:id="rId6"/>
-    <p:sldId id="313" r:id="rId7"/>
-    <p:sldId id="316" r:id="rId8"/>
+    <p:sldId id="321" r:id="rId3"/>
+    <p:sldId id="322" r:id="rId4"/>
+    <p:sldId id="258" r:id="rId5"/>
+    <p:sldId id="311" r:id="rId6"/>
+    <p:sldId id="312" r:id="rId7"/>
+    <p:sldId id="313" r:id="rId8"/>
     <p:sldId id="315" r:id="rId9"/>
     <p:sldId id="319" r:id="rId10"/>
-    <p:sldId id="317" r:id="rId11"/>
-    <p:sldId id="320" r:id="rId12"/>
-    <p:sldId id="321" r:id="rId13"/>
-    <p:sldId id="318" r:id="rId14"/>
-    <p:sldId id="310" r:id="rId15"/>
+    <p:sldId id="323" r:id="rId11"/>
+    <p:sldId id="316" r:id="rId12"/>
+    <p:sldId id="314" r:id="rId13"/>
+    <p:sldId id="317" r:id="rId14"/>
+    <p:sldId id="320" r:id="rId15"/>
+    <p:sldId id="318" r:id="rId16"/>
+    <p:sldId id="324" r:id="rId17"/>
+    <p:sldId id="310" r:id="rId18"/>
   </p:sldIdLst>
   <p:sldSz cx="9144000" cy="6858000" type="screen4x3"/>
   <p:notesSz cx="6858000" cy="9144000"/>
@@ -125,9 +128,7 @@
 
 <file path=ppt/charts/chart1.xml><?xml version="1.0" encoding="utf-8"?>
 <c:chartSpace xmlns:c="http://schemas.openxmlformats.org/drawingml/2006/chart" xmlns:a="http://schemas.openxmlformats.org/drawingml/2006/main" xmlns:r="http://schemas.openxmlformats.org/officeDocument/2006/relationships">
-  <c:date1904 val="1"/>
   <c:lang val="en-US"/>
-  <c:clrMapOvr bg1="lt1" tx1="dk1" bg2="lt2" tx2="dk2" accent1="accent1" accent2="accent2" accent3="accent3" accent4="accent4" accent5="accent5" accent6="accent6" hlink="hlink" folHlink="folHlink"/>
   <c:chart>
     <c:title>
       <c:tx>
@@ -139,26 +140,28 @@
               <a:defRPr/>
             </a:pPr>
             <a:r>
-              <a:rPr lang="en-US" dirty="0" err="1">
-                <a:latin typeface="Century Gothic" pitchFamily="34" charset="0"/>
-              </a:rPr>
-              <a:t>KosmosFS</a:t>
-            </a:r>
-            <a:r>
-              <a:rPr lang="en-US" baseline="0" dirty="0">
-                <a:latin typeface="Century Gothic" pitchFamily="34" charset="0"/>
-              </a:rPr>
-              <a:t> Distributed </a:t>
-            </a:r>
-            <a:r>
-              <a:rPr lang="en-US" baseline="0" dirty="0" err="1">
-                <a:latin typeface="Century Gothic" pitchFamily="34" charset="0"/>
-              </a:rPr>
-              <a:t>Filesystem</a:t>
-            </a:r>
-            <a:endParaRPr lang="en-US" dirty="0">
-              <a:latin typeface="Century Gothic" pitchFamily="34" charset="0"/>
-            </a:endParaRPr>
+              <a:rPr lang="en-US"/>
+              <a:t>Conventional</a:t>
+            </a:r>
+            <a:r>
+              <a:rPr lang="en-US" baseline="0"/>
+              <a:t> </a:t>
+            </a:r>
+            <a:r>
+              <a:rPr lang="en-US"/>
+              <a:t>Distributed</a:t>
+            </a:r>
+            <a:endParaRPr lang="en-US" baseline="0"/>
+          </a:p>
+          <a:p>
+            <a:pPr>
+              <a:defRPr/>
+            </a:pPr>
+            <a:r>
+              <a:rPr lang="en-US" baseline="0"/>
+              <a:t>with GridFTP</a:t>
+            </a:r>
+            <a:endParaRPr lang="en-US"/>
           </a:p>
         </c:rich>
       </c:tx>
@@ -172,28 +175,226 @@
           <c:idx val="0"/>
           <c:order val="0"/>
           <c:tx>
-            <c:v>1 Dataserver</c:v>
+            <c:v>Data on one server</c:v>
           </c:tx>
           <c:marker>
             <c:symbol val="none"/>
           </c:marker>
           <c:val>
             <c:numRef>
-              <c:f>Sheet1!$C$2:$C$5</c:f>
+              <c:f>Sheet3!$C$6:$C$9</c:f>
               <c:numCache>
                 <c:formatCode>General</c:formatCode>
                 <c:ptCount val="4"/>
                 <c:pt idx="0">
-                  <c:v>3.816599999999998</c:v>
+                  <c:v>400</c:v>
                 </c:pt>
                 <c:pt idx="1">
-                  <c:v>2.3665999999999987</c:v>
+                  <c:v>396</c:v>
                 </c:pt>
                 <c:pt idx="2">
-                  <c:v>2.2999999999999998</c:v>
+                  <c:v>322</c:v>
                 </c:pt>
                 <c:pt idx="3">
-                  <c:v>2.316599999999998</c:v>
+                  <c:v>325</c:v>
+                </c:pt>
+              </c:numCache>
+            </c:numRef>
+          </c:val>
+        </c:ser>
+        <c:ser>
+          <c:idx val="1"/>
+          <c:order val="1"/>
+          <c:tx>
+            <c:v>Data on remote machine</c:v>
+          </c:tx>
+          <c:marker>
+            <c:symbol val="none"/>
+          </c:marker>
+          <c:val>
+            <c:numRef>
+              <c:f>Sheet3!$C$13:$C$16</c:f>
+              <c:numCache>
+                <c:formatCode>General</c:formatCode>
+                <c:ptCount val="4"/>
+                <c:pt idx="0">
+                  <c:v>7360</c:v>
+                </c:pt>
+                <c:pt idx="1">
+                  <c:v>3680</c:v>
+                </c:pt>
+                <c:pt idx="2">
+                  <c:v>1840</c:v>
+                </c:pt>
+                <c:pt idx="3">
+                  <c:v>989</c:v>
+                </c:pt>
+              </c:numCache>
+            </c:numRef>
+          </c:val>
+        </c:ser>
+        <c:ser>
+          <c:idx val="2"/>
+          <c:order val="2"/>
+          <c:tx>
+            <c:v>Data on both machines</c:v>
+          </c:tx>
+          <c:marker>
+            <c:symbol val="none"/>
+          </c:marker>
+          <c:val>
+            <c:numRef>
+              <c:f>Sheet3!$C$19:$C$22</c:f>
+              <c:numCache>
+                <c:formatCode>General</c:formatCode>
+                <c:ptCount val="4"/>
+                <c:pt idx="1">
+                  <c:v>1254.4270000000001</c:v>
+                </c:pt>
+                <c:pt idx="2">
+                  <c:v>680.45199999999988</c:v>
+                </c:pt>
+                <c:pt idx="3">
+                  <c:v>386.74700000000001</c:v>
+                </c:pt>
+              </c:numCache>
+            </c:numRef>
+          </c:val>
+        </c:ser>
+        <c:marker val="1"/>
+        <c:axId val="64211200"/>
+        <c:axId val="64221568"/>
+      </c:lineChart>
+      <c:catAx>
+        <c:axId val="64211200"/>
+        <c:scaling>
+          <c:orientation val="minMax"/>
+        </c:scaling>
+        <c:axPos val="b"/>
+        <c:title>
+          <c:tx>
+            <c:rich>
+              <a:bodyPr/>
+              <a:lstStyle/>
+              <a:p>
+                <a:pPr>
+                  <a:defRPr/>
+                </a:pPr>
+                <a:r>
+                  <a:rPr lang="en-US"/>
+                  <a:t>Number of Workers</a:t>
+                </a:r>
+              </a:p>
+            </c:rich>
+          </c:tx>
+          <c:layout/>
+        </c:title>
+        <c:tickLblPos val="nextTo"/>
+        <c:crossAx val="64221568"/>
+        <c:crosses val="autoZero"/>
+        <c:auto val="1"/>
+        <c:lblAlgn val="ctr"/>
+        <c:lblOffset val="100"/>
+      </c:catAx>
+      <c:valAx>
+        <c:axId val="64221568"/>
+        <c:scaling>
+          <c:orientation val="minMax"/>
+        </c:scaling>
+        <c:axPos val="l"/>
+        <c:majorGridlines/>
+        <c:title>
+          <c:tx>
+            <c:rich>
+              <a:bodyPr rot="-5400000" vert="horz"/>
+              <a:lstStyle/>
+              <a:p>
+                <a:pPr>
+                  <a:defRPr/>
+                </a:pPr>
+                <a:r>
+                  <a:rPr lang="en-US"/>
+                  <a:t>Time (seconds)</a:t>
+                </a:r>
+              </a:p>
+            </c:rich>
+          </c:tx>
+          <c:layout/>
+        </c:title>
+        <c:numFmt formatCode="General" sourceLinked="1"/>
+        <c:tickLblPos val="nextTo"/>
+        <c:crossAx val="64211200"/>
+        <c:crosses val="autoZero"/>
+        <c:crossBetween val="between"/>
+      </c:valAx>
+    </c:plotArea>
+    <c:legend>
+      <c:legendPos val="r"/>
+      <c:layout/>
+    </c:legend>
+    <c:plotVisOnly val="1"/>
+  </c:chart>
+  <c:externalData r:id="rId1"/>
+</c:chartSpace>
+</file>
+
+<file path=ppt/charts/chart2.xml><?xml version="1.0" encoding="utf-8"?>
+<c:chartSpace xmlns:c="http://schemas.openxmlformats.org/drawingml/2006/chart" xmlns:a="http://schemas.openxmlformats.org/drawingml/2006/main" xmlns:r="http://schemas.openxmlformats.org/officeDocument/2006/relationships">
+  <c:lang val="en-US"/>
+  <c:chart>
+    <c:title>
+      <c:tx>
+        <c:rich>
+          <a:bodyPr/>
+          <a:lstStyle/>
+          <a:p>
+            <a:pPr>
+              <a:defRPr/>
+            </a:pPr>
+            <a:r>
+              <a:rPr lang="en-US"/>
+              <a:t>KosmosFS</a:t>
+            </a:r>
+            <a:r>
+              <a:rPr lang="en-US" baseline="0"/>
+              <a:t> Distributed Filesystem</a:t>
+            </a:r>
+            <a:endParaRPr lang="en-US"/>
+          </a:p>
+        </c:rich>
+      </c:tx>
+      <c:layout/>
+    </c:title>
+    <c:plotArea>
+      <c:layout/>
+      <c:lineChart>
+        <c:grouping val="standard"/>
+        <c:ser>
+          <c:idx val="0"/>
+          <c:order val="0"/>
+          <c:tx>
+            <c:v>Local Distributed Filesystem</c:v>
+          </c:tx>
+          <c:marker>
+            <c:symbol val="none"/>
+          </c:marker>
+          <c:val>
+            <c:numRef>
+              <c:f>Sheet1!$D$2:$D$5</c:f>
+              <c:numCache>
+                <c:formatCode>General</c:formatCode>
+                <c:ptCount val="4"/>
+                <c:pt idx="0">
+                  <c:v>228.99600000000001</c:v>
+                </c:pt>
+                <c:pt idx="1">
+                  <c:v>141.99600000000001</c:v>
+                </c:pt>
+                <c:pt idx="2">
+                  <c:v>138</c:v>
+                </c:pt>
+                <c:pt idx="3">
+                  <c:v>138.99600000000001</c:v>
                 </c:pt>
               </c:numCache>
             </c:numRef>
@@ -210,21 +411,49 @@
           </c:marker>
           <c:val>
             <c:numRef>
-              <c:f>Sheet1!$C$9:$C$12</c:f>
+              <c:f>Sheet1!$D$9:$D$12</c:f>
               <c:numCache>
                 <c:formatCode>General</c:formatCode>
                 <c:ptCount val="4"/>
                 <c:pt idx="0">
-                  <c:v>8.2332999999999998</c:v>
+                  <c:v>493.99799999999993</c:v>
                 </c:pt>
                 <c:pt idx="1">
-                  <c:v>4.0833000000000004</c:v>
+                  <c:v>244.99800000000005</c:v>
                 </c:pt>
                 <c:pt idx="2">
-                  <c:v>2.7833000000000019</c:v>
+                  <c:v>166.99800000000005</c:v>
                 </c:pt>
                 <c:pt idx="3">
-                  <c:v>1.8833</c:v>
+                  <c:v>112.998</c:v>
+                </c:pt>
+              </c:numCache>
+            </c:numRef>
+          </c:val>
+        </c:ser>
+        <c:ser>
+          <c:idx val="3"/>
+          <c:order val="2"/>
+          <c:tx>
+            <c:v>2 Dataservers (r = 1)</c:v>
+          </c:tx>
+          <c:marker>
+            <c:symbol val="none"/>
+          </c:marker>
+          <c:val>
+            <c:numRef>
+              <c:f>Sheet1!$D$21:$D$24</c:f>
+              <c:numCache>
+                <c:formatCode>General</c:formatCode>
+                <c:ptCount val="4"/>
+                <c:pt idx="1">
+                  <c:v>445.0019999999999</c:v>
+                </c:pt>
+                <c:pt idx="2">
+                  <c:v>336</c:v>
+                </c:pt>
+                <c:pt idx="3">
+                  <c:v>190.99800000000002</c:v>
                 </c:pt>
               </c:numCache>
             </c:numRef>
@@ -232,69 +461,41 @@
         </c:ser>
         <c:ser>
           <c:idx val="2"/>
-          <c:order val="2"/>
+          <c:order val="3"/>
           <c:tx>
-            <c:v>Remote Data</c:v>
+            <c:v>Remote Filesystem</c:v>
           </c:tx>
           <c:marker>
             <c:symbol val="none"/>
           </c:marker>
           <c:val>
             <c:numRef>
-              <c:f>Sheet1!$C$15:$C$18</c:f>
+              <c:f>Sheet1!$D$15:$D$18</c:f>
               <c:numCache>
                 <c:formatCode>General</c:formatCode>
                 <c:ptCount val="4"/>
                 <c:pt idx="0">
-                  <c:v>31.35</c:v>
+                  <c:v>1881</c:v>
                 </c:pt>
                 <c:pt idx="1">
-                  <c:v>16.283299999999979</c:v>
+                  <c:v>976.99800000000005</c:v>
                 </c:pt>
                 <c:pt idx="2">
-                  <c:v>9.2819000000000003</c:v>
+                  <c:v>556.91399999999999</c:v>
                 </c:pt>
                 <c:pt idx="3">
-                  <c:v>6.7327000000000004</c:v>
-                </c:pt>
-              </c:numCache>
-            </c:numRef>
-          </c:val>
-        </c:ser>
-        <c:ser>
-          <c:idx val="3"/>
-          <c:order val="3"/>
-          <c:tx>
-            <c:v>Mixed Data</c:v>
-          </c:tx>
-          <c:marker>
-            <c:symbol val="none"/>
-          </c:marker>
-          <c:val>
-            <c:numRef>
-              <c:f>Sheet1!$C$21:$C$24</c:f>
-              <c:numCache>
-                <c:formatCode>General</c:formatCode>
-                <c:ptCount val="4"/>
-                <c:pt idx="1">
-                  <c:v>7.4167000000000014</c:v>
-                </c:pt>
-                <c:pt idx="2">
-                  <c:v>5.6</c:v>
-                </c:pt>
-                <c:pt idx="3">
-                  <c:v>3.1833000000000018</c:v>
+                  <c:v>403.96200000000005</c:v>
                 </c:pt>
               </c:numCache>
             </c:numRef>
           </c:val>
         </c:ser>
         <c:marker val="1"/>
-        <c:axId val="54012928"/>
-        <c:axId val="65585920"/>
+        <c:axId val="64392192"/>
+        <c:axId val="64394368"/>
       </c:lineChart>
       <c:catAx>
-        <c:axId val="54012928"/>
+        <c:axId val="64392192"/>
         <c:scaling>
           <c:orientation val="minMax"/>
         </c:scaling>
@@ -309,15 +510,11 @@
                   <a:defRPr/>
                 </a:pPr>
                 <a:r>
-                  <a:rPr lang="en-US" dirty="0">
-                    <a:latin typeface="Century Gothic" pitchFamily="34" charset="0"/>
-                  </a:rPr>
+                  <a:rPr lang="en-US"/>
                   <a:t>Number</a:t>
                 </a:r>
                 <a:r>
-                  <a:rPr lang="en-US" baseline="0" dirty="0">
-                    <a:latin typeface="Century Gothic" pitchFamily="34" charset="0"/>
-                  </a:rPr>
+                  <a:rPr lang="en-US" baseline="0"/>
                   <a:t> of Workers</a:t>
                 </a:r>
               </a:p>
@@ -326,14 +523,14 @@
           <c:layout/>
         </c:title>
         <c:tickLblPos val="nextTo"/>
-        <c:crossAx val="65585920"/>
+        <c:crossAx val="64394368"/>
         <c:crosses val="autoZero"/>
         <c:auto val="1"/>
         <c:lblAlgn val="ctr"/>
         <c:lblOffset val="100"/>
       </c:catAx>
       <c:valAx>
-        <c:axId val="65585920"/>
+        <c:axId val="64394368"/>
         <c:scaling>
           <c:orientation val="minMax"/>
         </c:scaling>
@@ -349,10 +546,8 @@
                   <a:defRPr/>
                 </a:pPr>
                 <a:r>
-                  <a:rPr lang="en-US" dirty="0">
-                    <a:latin typeface="Century Gothic" pitchFamily="34" charset="0"/>
-                  </a:rPr>
-                  <a:t>Time (minutes)</a:t>
+                  <a:rPr lang="en-US"/>
+                  <a:t>Time (seconds)</a:t>
                 </a:r>
               </a:p>
             </c:rich>
@@ -361,7 +556,7 @@
         </c:title>
         <c:numFmt formatCode="General" sourceLinked="1"/>
         <c:tickLblPos val="nextTo"/>
-        <c:crossAx val="54012928"/>
+        <c:crossAx val="64392192"/>
         <c:crosses val="autoZero"/>
         <c:crossBetween val="between"/>
       </c:valAx>
@@ -372,7 +567,7 @@
     </c:legend>
     <c:plotVisOnly val="1"/>
   </c:chart>
-  <c:externalData r:id="rId2"/>
+  <c:externalData r:id="rId1"/>
 </c:chartSpace>
 </file>
 
@@ -459,7 +654,7 @@
             <a:fld id="{8E161E8F-4E15-A840-9658-105F9DD3DE22}" type="datetimeFigureOut">
               <a:rPr lang="en-US" smtClean="0"/>
               <a:pPr/>
-              <a:t>12/7/2009</a:t>
+              <a:t>12/8/2009</a:t>
             </a:fld>
             <a:endParaRPr lang="en-US"/>
           </a:p>
@@ -725,6 +920,227 @@
 </p:notesMaster>
 </file>
 
+<file path=ppt/notesSlides/notesSlide1.xml><?xml version="1.0" encoding="utf-8"?>
+<p:notes xmlns:a="http://schemas.openxmlformats.org/drawingml/2006/main" xmlns:r="http://schemas.openxmlformats.org/officeDocument/2006/relationships" xmlns:p="http://schemas.openxmlformats.org/presentationml/2006/main">
+  <p:cSld>
+    <p:spTree>
+      <p:nvGrpSpPr>
+        <p:cNvPr id="1" name=""/>
+        <p:cNvGrpSpPr/>
+        <p:nvPr/>
+      </p:nvGrpSpPr>
+      <p:grpSpPr>
+        <a:xfrm>
+          <a:off x="0" y="0"/>
+          <a:ext cx="0" cy="0"/>
+          <a:chOff x="0" y="0"/>
+          <a:chExt cx="0" cy="0"/>
+        </a:xfrm>
+      </p:grpSpPr>
+      <p:sp>
+        <p:nvSpPr>
+          <p:cNvPr id="2" name="Slide Image Placeholder 1"/>
+          <p:cNvSpPr>
+            <a:spLocks noGrp="1" noRot="1" noChangeAspect="1"/>
+          </p:cNvSpPr>
+          <p:nvPr>
+            <p:ph type="sldImg"/>
+          </p:nvPr>
+        </p:nvSpPr>
+        <p:spPr/>
+      </p:sp>
+      <p:sp>
+        <p:nvSpPr>
+          <p:cNvPr id="3" name="Notes Placeholder 2"/>
+          <p:cNvSpPr>
+            <a:spLocks noGrp="1"/>
+          </p:cNvSpPr>
+          <p:nvPr>
+            <p:ph type="body" idx="1"/>
+          </p:nvPr>
+        </p:nvSpPr>
+        <p:spPr/>
+        <p:txBody>
+          <a:bodyPr>
+            <a:normAutofit/>
+          </a:bodyPr>
+          <a:lstStyle/>
+          <a:p>
+            <a:r>
+              <a:rPr lang="en-US" dirty="0" smtClean="0"/>
+              <a:t>It worries</a:t>
+            </a:r>
+            <a:r>
+              <a:rPr lang="en-US" baseline="0" dirty="0" smtClean="0"/>
+              <a:t> about the data requests and managing them.  It doesn’t look at closeness of work and decide to move the work.  Maybe we can get better performance by doing this.  DFS’s use replication  and locality of data, but cannot move work around.</a:t>
+            </a:r>
+            <a:endParaRPr lang="en-US" dirty="0"/>
+          </a:p>
+        </p:txBody>
+      </p:sp>
+      <p:sp>
+        <p:nvSpPr>
+          <p:cNvPr id="4" name="Slide Number Placeholder 3"/>
+          <p:cNvSpPr>
+            <a:spLocks noGrp="1"/>
+          </p:cNvSpPr>
+          <p:nvPr>
+            <p:ph type="sldNum" sz="quarter" idx="10"/>
+          </p:nvPr>
+        </p:nvSpPr>
+        <p:spPr/>
+        <p:txBody>
+          <a:bodyPr/>
+          <a:lstStyle/>
+          <a:p>
+            <a:fld id="{D344DA2A-F2F4-D74A-8AEC-1933B33E97E0}" type="slidenum">
+              <a:rPr lang="en-US" smtClean="0"/>
+              <a:pPr/>
+              <a:t>13</a:t>
+            </a:fld>
+            <a:endParaRPr lang="en-US"/>
+          </a:p>
+        </p:txBody>
+      </p:sp>
+    </p:spTree>
+  </p:cSld>
+  <p:clrMapOvr>
+    <a:masterClrMapping/>
+  </p:clrMapOvr>
+</p:notes>
+</file>
+
+<file path=ppt/notesSlides/notesSlide2.xml><?xml version="1.0" encoding="utf-8"?>
+<p:notes xmlns:a="http://schemas.openxmlformats.org/drawingml/2006/main" xmlns:r="http://schemas.openxmlformats.org/officeDocument/2006/relationships" xmlns:p="http://schemas.openxmlformats.org/presentationml/2006/main">
+  <p:cSld>
+    <p:spTree>
+      <p:nvGrpSpPr>
+        <p:cNvPr id="1" name=""/>
+        <p:cNvGrpSpPr/>
+        <p:nvPr/>
+      </p:nvGrpSpPr>
+      <p:grpSpPr>
+        <a:xfrm>
+          <a:off x="0" y="0"/>
+          <a:ext cx="0" cy="0"/>
+          <a:chOff x="0" y="0"/>
+          <a:chExt cx="0" cy="0"/>
+        </a:xfrm>
+      </p:grpSpPr>
+      <p:sp>
+        <p:nvSpPr>
+          <p:cNvPr id="2" name="Slide Image Placeholder 1"/>
+          <p:cNvSpPr>
+            <a:spLocks noGrp="1" noRot="1" noChangeAspect="1"/>
+          </p:cNvSpPr>
+          <p:nvPr>
+            <p:ph type="sldImg"/>
+          </p:nvPr>
+        </p:nvSpPr>
+        <p:spPr/>
+      </p:sp>
+      <p:sp>
+        <p:nvSpPr>
+          <p:cNvPr id="3" name="Notes Placeholder 2"/>
+          <p:cNvSpPr>
+            <a:spLocks noGrp="1"/>
+          </p:cNvSpPr>
+          <p:nvPr>
+            <p:ph type="body" idx="1"/>
+          </p:nvPr>
+        </p:nvSpPr>
+        <p:spPr/>
+        <p:txBody>
+          <a:bodyPr>
+            <a:normAutofit/>
+          </a:bodyPr>
+          <a:lstStyle/>
+          <a:p>
+            <a:pPr marL="0" marR="0" indent="0" algn="l" defTabSz="457200" rtl="0" eaLnBrk="1" fontAlgn="auto" latinLnBrk="0" hangingPunct="1">
+              <a:lnSpc>
+                <a:spcPct val="100000"/>
+              </a:lnSpc>
+              <a:spcBef>
+                <a:spcPts val="0"/>
+              </a:spcBef>
+              <a:spcAft>
+                <a:spcPts val="0"/>
+              </a:spcAft>
+              <a:buClrTx/>
+              <a:buSzTx/>
+              <a:buFontTx/>
+              <a:buNone/>
+              <a:tabLst/>
+              <a:defRPr/>
+            </a:pPr>
+            <a:r>
+              <a:rPr lang="en-US" dirty="0" smtClean="0"/>
+              <a:t>Some overhead for multiple dataservers in filesystem</a:t>
+            </a:r>
+            <a:r>
+              <a:rPr lang="en-US" baseline="0" dirty="0" smtClean="0"/>
+              <a:t> – when r = 2 it is slower than when 1 </a:t>
+            </a:r>
+            <a:r>
+              <a:rPr lang="en-US" baseline="0" dirty="0" err="1" smtClean="0"/>
+              <a:t>dataserver</a:t>
+            </a:r>
+            <a:endParaRPr lang="en-US" baseline="0" dirty="0" smtClean="0"/>
+          </a:p>
+          <a:p>
+            <a:pPr marL="0" marR="0" indent="0" algn="l" defTabSz="457200" rtl="0" eaLnBrk="1" fontAlgn="auto" latinLnBrk="0" hangingPunct="1">
+              <a:lnSpc>
+                <a:spcPct val="100000"/>
+              </a:lnSpc>
+              <a:spcBef>
+                <a:spcPts val="0"/>
+              </a:spcBef>
+              <a:spcAft>
+                <a:spcPts val="0"/>
+              </a:spcAft>
+              <a:buClrTx/>
+              <a:buSzTx/>
+              <a:buFontTx/>
+              <a:buNone/>
+              <a:tabLst/>
+              <a:defRPr/>
+            </a:pPr>
+            <a:endParaRPr lang="en-US" dirty="0" smtClean="0"/>
+          </a:p>
+        </p:txBody>
+      </p:sp>
+      <p:sp>
+        <p:nvSpPr>
+          <p:cNvPr id="4" name="Slide Number Placeholder 3"/>
+          <p:cNvSpPr>
+            <a:spLocks noGrp="1"/>
+          </p:cNvSpPr>
+          <p:nvPr>
+            <p:ph type="sldNum" sz="quarter" idx="10"/>
+          </p:nvPr>
+        </p:nvSpPr>
+        <p:spPr/>
+        <p:txBody>
+          <a:bodyPr/>
+          <a:lstStyle/>
+          <a:p>
+            <a:fld id="{D344DA2A-F2F4-D74A-8AEC-1933B33E97E0}" type="slidenum">
+              <a:rPr lang="en-US" smtClean="0"/>
+              <a:pPr/>
+              <a:t>14</a:t>
+            </a:fld>
+            <a:endParaRPr lang="en-US"/>
+          </a:p>
+        </p:txBody>
+      </p:sp>
+    </p:spTree>
+  </p:cSld>
+  <p:clrMapOvr>
+    <a:masterClrMapping/>
+  </p:clrMapOvr>
+</p:notes>
+</file>
+
 <file path=ppt/slideLayouts/slideLayout1.xml><?xml version="1.0" encoding="utf-8"?>
 <p:sldLayout xmlns:a="http://schemas.openxmlformats.org/drawingml/2006/main" xmlns:r="http://schemas.openxmlformats.org/officeDocument/2006/relationships" xmlns:p="http://schemas.openxmlformats.org/presentationml/2006/main" type="title" preserve="1">
   <p:cSld name="Title Slide">
@@ -951,7 +1367,7 @@
             <a:fld id="{4C4AD4EB-88D0-C141-9474-CCD86A78CB94}" type="datetimeFigureOut">
               <a:rPr lang="en-US" smtClean="0"/>
               <a:pPr/>
-              <a:t>12/7/2009</a:t>
+              <a:t>12/8/2009</a:t>
             </a:fld>
             <a:endParaRPr lang="en-US" dirty="0"/>
           </a:p>
@@ -1274,7 +1690,7 @@
             <a:fld id="{4C4AD4EB-88D0-C141-9474-CCD86A78CB94}" type="datetimeFigureOut">
               <a:rPr lang="en-US" smtClean="0"/>
               <a:pPr/>
-              <a:t>12/7/2009</a:t>
+              <a:t>12/8/2009</a:t>
             </a:fld>
             <a:endParaRPr lang="en-US"/>
           </a:p>
@@ -1550,7 +1966,7 @@
             <a:fld id="{4C4AD4EB-88D0-C141-9474-CCD86A78CB94}" type="datetimeFigureOut">
               <a:rPr lang="en-US" smtClean="0"/>
               <a:pPr/>
-              <a:t>12/7/2009</a:t>
+              <a:t>12/8/2009</a:t>
             </a:fld>
             <a:endParaRPr lang="en-US"/>
           </a:p>
@@ -1842,7 +2258,7 @@
             <a:fld id="{4C4AD4EB-88D0-C141-9474-CCD86A78CB94}" type="datetimeFigureOut">
               <a:rPr lang="en-US" smtClean="0"/>
               <a:pPr/>
-              <a:t>12/7/2009</a:t>
+              <a:t>12/8/2009</a:t>
             </a:fld>
             <a:endParaRPr lang="en-US"/>
           </a:p>
@@ -2169,7 +2585,7 @@
             <a:fld id="{4C4AD4EB-88D0-C141-9474-CCD86A78CB94}" type="datetimeFigureOut">
               <a:rPr lang="en-US" smtClean="0"/>
               <a:pPr/>
-              <a:t>12/7/2009</a:t>
+              <a:t>12/8/2009</a:t>
             </a:fld>
             <a:endParaRPr lang="en-US"/>
           </a:p>
@@ -2417,7 +2833,7 @@
             <a:fld id="{4C4AD4EB-88D0-C141-9474-CCD86A78CB94}" type="datetimeFigureOut">
               <a:rPr lang="en-US" smtClean="0"/>
               <a:pPr/>
-              <a:t>12/7/2009</a:t>
+              <a:t>12/8/2009</a:t>
             </a:fld>
             <a:endParaRPr lang="en-US"/>
           </a:p>
@@ -2594,7 +3010,7 @@
             <a:fld id="{4C4AD4EB-88D0-C141-9474-CCD86A78CB94}" type="datetimeFigureOut">
               <a:rPr lang="en-US" smtClean="0"/>
               <a:pPr/>
-              <a:t>12/7/2009</a:t>
+              <a:t>12/8/2009</a:t>
             </a:fld>
             <a:endParaRPr lang="en-US"/>
           </a:p>
@@ -2971,7 +3387,7 @@
             <a:fld id="{4C4AD4EB-88D0-C141-9474-CCD86A78CB94}" type="datetimeFigureOut">
               <a:rPr lang="en-US" smtClean="0"/>
               <a:pPr/>
-              <a:t>12/7/2009</a:t>
+              <a:t>12/8/2009</a:t>
             </a:fld>
             <a:endParaRPr lang="en-US"/>
           </a:p>
@@ -3274,7 +3690,7 @@
             <a:fld id="{4C4AD4EB-88D0-C141-9474-CCD86A78CB94}" type="datetimeFigureOut">
               <a:rPr lang="en-US" smtClean="0"/>
               <a:pPr/>
-              <a:t>12/7/2009</a:t>
+              <a:t>12/8/2009</a:t>
             </a:fld>
             <a:endParaRPr lang="en-US"/>
           </a:p>
@@ -3582,7 +3998,7 @@
             <a:fld id="{4C4AD4EB-88D0-C141-9474-CCD86A78CB94}" type="datetimeFigureOut">
               <a:rPr lang="en-US" smtClean="0"/>
               <a:pPr/>
-              <a:t>12/7/2009</a:t>
+              <a:t>12/8/2009</a:t>
             </a:fld>
             <a:endParaRPr lang="en-US"/>
           </a:p>
@@ -3876,7 +4292,7 @@
             <a:fld id="{4C4AD4EB-88D0-C141-9474-CCD86A78CB94}" type="datetimeFigureOut">
               <a:rPr lang="en-US" smtClean="0"/>
               <a:pPr/>
-              <a:t>12/7/2009</a:t>
+              <a:t>12/8/2009</a:t>
             </a:fld>
             <a:endParaRPr lang="en-US"/>
           </a:p>
@@ -4308,7 +4724,7 @@
             <a:fld id="{4C4AD4EB-88D0-C141-9474-CCD86A78CB94}" type="datetimeFigureOut">
               <a:rPr lang="en-US" smtClean="0"/>
               <a:pPr/>
-              <a:t>12/7/2009</a:t>
+              <a:t>12/8/2009</a:t>
             </a:fld>
             <a:endParaRPr lang="en-US"/>
           </a:p>
@@ -4656,7 +5072,7 @@
             <a:fld id="{4C4AD4EB-88D0-C141-9474-CCD86A78CB94}" type="datetimeFigureOut">
               <a:rPr lang="en-US" smtClean="0"/>
               <a:pPr/>
-              <a:t>12/7/2009</a:t>
+              <a:t>12/8/2009</a:t>
             </a:fld>
             <a:endParaRPr lang="en-US"/>
           </a:p>
@@ -4748,7 +5164,7 @@
             <a:fld id="{4C4AD4EB-88D0-C141-9474-CCD86A78CB94}" type="datetimeFigureOut">
               <a:rPr lang="en-US" smtClean="0"/>
               <a:pPr/>
-              <a:t>12/7/2009</a:t>
+              <a:t>12/8/2009</a:t>
             </a:fld>
             <a:endParaRPr lang="en-US"/>
           </a:p>
@@ -5087,7 +5503,7 @@
             <a:fld id="{4C4AD4EB-88D0-C141-9474-CCD86A78CB94}" type="datetimeFigureOut">
               <a:rPr lang="en-US" smtClean="0"/>
               <a:pPr/>
-              <a:t>12/7/2009</a:t>
+              <a:t>12/8/2009</a:t>
             </a:fld>
             <a:endParaRPr lang="en-US"/>
           </a:p>
@@ -5301,7 +5717,7 @@
             <a:fld id="{4C4AD4EB-88D0-C141-9474-CCD86A78CB94}" type="datetimeFigureOut">
               <a:rPr lang="en-US" smtClean="0"/>
               <a:pPr/>
-              <a:t>12/7/2009</a:t>
+              <a:t>12/8/2009</a:t>
             </a:fld>
             <a:endParaRPr lang="en-US"/>
           </a:p>
@@ -5863,8 +6279,8 @@
         </p:nvSpPr>
         <p:spPr>
           <a:xfrm>
-            <a:off x="887664" y="3034553"/>
-            <a:ext cx="8001000" cy="3823447"/>
+            <a:off x="887664" y="3514165"/>
+            <a:ext cx="5925512" cy="1815353"/>
           </a:xfrm>
         </p:spPr>
         <p:txBody>
@@ -5904,14 +6320,21 @@
             <p:ph type="ctrTitle"/>
           </p:nvPr>
         </p:nvSpPr>
-        <p:spPr/>
-        <p:txBody>
-          <a:bodyPr/>
-          <a:lstStyle/>
-          <a:p>
-            <a:r>
-              <a:rPr lang="en-US" dirty="0" smtClean="0"/>
-              <a:t>TITLE HERE</a:t>
+        <p:spPr>
+          <a:xfrm>
+            <a:off x="0" y="1497106"/>
+            <a:ext cx="8915400" cy="2522258"/>
+          </a:xfrm>
+        </p:spPr>
+        <p:txBody>
+          <a:bodyPr>
+            <a:noAutofit/>
+          </a:bodyPr>
+          <a:lstStyle/>
+          <a:p>
+            <a:r>
+              <a:rPr lang="en-US" dirty="0" smtClean="0"/>
+              <a:t>Understanding Performance Implications of Distributed Filesystems in a Data-Intensive Application</a:t>
             </a:r>
             <a:endParaRPr lang="en-US" dirty="0"/>
           </a:p>
@@ -6055,33 +6478,6 @@
         </p:nvSpPr>
         <p:spPr/>
         <p:txBody>
-          <a:bodyPr/>
-          <a:lstStyle/>
-          <a:p>
-            <a:r>
-              <a:rPr lang="en-US" dirty="0" smtClean="0"/>
-              <a:t>Distributed </a:t>
-            </a:r>
-            <a:r>
-              <a:rPr lang="en-US" dirty="0" err="1" smtClean="0"/>
-              <a:t>Filesystem</a:t>
-            </a:r>
-            <a:endParaRPr lang="en-US" dirty="0"/>
-          </a:p>
-        </p:txBody>
-      </p:sp>
-      <p:sp>
-        <p:nvSpPr>
-          <p:cNvPr id="3" name="Content Placeholder 2"/>
-          <p:cNvSpPr>
-            <a:spLocks noGrp="1"/>
-          </p:cNvSpPr>
-          <p:nvPr>
-            <p:ph idx="1"/>
-          </p:nvPr>
-        </p:nvSpPr>
-        <p:spPr/>
-        <p:txBody>
           <a:bodyPr>
             <a:normAutofit/>
           </a:bodyPr>
@@ -6089,49 +6485,55 @@
           <a:p>
             <a:r>
               <a:rPr lang="en-US" dirty="0" smtClean="0"/>
-              <a:t>Pros</a:t>
+              <a:t>Intelligent vs. Conventional</a:t>
+            </a:r>
+            <a:endParaRPr lang="en-US" dirty="0"/>
+          </a:p>
+        </p:txBody>
+      </p:sp>
+      <p:sp>
+        <p:nvSpPr>
+          <p:cNvPr id="3" name="Content Placeholder 2"/>
+          <p:cNvSpPr>
+            <a:spLocks noGrp="1"/>
+          </p:cNvSpPr>
+          <p:nvPr>
+            <p:ph idx="1"/>
+          </p:nvPr>
+        </p:nvSpPr>
+        <p:spPr>
+          <a:xfrm>
+            <a:off x="757947" y="1529880"/>
+            <a:ext cx="7918462" cy="4608884"/>
+          </a:xfrm>
+        </p:spPr>
+        <p:txBody>
+          <a:bodyPr>
+            <a:normAutofit/>
+          </a:bodyPr>
+          <a:lstStyle/>
+          <a:p>
+            <a:r>
+              <a:rPr lang="en-US" dirty="0" smtClean="0"/>
+              <a:t>Intelligent may have overhead, but it pays off if data is large</a:t>
             </a:r>
           </a:p>
           <a:p>
             <a:pPr lvl="1"/>
             <a:r>
               <a:rPr lang="en-US" dirty="0" smtClean="0"/>
-              <a:t>Replication</a:t>
-            </a:r>
-            <a:endParaRPr lang="en-US" dirty="0" smtClean="0"/>
+              <a:t>Simple intelligent measurements can improve performance</a:t>
+            </a:r>
           </a:p>
           <a:p>
             <a:pPr lvl="1"/>
             <a:r>
-              <a:rPr lang="en-US" dirty="0" smtClean="0"/>
-              <a:t>Fault tolerance</a:t>
-            </a:r>
-          </a:p>
-          <a:p>
-            <a:pPr lvl="1"/>
-            <a:r>
-              <a:rPr lang="en-US" dirty="0" smtClean="0"/>
-              <a:t>Capability to handle data dependencies </a:t>
-            </a:r>
-          </a:p>
-          <a:p>
-            <a:r>
-              <a:rPr lang="en-US" dirty="0" smtClean="0"/>
-              <a:t>Cons</a:t>
-            </a:r>
-          </a:p>
-          <a:p>
-            <a:pPr lvl="1"/>
-            <a:r>
-              <a:rPr lang="en-US" dirty="0" smtClean="0"/>
-              <a:t>Overhead</a:t>
-            </a:r>
-          </a:p>
-          <a:p>
-            <a:pPr lvl="1"/>
-            <a:r>
-              <a:rPr lang="en-US" dirty="0" smtClean="0"/>
-              <a:t>Inability to control data placement</a:t>
+              <a:rPr lang="en-US" dirty="0" smtClean="0">
+                <a:solidFill>
+                  <a:srgbClr val="FF0000"/>
+                </a:solidFill>
+              </a:rPr>
+              <a:t>Explain comparisons of graphs here</a:t>
             </a:r>
           </a:p>
         </p:txBody>
@@ -6185,7 +6587,7 @@
           <a:p>
             <a:r>
               <a:rPr lang="en-US" dirty="0" smtClean="0"/>
-              <a:t>Results from DFS tests</a:t>
+              <a:t>Lessons Learned</a:t>
             </a:r>
             <a:endParaRPr lang="en-US" dirty="0"/>
           </a:p>
@@ -6201,12 +6603,7 @@
             <p:ph idx="1"/>
           </p:nvPr>
         </p:nvSpPr>
-        <p:spPr>
-          <a:xfrm>
-            <a:off x="757947" y="1529880"/>
-            <a:ext cx="3805427" cy="4608884"/>
-          </a:xfrm>
-        </p:spPr>
+        <p:spPr/>
         <p:txBody>
           <a:bodyPr>
             <a:normAutofit/>
@@ -6215,39 +6612,58 @@
           <a:p>
             <a:r>
               <a:rPr lang="en-US" dirty="0" smtClean="0"/>
-              <a:t>Read 2.3 Gigabytes</a:t>
-            </a:r>
-          </a:p>
-          <a:p>
-            <a:r>
-              <a:rPr lang="en-US" dirty="0" smtClean="0"/>
-              <a:t>No Coordination</a:t>
-            </a:r>
-          </a:p>
-          <a:p>
-            <a:r>
-              <a:rPr lang="en-US" dirty="0" smtClean="0"/>
-              <a:t>Handled Multiple Requests</a:t>
-            </a:r>
-          </a:p>
-        </p:txBody>
-      </p:sp>
-      <p:graphicFrame>
-        <p:nvGraphicFramePr>
-          <p:cNvPr id="4" name="Chart 3"/>
-          <p:cNvGraphicFramePr/>
-          <p:nvPr/>
-        </p:nvGraphicFramePr>
-        <p:xfrm>
-          <a:off x="3924299" y="2724150"/>
-          <a:ext cx="5219701" cy="4133850"/>
-        </p:xfrm>
-        <a:graphic>
-          <a:graphicData uri="http://schemas.openxmlformats.org/drawingml/2006/chart">
-            <c:chart xmlns:c="http://schemas.openxmlformats.org/drawingml/2006/chart" xmlns:r="http://schemas.openxmlformats.org/officeDocument/2006/relationships" r:id="rId2"/>
-          </a:graphicData>
-        </a:graphic>
-      </p:graphicFrame>
+              <a:t>Very simple tools to measure data dependencies can be very effective.  Some measurements used</a:t>
+            </a:r>
+          </a:p>
+          <a:p>
+            <a:pPr lvl="1"/>
+            <a:r>
+              <a:rPr lang="en-US" dirty="0" smtClean="0"/>
+              <a:t>Ping time</a:t>
+            </a:r>
+          </a:p>
+          <a:p>
+            <a:pPr lvl="1"/>
+            <a:r>
+              <a:rPr lang="en-US" dirty="0" smtClean="0"/>
+              <a:t>Small file transfer time</a:t>
+            </a:r>
+          </a:p>
+          <a:p>
+            <a:pPr lvl="1"/>
+            <a:r>
+              <a:rPr lang="en-US" dirty="0" smtClean="0"/>
+              <a:t>Number of hops</a:t>
+            </a:r>
+          </a:p>
+          <a:p>
+            <a:r>
+              <a:rPr lang="en-US" dirty="0" smtClean="0"/>
+              <a:t>More complex measurements are possible</a:t>
+            </a:r>
+          </a:p>
+          <a:p>
+            <a:pPr lvl="1"/>
+            <a:r>
+              <a:rPr lang="en-US" dirty="0" smtClean="0"/>
+              <a:t>Throughput</a:t>
+            </a:r>
+          </a:p>
+          <a:p>
+            <a:pPr lvl="1"/>
+            <a:r>
+              <a:rPr lang="en-US" dirty="0" smtClean="0"/>
+              <a:t>Queue times</a:t>
+            </a:r>
+          </a:p>
+          <a:p>
+            <a:r>
+              <a:rPr lang="en-US" dirty="0" smtClean="0"/>
+              <a:t>Ignoring data dependencies is no longer an option</a:t>
+            </a:r>
+          </a:p>
+        </p:txBody>
+      </p:sp>
     </p:spTree>
   </p:cSld>
   <p:clrMapOvr>
@@ -6297,11 +6713,7 @@
           <a:p>
             <a:r>
               <a:rPr lang="en-US" dirty="0" smtClean="0"/>
-              <a:t>Results from Central </a:t>
-            </a:r>
-            <a:r>
-              <a:rPr lang="en-US" dirty="0" smtClean="0"/>
-              <a:t>Model</a:t>
+              <a:t>Distributed Filesystem Model</a:t>
             </a:r>
             <a:endParaRPr lang="en-US" dirty="0"/>
           </a:p>
@@ -6326,67 +6738,66 @@
           <a:p>
             <a:r>
               <a:rPr lang="en-US" dirty="0" smtClean="0"/>
-              <a:t>The SAGA Philosophy</a:t>
+              <a:t>Abstract layer between application and local filesystems</a:t>
+            </a:r>
+          </a:p>
+          <a:p>
+            <a:r>
+              <a:rPr lang="en-US" dirty="0" smtClean="0"/>
+              <a:t>Some examples include</a:t>
             </a:r>
           </a:p>
           <a:p>
             <a:pPr lvl="1"/>
             <a:r>
               <a:rPr lang="en-US" dirty="0" smtClean="0"/>
-              <a:t>A Fresh Perspective on Distributed Applications and CI</a:t>
-            </a:r>
-          </a:p>
-          <a:p>
-            <a:r>
-              <a:rPr lang="en-US" dirty="0" smtClean="0"/>
-              <a:t>SAGA in a Nutshell</a:t>
+              <a:t>HDFS – </a:t>
+            </a:r>
+            <a:r>
+              <a:rPr lang="en-US" dirty="0" err="1" smtClean="0"/>
+              <a:t>Hadoop’s</a:t>
+            </a:r>
+            <a:r>
+              <a:rPr lang="en-US" dirty="0" smtClean="0"/>
+              <a:t> filesystem</a:t>
             </a:r>
           </a:p>
           <a:p>
             <a:pPr lvl="1"/>
             <a:r>
               <a:rPr lang="en-US" dirty="0" smtClean="0"/>
-              <a:t>SAGA Landscape</a:t>
+              <a:t>GFS – Google’s filesystem</a:t>
             </a:r>
           </a:p>
           <a:p>
             <a:pPr lvl="1"/>
             <a:r>
-              <a:rPr lang="en-US" dirty="0" smtClean="0"/>
-              <a:t>Individual APIs</a:t>
+              <a:rPr lang="en-US" dirty="0" err="1" smtClean="0"/>
+              <a:t>KosmosFS</a:t>
+            </a:r>
+            <a:r>
+              <a:rPr lang="en-US" dirty="0" smtClean="0"/>
+              <a:t> – open source C++ filesystem</a:t>
+            </a:r>
+          </a:p>
+          <a:p>
+            <a:r>
+              <a:rPr lang="en-US" dirty="0" smtClean="0"/>
+              <a:t>Encapsulates Handling Data</a:t>
             </a:r>
           </a:p>
           <a:p>
             <a:pPr lvl="1"/>
             <a:r>
               <a:rPr lang="en-US" dirty="0" smtClean="0"/>
-              <a:t>OGF standard</a:t>
-            </a:r>
-          </a:p>
-          <a:p>
-            <a:r>
-              <a:rPr lang="en-US" dirty="0" smtClean="0"/>
-              <a:t>SAGA in action</a:t>
+              <a:t>Handles data displacement</a:t>
             </a:r>
           </a:p>
           <a:p>
             <a:pPr lvl="1"/>
             <a:r>
               <a:rPr lang="en-US" dirty="0" smtClean="0"/>
-              <a:t>Applications</a:t>
-            </a:r>
-          </a:p>
-          <a:p>
-            <a:pPr lvl="1"/>
-            <a:r>
-              <a:rPr lang="en-US" dirty="0" smtClean="0"/>
-              <a:t>Tools, Frameworks, Gateways, Access Layers..</a:t>
-            </a:r>
-          </a:p>
-          <a:p>
-            <a:r>
-              <a:rPr lang="en-US" dirty="0" smtClean="0"/>
-              <a:t>Uptake and Roadmap</a:t>
+              <a:t>Handles data requests</a:t>
             </a:r>
           </a:p>
         </p:txBody>
@@ -6440,7 +6851,7 @@
           <a:p>
             <a:r>
               <a:rPr lang="en-US" dirty="0" smtClean="0"/>
-              <a:t>Conclusions</a:t>
+              <a:t>Distributed Filesystem</a:t>
             </a:r>
             <a:endParaRPr lang="en-US" dirty="0"/>
           </a:p>
@@ -6465,67 +6876,60 @@
           <a:p>
             <a:r>
               <a:rPr lang="en-US" dirty="0" smtClean="0"/>
-              <a:t>The SAGA Philosophy</a:t>
+              <a:t>Pros</a:t>
             </a:r>
           </a:p>
           <a:p>
             <a:pPr lvl="1"/>
             <a:r>
               <a:rPr lang="en-US" dirty="0" smtClean="0"/>
-              <a:t>A Fresh Perspective on Distributed Applications and CI</a:t>
-            </a:r>
-          </a:p>
-          <a:p>
-            <a:r>
-              <a:rPr lang="en-US" dirty="0" smtClean="0"/>
-              <a:t>SAGA in a Nutshell</a:t>
+              <a:t>Replication</a:t>
             </a:r>
           </a:p>
           <a:p>
             <a:pPr lvl="1"/>
             <a:r>
               <a:rPr lang="en-US" dirty="0" smtClean="0"/>
-              <a:t>SAGA Landscape</a:t>
+              <a:t>Fault tolerance</a:t>
             </a:r>
           </a:p>
           <a:p>
             <a:pPr lvl="1"/>
             <a:r>
               <a:rPr lang="en-US" dirty="0" smtClean="0"/>
-              <a:t>Individual APIs</a:t>
+              <a:t>Capability to handle data dependencies </a:t>
+            </a:r>
+          </a:p>
+          <a:p>
+            <a:r>
+              <a:rPr lang="en-US" dirty="0" smtClean="0"/>
+              <a:t>Cons</a:t>
             </a:r>
           </a:p>
           <a:p>
             <a:pPr lvl="1"/>
             <a:r>
               <a:rPr lang="en-US" dirty="0" smtClean="0"/>
-              <a:t>OGF standard</a:t>
-            </a:r>
-          </a:p>
-          <a:p>
-            <a:r>
-              <a:rPr lang="en-US" dirty="0" smtClean="0"/>
-              <a:t>SAGA in action</a:t>
+              <a:t>Overhead</a:t>
             </a:r>
           </a:p>
           <a:p>
             <a:pPr lvl="1"/>
             <a:r>
               <a:rPr lang="en-US" dirty="0" smtClean="0"/>
-              <a:t>Applications</a:t>
-            </a:r>
-          </a:p>
-          <a:p>
-            <a:pPr lvl="1"/>
-            <a:r>
-              <a:rPr lang="en-US" dirty="0" smtClean="0"/>
-              <a:t>Tools, Frameworks, Gateways, Access Layers..</a:t>
-            </a:r>
-          </a:p>
-          <a:p>
-            <a:r>
-              <a:rPr lang="en-US" dirty="0" smtClean="0"/>
-              <a:t>Uptake and Roadmap</a:t>
+              <a:t>Inability to control work placement</a:t>
+            </a:r>
+          </a:p>
+          <a:p>
+            <a:r>
+              <a:rPr lang="en-US" dirty="0" smtClean="0"/>
+              <a:t>Is it worth it to use a distributed filesystem?</a:t>
+            </a:r>
+          </a:p>
+          <a:p>
+            <a:r>
+              <a:rPr lang="en-US" dirty="0" smtClean="0"/>
+              <a:t>What does a distributed filesystem worry about?</a:t>
             </a:r>
           </a:p>
         </p:txBody>
@@ -6564,6 +6968,411 @@
       </p:grpSpPr>
       <p:sp>
         <p:nvSpPr>
+          <p:cNvPr id="2" name="Title 1"/>
+          <p:cNvSpPr>
+            <a:spLocks noGrp="1"/>
+          </p:cNvSpPr>
+          <p:nvPr>
+            <p:ph type="title"/>
+          </p:nvPr>
+        </p:nvSpPr>
+        <p:spPr/>
+        <p:txBody>
+          <a:bodyPr/>
+          <a:lstStyle/>
+          <a:p>
+            <a:r>
+              <a:rPr lang="en-US" dirty="0" smtClean="0"/>
+              <a:t>Results from DFS tests</a:t>
+            </a:r>
+            <a:endParaRPr lang="en-US" dirty="0"/>
+          </a:p>
+        </p:txBody>
+      </p:sp>
+      <p:sp>
+        <p:nvSpPr>
+          <p:cNvPr id="3" name="Content Placeholder 2"/>
+          <p:cNvSpPr>
+            <a:spLocks noGrp="1"/>
+          </p:cNvSpPr>
+          <p:nvPr>
+            <p:ph idx="1"/>
+          </p:nvPr>
+        </p:nvSpPr>
+        <p:spPr>
+          <a:xfrm>
+            <a:off x="471076" y="1529880"/>
+            <a:ext cx="3195489" cy="4608884"/>
+          </a:xfrm>
+        </p:spPr>
+        <p:txBody>
+          <a:bodyPr>
+            <a:normAutofit/>
+          </a:bodyPr>
+          <a:lstStyle/>
+          <a:p>
+            <a:r>
+              <a:rPr lang="en-US" dirty="0" smtClean="0"/>
+              <a:t>Read 2.3 Gigabytes</a:t>
+            </a:r>
+          </a:p>
+          <a:p>
+            <a:r>
+              <a:rPr lang="en-US" dirty="0" smtClean="0"/>
+              <a:t>No Coordination</a:t>
+            </a:r>
+          </a:p>
+          <a:p>
+            <a:r>
+              <a:rPr lang="en-US" dirty="0" smtClean="0"/>
+              <a:t>Handled Multiple Requests</a:t>
+            </a:r>
+          </a:p>
+          <a:p>
+            <a:r>
+              <a:rPr lang="en-US" dirty="0" smtClean="0"/>
+              <a:t>Some overhead for multiple dataservers in filesystem</a:t>
+            </a:r>
+          </a:p>
+        </p:txBody>
+      </p:sp>
+      <p:graphicFrame>
+        <p:nvGraphicFramePr>
+          <p:cNvPr id="5" name="Chart 4"/>
+          <p:cNvGraphicFramePr/>
+          <p:nvPr/>
+        </p:nvGraphicFramePr>
+        <p:xfrm>
+          <a:off x="3478306" y="1362075"/>
+          <a:ext cx="5460627" cy="4527737"/>
+        </p:xfrm>
+        <a:graphic>
+          <a:graphicData uri="http://schemas.openxmlformats.org/drawingml/2006/chart">
+            <c:chart xmlns:c="http://schemas.openxmlformats.org/drawingml/2006/chart" xmlns:r="http://schemas.openxmlformats.org/officeDocument/2006/relationships" r:id="rId3"/>
+          </a:graphicData>
+        </a:graphic>
+      </p:graphicFrame>
+    </p:spTree>
+  </p:cSld>
+  <p:clrMapOvr>
+    <a:masterClrMapping/>
+  </p:clrMapOvr>
+  <p:timing>
+    <p:tnLst>
+      <p:par>
+        <p:cTn id="1" dur="indefinite" restart="never" nodeType="tmRoot"/>
+      </p:par>
+    </p:tnLst>
+  </p:timing>
+</p:sld>
+</file>
+
+<file path=ppt/slides/slide15.xml><?xml version="1.0" encoding="utf-8"?>
+<p:sld xmlns:a="http://schemas.openxmlformats.org/drawingml/2006/main" xmlns:r="http://schemas.openxmlformats.org/officeDocument/2006/relationships" xmlns:p="http://schemas.openxmlformats.org/presentationml/2006/main">
+  <p:cSld>
+    <p:spTree>
+      <p:nvGrpSpPr>
+        <p:cNvPr id="1" name=""/>
+        <p:cNvGrpSpPr/>
+        <p:nvPr/>
+      </p:nvGrpSpPr>
+      <p:grpSpPr>
+        <a:xfrm>
+          <a:off x="0" y="0"/>
+          <a:ext cx="0" cy="0"/>
+          <a:chOff x="0" y="0"/>
+          <a:chExt cx="0" cy="0"/>
+        </a:xfrm>
+      </p:grpSpPr>
+      <p:sp>
+        <p:nvSpPr>
+          <p:cNvPr id="2" name="Title 1"/>
+          <p:cNvSpPr>
+            <a:spLocks noGrp="1"/>
+          </p:cNvSpPr>
+          <p:nvPr>
+            <p:ph type="title"/>
+          </p:nvPr>
+        </p:nvSpPr>
+        <p:spPr/>
+        <p:txBody>
+          <a:bodyPr/>
+          <a:lstStyle/>
+          <a:p>
+            <a:r>
+              <a:rPr lang="en-US" dirty="0" smtClean="0"/>
+              <a:t>Recap</a:t>
+            </a:r>
+            <a:endParaRPr lang="en-US" dirty="0"/>
+          </a:p>
+        </p:txBody>
+      </p:sp>
+      <p:sp>
+        <p:nvSpPr>
+          <p:cNvPr id="3" name="Content Placeholder 2"/>
+          <p:cNvSpPr>
+            <a:spLocks noGrp="1"/>
+          </p:cNvSpPr>
+          <p:nvPr>
+            <p:ph idx="1"/>
+          </p:nvPr>
+        </p:nvSpPr>
+        <p:spPr/>
+        <p:txBody>
+          <a:bodyPr>
+            <a:normAutofit/>
+          </a:bodyPr>
+          <a:lstStyle/>
+          <a:p>
+            <a:r>
+              <a:rPr lang="en-US" dirty="0" err="1" smtClean="0"/>
+              <a:t>AllPairs</a:t>
+            </a:r>
+            <a:endParaRPr lang="en-US" dirty="0" smtClean="0"/>
+          </a:p>
+          <a:p>
+            <a:pPr lvl="1"/>
+            <a:r>
+              <a:rPr lang="en-US" dirty="0" smtClean="0"/>
+              <a:t>Application framework to create an n by m comparison matrix</a:t>
+            </a:r>
+          </a:p>
+          <a:p>
+            <a:pPr lvl="1"/>
+            <a:r>
+              <a:rPr lang="en-US" dirty="0" smtClean="0"/>
+              <a:t>Data intensive</a:t>
+            </a:r>
+          </a:p>
+          <a:p>
+            <a:r>
+              <a:rPr lang="en-US" dirty="0" smtClean="0"/>
+              <a:t>Models used today</a:t>
+            </a:r>
+          </a:p>
+          <a:p>
+            <a:pPr lvl="1"/>
+            <a:r>
+              <a:rPr lang="en-US" dirty="0" smtClean="0"/>
+              <a:t>Distributed Filesystem</a:t>
+            </a:r>
+          </a:p>
+          <a:p>
+            <a:pPr lvl="1"/>
+            <a:r>
+              <a:rPr lang="en-US" dirty="0" smtClean="0"/>
+              <a:t>Distributed</a:t>
+            </a:r>
+          </a:p>
+          <a:p>
+            <a:pPr lvl="2"/>
+            <a:r>
+              <a:rPr lang="en-US" dirty="0" smtClean="0"/>
+              <a:t>Conventional</a:t>
+            </a:r>
+          </a:p>
+          <a:p>
+            <a:pPr lvl="2"/>
+            <a:r>
+              <a:rPr lang="en-US" dirty="0" smtClean="0"/>
+              <a:t>Intelligent</a:t>
+            </a:r>
+          </a:p>
+        </p:txBody>
+      </p:sp>
+    </p:spTree>
+  </p:cSld>
+  <p:clrMapOvr>
+    <a:masterClrMapping/>
+  </p:clrMapOvr>
+  <p:timing>
+    <p:tnLst>
+      <p:par>
+        <p:cTn id="1" dur="indefinite" restart="never" nodeType="tmRoot"/>
+      </p:par>
+    </p:tnLst>
+  </p:timing>
+</p:sld>
+</file>
+
+<file path=ppt/slides/slide16.xml><?xml version="1.0" encoding="utf-8"?>
+<p:sld xmlns:a="http://schemas.openxmlformats.org/drawingml/2006/main" xmlns:r="http://schemas.openxmlformats.org/officeDocument/2006/relationships" xmlns:p="http://schemas.openxmlformats.org/presentationml/2006/main">
+  <p:cSld>
+    <p:spTree>
+      <p:nvGrpSpPr>
+        <p:cNvPr id="1" name=""/>
+        <p:cNvGrpSpPr/>
+        <p:nvPr/>
+      </p:nvGrpSpPr>
+      <p:grpSpPr>
+        <a:xfrm>
+          <a:off x="0" y="0"/>
+          <a:ext cx="0" cy="0"/>
+          <a:chOff x="0" y="0"/>
+          <a:chExt cx="0" cy="0"/>
+        </a:xfrm>
+      </p:grpSpPr>
+      <p:sp>
+        <p:nvSpPr>
+          <p:cNvPr id="2" name="Title 1"/>
+          <p:cNvSpPr>
+            <a:spLocks noGrp="1"/>
+          </p:cNvSpPr>
+          <p:nvPr>
+            <p:ph type="title"/>
+          </p:nvPr>
+        </p:nvSpPr>
+        <p:spPr/>
+        <p:txBody>
+          <a:bodyPr/>
+          <a:lstStyle/>
+          <a:p>
+            <a:r>
+              <a:rPr lang="en-US" dirty="0" smtClean="0"/>
+              <a:t>Conclusions</a:t>
+            </a:r>
+            <a:endParaRPr lang="en-US" dirty="0"/>
+          </a:p>
+        </p:txBody>
+      </p:sp>
+      <p:sp>
+        <p:nvSpPr>
+          <p:cNvPr id="3" name="Content Placeholder 2"/>
+          <p:cNvSpPr>
+            <a:spLocks noGrp="1"/>
+          </p:cNvSpPr>
+          <p:nvPr>
+            <p:ph idx="1"/>
+          </p:nvPr>
+        </p:nvSpPr>
+        <p:spPr/>
+        <p:txBody>
+          <a:bodyPr>
+            <a:normAutofit/>
+          </a:bodyPr>
+          <a:lstStyle/>
+          <a:p>
+            <a:r>
+              <a:rPr lang="en-US" dirty="0" smtClean="0"/>
+              <a:t>Data intensive applications need overhead for efficiency</a:t>
+            </a:r>
+          </a:p>
+          <a:p>
+            <a:pPr lvl="1"/>
+            <a:r>
+              <a:rPr lang="en-US" dirty="0" smtClean="0"/>
+              <a:t>Distributed Filesystem Model</a:t>
+            </a:r>
+          </a:p>
+          <a:p>
+            <a:pPr lvl="1"/>
+            <a:r>
+              <a:rPr lang="en-US" dirty="0" smtClean="0"/>
+              <a:t>Intelligent Distributed Model</a:t>
+            </a:r>
+          </a:p>
+          <a:p>
+            <a:r>
+              <a:rPr lang="en-US" dirty="0" smtClean="0"/>
+              <a:t>We were able to improve performance up to </a:t>
+            </a:r>
+            <a:r>
+              <a:rPr lang="en-US" dirty="0" smtClean="0">
+                <a:solidFill>
+                  <a:srgbClr val="FF0000"/>
+                </a:solidFill>
+              </a:rPr>
+              <a:t>??%</a:t>
+            </a:r>
+            <a:r>
+              <a:rPr lang="en-US" dirty="0" smtClean="0">
+                <a:solidFill>
+                  <a:schemeClr val="tx1"/>
+                </a:solidFill>
+              </a:rPr>
+              <a:t> </a:t>
+            </a:r>
+            <a:r>
+              <a:rPr lang="en-US" dirty="0" smtClean="0"/>
+              <a:t>on some cases</a:t>
+            </a:r>
+          </a:p>
+          <a:p>
+            <a:r>
+              <a:rPr lang="en-US" dirty="0" smtClean="0"/>
+              <a:t>Distributed filesystems should also be able to move work around the data</a:t>
+            </a:r>
+          </a:p>
+          <a:p>
+            <a:r>
+              <a:rPr lang="en-US" dirty="0" smtClean="0"/>
+              <a:t>More distribution does not always improve performance</a:t>
+            </a:r>
+          </a:p>
+          <a:p>
+            <a:pPr lvl="1"/>
+            <a:r>
+              <a:rPr lang="en-US" dirty="0" smtClean="0"/>
+              <a:t>Amdahl’s Law</a:t>
+            </a:r>
+          </a:p>
+          <a:p>
+            <a:pPr lvl="2"/>
+            <a:r>
+              <a:rPr lang="en-US" sz="2000" dirty="0" smtClean="0">
+                <a:solidFill>
+                  <a:schemeClr val="tx1">
+                    <a:lumMod val="65000"/>
+                    <a:lumOff val="35000"/>
+                  </a:schemeClr>
+                </a:solidFill>
+              </a:rPr>
+              <a:t>Work takes a specified amount of time</a:t>
+            </a:r>
+          </a:p>
+          <a:p>
+            <a:pPr lvl="1"/>
+            <a:r>
+              <a:rPr lang="en-US" dirty="0" smtClean="0"/>
+              <a:t>Network latency and data/work transfers</a:t>
+            </a:r>
+          </a:p>
+        </p:txBody>
+      </p:sp>
+    </p:spTree>
+  </p:cSld>
+  <p:clrMapOvr>
+    <a:masterClrMapping/>
+  </p:clrMapOvr>
+  <p:timing>
+    <p:tnLst>
+      <p:par>
+        <p:cTn id="1" dur="indefinite" restart="never" nodeType="tmRoot"/>
+      </p:par>
+    </p:tnLst>
+  </p:timing>
+</p:sld>
+</file>
+
+<file path=ppt/slides/slide17.xml><?xml version="1.0" encoding="utf-8"?>
+<p:sld xmlns:a="http://schemas.openxmlformats.org/drawingml/2006/main" xmlns:r="http://schemas.openxmlformats.org/officeDocument/2006/relationships" xmlns:p="http://schemas.openxmlformats.org/presentationml/2006/main">
+  <p:cSld>
+    <p:spTree>
+      <p:nvGrpSpPr>
+        <p:cNvPr id="1" name=""/>
+        <p:cNvGrpSpPr/>
+        <p:nvPr/>
+      </p:nvGrpSpPr>
+      <p:grpSpPr>
+        <a:xfrm>
+          <a:off x="0" y="0"/>
+          <a:ext cx="0" cy="0"/>
+          <a:chOff x="0" y="0"/>
+          <a:chExt cx="0" cy="0"/>
+        </a:xfrm>
+      </p:grpSpPr>
+      <p:sp>
+        <p:nvSpPr>
           <p:cNvPr id="68610" name="Title 1"/>
           <p:cNvSpPr>
             <a:spLocks noGrp="1"/>
@@ -6586,7 +7395,6 @@
               <a:rPr lang="en-US" dirty="0" smtClean="0"/>
               <a:t>Questions Remaining</a:t>
             </a:r>
-            <a:endParaRPr lang="en-US" dirty="0" smtClean="0"/>
           </a:p>
         </p:txBody>
       </p:sp>
@@ -6689,14 +7497,6 @@
               </a:rPr>
               <a:t>How does this knowledge apply differently to clusters, grids, and clouds?</a:t>
             </a:r>
-            <a:endParaRPr lang="en-US" sz="2000" dirty="0" smtClean="0">
-              <a:solidFill>
-                <a:schemeClr val="tx1">
-                  <a:lumMod val="65000"/>
-                  <a:lumOff val="35000"/>
-                </a:schemeClr>
-              </a:solidFill>
-            </a:endParaRPr>
           </a:p>
         </p:txBody>
       </p:sp>
@@ -6705,6 +7505,13 @@
   <p:clrMapOvr>
     <a:masterClrMapping/>
   </p:clrMapOvr>
+  <p:timing>
+    <p:tnLst>
+      <p:par>
+        <p:cTn id="1" dur="indefinite" restart="never" nodeType="tmRoot"/>
+      </p:par>
+    </p:tnLst>
+  </p:timing>
 </p:sld>
 </file>
 
@@ -6737,12 +7544,14 @@
         </p:nvSpPr>
         <p:spPr/>
         <p:txBody>
-          <a:bodyPr/>
-          <a:lstStyle/>
-          <a:p>
-            <a:r>
-              <a:rPr lang="en-US" dirty="0" smtClean="0"/>
-              <a:t>Central Model</a:t>
+          <a:bodyPr>
+            <a:normAutofit fontScale="90000"/>
+          </a:bodyPr>
+          <a:lstStyle/>
+          <a:p>
+            <a:r>
+              <a:rPr lang="en-US" dirty="0" smtClean="0"/>
+              <a:t>SAGA – Simple API for Grid Applications</a:t>
             </a:r>
             <a:endParaRPr lang="en-US" dirty="0"/>
           </a:p>
@@ -6767,45 +7576,61 @@
           <a:p>
             <a:r>
               <a:rPr lang="en-US" dirty="0" smtClean="0"/>
-              <a:t>Model traditionally used</a:t>
-            </a:r>
-          </a:p>
-          <a:p>
-            <a:r>
-              <a:rPr lang="en-US" dirty="0" smtClean="0"/>
-              <a:t>Data at central site</a:t>
-            </a:r>
-          </a:p>
-          <a:p>
-            <a:r>
-              <a:rPr lang="en-US" dirty="0" smtClean="0"/>
-              <a:t>Task mapped to resources</a:t>
-            </a:r>
-          </a:p>
-          <a:p>
-            <a:r>
-              <a:rPr lang="en-US" dirty="0" smtClean="0"/>
-              <a:t>Data Access	</a:t>
+              <a:t>The SAGA Philosophy</a:t>
             </a:r>
           </a:p>
           <a:p>
             <a:pPr lvl="1"/>
             <a:r>
               <a:rPr lang="en-US" dirty="0" smtClean="0"/>
-              <a:t>Resource request data from central site</a:t>
+              <a:t>A Fresh Perspective on Distributed Applications and CI</a:t>
+            </a:r>
+          </a:p>
+          <a:p>
+            <a:r>
+              <a:rPr lang="en-US" dirty="0" smtClean="0"/>
+              <a:t>SAGA in a Nutshell</a:t>
             </a:r>
           </a:p>
           <a:p>
             <a:pPr lvl="1"/>
             <a:r>
               <a:rPr lang="en-US" dirty="0" smtClean="0"/>
-              <a:t>Data is staged for use by resource</a:t>
-            </a:r>
-          </a:p>
-          <a:p>
-            <a:r>
-              <a:rPr lang="en-US" dirty="0" smtClean="0"/>
-              <a:t>Compute assumed large, data I/O assumed small</a:t>
+              <a:t>SAGA Landscape</a:t>
+            </a:r>
+          </a:p>
+          <a:p>
+            <a:pPr lvl="1"/>
+            <a:r>
+              <a:rPr lang="en-US" dirty="0" smtClean="0"/>
+              <a:t>Individual APIs</a:t>
+            </a:r>
+          </a:p>
+          <a:p>
+            <a:pPr lvl="1"/>
+            <a:r>
+              <a:rPr lang="en-US" dirty="0" smtClean="0"/>
+              <a:t>OGF standard</a:t>
+            </a:r>
+          </a:p>
+          <a:p>
+            <a:r>
+              <a:rPr lang="en-US" dirty="0" smtClean="0"/>
+              <a:t>SAGA in action</a:t>
+            </a:r>
+          </a:p>
+          <a:p>
+            <a:pPr lvl="1"/>
+            <a:r>
+              <a:rPr lang="en-US" dirty="0" smtClean="0"/>
+              <a:t>Applications</a:t>
+            </a:r>
+          </a:p>
+          <a:p>
+            <a:pPr lvl="1"/>
+            <a:r>
+              <a:rPr lang="en-US" dirty="0" smtClean="0"/>
+              <a:t>Tools, Frameworks, Gateways, Access Layers..</a:t>
             </a:r>
           </a:p>
         </p:txBody>
@@ -6854,89 +7679,57 @@
         </p:nvSpPr>
         <p:spPr/>
         <p:txBody>
-          <a:bodyPr/>
-          <a:lstStyle/>
-          <a:p>
-            <a:r>
-              <a:rPr lang="en-US" dirty="0" smtClean="0"/>
-              <a:t>Distributed Model</a:t>
-            </a:r>
-            <a:endParaRPr lang="en-US" dirty="0"/>
-          </a:p>
-        </p:txBody>
-      </p:sp>
-      <p:sp>
-        <p:nvSpPr>
-          <p:cNvPr id="3" name="Content Placeholder 2"/>
-          <p:cNvSpPr>
-            <a:spLocks noGrp="1"/>
-          </p:cNvSpPr>
-          <p:nvPr>
-            <p:ph idx="1"/>
-          </p:nvPr>
-        </p:nvSpPr>
-        <p:spPr/>
-        <p:txBody>
           <a:bodyPr>
             <a:normAutofit/>
           </a:bodyPr>
           <a:lstStyle/>
           <a:p>
             <a:r>
-              <a:rPr lang="en-US" dirty="0" smtClean="0"/>
-              <a:t>Data is spread over many machines</a:t>
-            </a:r>
-          </a:p>
-          <a:p>
-            <a:r>
-              <a:rPr lang="en-US" dirty="0" smtClean="0"/>
-              <a:t>Data Access</a:t>
-            </a:r>
-          </a:p>
-          <a:p>
-            <a:pPr lvl="1"/>
-            <a:r>
-              <a:rPr lang="en-US" dirty="0" smtClean="0"/>
-              <a:t>Resources share data with other </a:t>
-            </a:r>
-            <a:r>
-              <a:rPr lang="en-US" dirty="0" smtClean="0"/>
-              <a:t>resources</a:t>
+              <a:rPr lang="en-US" dirty="0" err="1" smtClean="0"/>
+              <a:t>AllPairs</a:t>
+            </a:r>
+            <a:endParaRPr lang="en-US" dirty="0"/>
+          </a:p>
+        </p:txBody>
+      </p:sp>
+      <p:sp>
+        <p:nvSpPr>
+          <p:cNvPr id="3" name="Content Placeholder 2"/>
+          <p:cNvSpPr>
+            <a:spLocks noGrp="1"/>
+          </p:cNvSpPr>
+          <p:nvPr>
+            <p:ph idx="1"/>
+          </p:nvPr>
+        </p:nvSpPr>
+        <p:spPr/>
+        <p:txBody>
+          <a:bodyPr>
+            <a:normAutofit/>
+          </a:bodyPr>
+          <a:lstStyle/>
+          <a:p>
+            <a:r>
+              <a:rPr lang="en-US" dirty="0" err="1" smtClean="0"/>
+              <a:t>Yada</a:t>
+            </a:r>
+            <a:r>
+              <a:rPr lang="en-US" dirty="0" smtClean="0"/>
+              <a:t> </a:t>
+            </a:r>
+            <a:r>
+              <a:rPr lang="en-US" dirty="0" err="1" smtClean="0"/>
+              <a:t>yada</a:t>
+            </a:r>
+            <a:r>
+              <a:rPr lang="en-US" dirty="0" smtClean="0"/>
+              <a:t> </a:t>
+            </a:r>
+            <a:r>
+              <a:rPr lang="en-US" smtClean="0"/>
+              <a:t>yada</a:t>
             </a:r>
             <a:endParaRPr lang="en-US" dirty="0" smtClean="0"/>
-          </a:p>
-          <a:p>
-            <a:r>
-              <a:rPr lang="en-US" dirty="0" smtClean="0"/>
-              <a:t>Conventional Model</a:t>
-            </a:r>
-          </a:p>
-          <a:p>
-            <a:pPr lvl="1"/>
-            <a:r>
-              <a:rPr lang="en-US" dirty="0" smtClean="0"/>
-              <a:t>No planning when placing data</a:t>
-            </a:r>
-          </a:p>
-          <a:p>
-            <a:r>
-              <a:rPr lang="en-US" dirty="0" smtClean="0"/>
-              <a:t>Intelligent Model</a:t>
-            </a:r>
-          </a:p>
-          <a:p>
-            <a:pPr lvl="1"/>
-            <a:r>
-              <a:rPr lang="en-US" dirty="0" smtClean="0"/>
-              <a:t>Data is dynamic</a:t>
-            </a:r>
-          </a:p>
-          <a:p>
-            <a:pPr lvl="1"/>
-            <a:r>
-              <a:rPr lang="en-US" dirty="0" smtClean="0"/>
-              <a:t>Task is mapped to a resource based on tasks’ data dependencies</a:t>
-            </a:r>
           </a:p>
         </p:txBody>
       </p:sp>
@@ -6989,7 +7782,7 @@
           <a:p>
             <a:r>
               <a:rPr lang="en-US" dirty="0" smtClean="0"/>
-              <a:t>Central vs. Distributed</a:t>
+              <a:t>Central Model</a:t>
             </a:r>
             <a:endParaRPr lang="en-US" dirty="0"/>
           </a:p>
@@ -7014,58 +7807,38 @@
           <a:p>
             <a:r>
               <a:rPr lang="en-US" dirty="0" smtClean="0"/>
-              <a:t>Central</a:t>
+              <a:t>Model traditionally used</a:t>
+            </a:r>
+          </a:p>
+          <a:p>
+            <a:r>
+              <a:rPr lang="en-US" dirty="0" smtClean="0"/>
+              <a:t>Data at central site</a:t>
+            </a:r>
+          </a:p>
+          <a:p>
+            <a:r>
+              <a:rPr lang="en-US" dirty="0" smtClean="0"/>
+              <a:t>Data Access	</a:t>
             </a:r>
           </a:p>
           <a:p>
             <a:pPr lvl="1"/>
             <a:r>
               <a:rPr lang="en-US" dirty="0" smtClean="0"/>
-              <a:t>Ignore dependencies</a:t>
-            </a:r>
-          </a:p>
-          <a:p>
-            <a:endParaRPr lang="en-US" dirty="0" smtClean="0"/>
-          </a:p>
-          <a:p>
-            <a:r>
-              <a:rPr lang="en-US" dirty="0" smtClean="0"/>
-              <a:t>Distributed</a:t>
-            </a:r>
-          </a:p>
-          <a:p>
-            <a:pPr lvl="1"/>
-            <a:r>
-              <a:rPr lang="en-US" dirty="0" smtClean="0"/>
-              <a:t>Conventional</a:t>
-            </a:r>
-          </a:p>
-          <a:p>
-            <a:pPr lvl="2"/>
-            <a:r>
-              <a:rPr lang="en-US" dirty="0" smtClean="0"/>
-              <a:t>Removes central dependency</a:t>
-            </a:r>
-          </a:p>
-          <a:p>
-            <a:pPr lvl="2"/>
-            <a:r>
-              <a:rPr lang="en-US" dirty="0" smtClean="0"/>
-              <a:t>Ignore dependencies</a:t>
-            </a:r>
-          </a:p>
-          <a:p>
-            <a:pPr lvl="1"/>
-            <a:r>
-              <a:rPr lang="en-US" dirty="0" smtClean="0"/>
-              <a:t>Intelligent</a:t>
-            </a:r>
-          </a:p>
-          <a:p>
-            <a:pPr lvl="2"/>
-            <a:r>
-              <a:rPr lang="en-US" dirty="0" smtClean="0"/>
-              <a:t>Utilize knowledge of network latency and data dependencies</a:t>
+              <a:t>Resource requests data from central site</a:t>
+            </a:r>
+          </a:p>
+          <a:p>
+            <a:r>
+              <a:rPr lang="en-US" dirty="0" smtClean="0"/>
+              <a:t>Compute assumed large, data I/O assumed small</a:t>
+            </a:r>
+          </a:p>
+          <a:p>
+            <a:r>
+              <a:rPr lang="en-US" dirty="0" smtClean="0"/>
+              <a:t>Bottleneck forms when data becomes larger</a:t>
             </a:r>
           </a:p>
         </p:txBody>
@@ -7119,15 +7892,7 @@
           <a:p>
             <a:r>
               <a:rPr lang="en-US" dirty="0" smtClean="0"/>
-              <a:t>Distributed </a:t>
-            </a:r>
-            <a:r>
-              <a:rPr lang="en-US" dirty="0" err="1" smtClean="0"/>
-              <a:t>Filesystem</a:t>
-            </a:r>
-            <a:r>
-              <a:rPr lang="en-US" dirty="0" smtClean="0"/>
-              <a:t> Model</a:t>
+              <a:t>Distributed Model</a:t>
             </a:r>
             <a:endParaRPr lang="en-US" dirty="0"/>
           </a:p>
@@ -7152,55 +7917,53 @@
           <a:p>
             <a:r>
               <a:rPr lang="en-US" dirty="0" smtClean="0"/>
-              <a:t>Abstract layer between application and local </a:t>
-            </a:r>
-            <a:r>
-              <a:rPr lang="en-US" dirty="0" err="1" smtClean="0"/>
-              <a:t>filesystems</a:t>
-            </a:r>
-            <a:endParaRPr lang="en-US" dirty="0" smtClean="0"/>
+              <a:t>Data is spread over many machines</a:t>
+            </a:r>
+          </a:p>
+          <a:p>
+            <a:r>
+              <a:rPr lang="en-US" dirty="0" smtClean="0"/>
+              <a:t>Data Access</a:t>
+            </a:r>
           </a:p>
           <a:p>
             <a:pPr lvl="1"/>
             <a:r>
-              <a:rPr lang="en-US" dirty="0" err="1" smtClean="0"/>
-              <a:t>HadoopFS</a:t>
-            </a:r>
-            <a:endParaRPr lang="en-US" dirty="0" smtClean="0"/>
+              <a:rPr lang="en-US" dirty="0" smtClean="0"/>
+              <a:t>Resources share data with other resources</a:t>
+            </a:r>
+          </a:p>
+          <a:p>
+            <a:r>
+              <a:rPr lang="en-US" dirty="0" smtClean="0"/>
+              <a:t>Conventional Model</a:t>
+            </a:r>
           </a:p>
           <a:p>
             <a:pPr lvl="1"/>
             <a:r>
-              <a:rPr lang="en-US" dirty="0" err="1" smtClean="0"/>
-              <a:t>KosmosFS</a:t>
-            </a:r>
-            <a:endParaRPr lang="en-US" dirty="0" smtClean="0"/>
+              <a:rPr lang="en-US" dirty="0" smtClean="0"/>
+              <a:t>No planning when placing data</a:t>
+            </a:r>
+          </a:p>
+          <a:p>
+            <a:r>
+              <a:rPr lang="en-US" dirty="0" smtClean="0"/>
+              <a:t>Intelligent Model</a:t>
+            </a:r>
           </a:p>
           <a:p>
             <a:pPr lvl="1"/>
             <a:r>
               <a:rPr lang="en-US" dirty="0" smtClean="0"/>
-              <a:t>GFS</a:t>
-            </a:r>
-          </a:p>
-          <a:p>
-            <a:r>
-              <a:rPr lang="en-US" dirty="0" smtClean="0"/>
-              <a:t>Encapsulates Handling Data</a:t>
+              <a:t>Data is dynamic</a:t>
             </a:r>
           </a:p>
           <a:p>
             <a:pPr lvl="1"/>
             <a:r>
               <a:rPr lang="en-US" dirty="0" smtClean="0"/>
-              <a:t>Handles data displacement</a:t>
-            </a:r>
-          </a:p>
-          <a:p>
-            <a:pPr lvl="1"/>
-            <a:r>
-              <a:rPr lang="en-US" dirty="0" smtClean="0"/>
-              <a:t>Handles data requests</a:t>
+              <a:t>Task is mapped to a resource based on tasks’ data dependencies</a:t>
             </a:r>
           </a:p>
         </p:txBody>
@@ -7254,7 +8017,7 @@
           <a:p>
             <a:r>
               <a:rPr lang="en-US" dirty="0" smtClean="0"/>
-              <a:t>Results from Comparative Tests</a:t>
+              <a:t>Central vs. Distributed</a:t>
             </a:r>
             <a:endParaRPr lang="en-US" dirty="0"/>
           </a:p>
@@ -7270,12 +8033,7 @@
             <p:ph idx="1"/>
           </p:nvPr>
         </p:nvSpPr>
-        <p:spPr>
-          <a:xfrm>
-            <a:off x="757947" y="1529880"/>
-            <a:ext cx="4797464" cy="4608884"/>
-          </a:xfrm>
-        </p:spPr>
+        <p:spPr/>
         <p:txBody>
           <a:bodyPr>
             <a:normAutofit/>
@@ -7284,49 +8042,59 @@
           <a:p>
             <a:r>
               <a:rPr lang="en-US" dirty="0" smtClean="0"/>
-              <a:t>Intelligence is worth the overhead</a:t>
-            </a:r>
-          </a:p>
-          <a:p>
-            <a:r>
-              <a:rPr lang="en-US" dirty="0" smtClean="0"/>
-              <a:t>Intelligence ~1% overall time</a:t>
-            </a:r>
-          </a:p>
-          <a:p>
-            <a:r>
-              <a:rPr lang="en-US" dirty="0" smtClean="0"/>
-              <a:t>~40% reduction in overall time!</a:t>
-            </a:r>
-          </a:p>
-          <a:p>
-            <a:r>
-              <a:rPr lang="en-US" dirty="0" smtClean="0"/>
-              <a:t>Very simple intelligence</a:t>
-            </a:r>
-          </a:p>
-        </p:txBody>
-      </p:sp>
-      <p:graphicFrame>
-        <p:nvGraphicFramePr>
-          <p:cNvPr id="162818" name="Object 2"/>
-          <p:cNvGraphicFramePr>
-            <a:graphicFrameLocks noChangeAspect="1"/>
-          </p:cNvGraphicFramePr>
-          <p:nvPr/>
-        </p:nvGraphicFramePr>
-        <p:xfrm>
-          <a:off x="5059392" y="2133600"/>
-          <a:ext cx="3876667" cy="4370289"/>
-        </p:xfrm>
-        <a:graphic>
-          <a:graphicData uri="http://schemas.openxmlformats.org/presentationml/2006/ole">
-            <p:oleObj spid="_x0000_s162818" r:id="rId3" imgW="4426920" imgH="4989600" progId="">
-              <p:embed/>
-            </p:oleObj>
-          </a:graphicData>
-        </a:graphic>
-      </p:graphicFrame>
+              <a:t>Central</a:t>
+            </a:r>
+          </a:p>
+          <a:p>
+            <a:pPr lvl="1"/>
+            <a:r>
+              <a:rPr lang="en-US" dirty="0" smtClean="0"/>
+              <a:t>Ignore dependencies</a:t>
+            </a:r>
+          </a:p>
+          <a:p>
+            <a:r>
+              <a:rPr lang="en-US" dirty="0" smtClean="0"/>
+              <a:t>Distributed</a:t>
+            </a:r>
+          </a:p>
+          <a:p>
+            <a:pPr lvl="1"/>
+            <a:r>
+              <a:rPr lang="en-US" dirty="0" smtClean="0"/>
+              <a:t>Conventional</a:t>
+            </a:r>
+          </a:p>
+          <a:p>
+            <a:pPr lvl="2"/>
+            <a:r>
+              <a:rPr lang="en-US" dirty="0" smtClean="0"/>
+              <a:t>Removes central dependency</a:t>
+            </a:r>
+          </a:p>
+          <a:p>
+            <a:pPr lvl="2"/>
+            <a:r>
+              <a:rPr lang="en-US" dirty="0" smtClean="0"/>
+              <a:t>Ignore dependencies</a:t>
+            </a:r>
+          </a:p>
+          <a:p>
+            <a:pPr lvl="1"/>
+            <a:r>
+              <a:rPr lang="en-US" dirty="0" smtClean="0"/>
+              <a:t>Intelligent</a:t>
+            </a:r>
+          </a:p>
+          <a:p>
+            <a:pPr lvl="2"/>
+            <a:r>
+              <a:rPr lang="en-US" dirty="0" smtClean="0"/>
+              <a:t>Utilize knowledge of network latency and data dependencies</a:t>
+            </a:r>
+          </a:p>
+        </p:txBody>
+      </p:sp>
     </p:spTree>
   </p:cSld>
   <p:clrMapOvr>
@@ -7376,7 +8144,7 @@
           <a:p>
             <a:r>
               <a:rPr lang="en-US" dirty="0" smtClean="0"/>
-              <a:t>Lessons Learned</a:t>
+              <a:t>Results from Comparative Tests</a:t>
             </a:r>
             <a:endParaRPr lang="en-US" dirty="0"/>
           </a:p>
@@ -7392,7 +8160,12 @@
             <p:ph idx="1"/>
           </p:nvPr>
         </p:nvSpPr>
-        <p:spPr/>
+        <p:spPr>
+          <a:xfrm>
+            <a:off x="757947" y="1529880"/>
+            <a:ext cx="4797464" cy="4608884"/>
+          </a:xfrm>
+        </p:spPr>
         <p:txBody>
           <a:bodyPr>
             <a:normAutofit/>
@@ -7401,44 +8174,49 @@
           <a:p>
             <a:r>
               <a:rPr lang="en-US" dirty="0" smtClean="0"/>
-              <a:t>Very simple mechanisms to handle data dependencies can be very effective</a:t>
-            </a:r>
-          </a:p>
-          <a:p>
-            <a:pPr lvl="1"/>
-            <a:r>
-              <a:rPr lang="en-US" dirty="0" smtClean="0"/>
-              <a:t>Ping</a:t>
-            </a:r>
-          </a:p>
-          <a:p>
-            <a:pPr lvl="1"/>
-            <a:r>
-              <a:rPr lang="en-US" dirty="0" smtClean="0"/>
-              <a:t>Small file transfer</a:t>
-            </a:r>
-          </a:p>
-          <a:p>
-            <a:pPr lvl="1"/>
-            <a:r>
-              <a:rPr lang="en-US" dirty="0" smtClean="0"/>
-              <a:t>Number of hops</a:t>
-            </a:r>
-          </a:p>
-          <a:p>
-            <a:r>
-              <a:rPr lang="en-US" dirty="0" smtClean="0"/>
-              <a:t>More complex mechanisms are possible</a:t>
-            </a:r>
-          </a:p>
-          <a:p>
-            <a:r>
-              <a:rPr lang="en-US" dirty="0" smtClean="0"/>
-              <a:t>Ignoring data dependencies is no longer an option</a:t>
-            </a:r>
-          </a:p>
-        </p:txBody>
-      </p:sp>
+              <a:t>Intelligence is worth the overhead</a:t>
+            </a:r>
+          </a:p>
+          <a:p>
+            <a:r>
+              <a:rPr lang="en-US" dirty="0" smtClean="0"/>
+              <a:t>Intelligence ~1% overall time</a:t>
+            </a:r>
+          </a:p>
+          <a:p>
+            <a:r>
+              <a:rPr lang="en-US" dirty="0" smtClean="0"/>
+              <a:t>~40% reduction in overall time!</a:t>
+            </a:r>
+          </a:p>
+          <a:p>
+            <a:r>
+              <a:rPr lang="en-US" dirty="0" smtClean="0"/>
+              <a:t>Very simple intelligence</a:t>
+            </a:r>
+          </a:p>
+        </p:txBody>
+      </p:sp>
+      <p:graphicFrame>
+        <p:nvGraphicFramePr>
+          <p:cNvPr id="162818" name="Object 2"/>
+          <p:cNvGraphicFramePr>
+            <a:graphicFrameLocks noChangeAspect="1"/>
+          </p:cNvGraphicFramePr>
+          <p:nvPr/>
+        </p:nvGraphicFramePr>
+        <p:xfrm>
+          <a:off x="5059392" y="2133600"/>
+          <a:ext cx="3876667" cy="4370289"/>
+        </p:xfrm>
+        <a:graphic>
+          <a:graphicData uri="http://schemas.openxmlformats.org/presentationml/2006/ole">
+            <p:oleObj spid="_x0000_s162818" r:id="rId3" imgW="5190840" imgH="5847840" progId="">
+              <p:embed/>
+            </p:oleObj>
+          </a:graphicData>
+        </a:graphic>
+      </p:graphicFrame>
     </p:spTree>
   </p:cSld>
   <p:clrMapOvr>
@@ -7484,20 +8262,13 @@
         <p:spPr/>
         <p:txBody>
           <a:bodyPr>
-            <a:normAutofit fontScale="90000"/>
+            <a:normAutofit/>
           </a:bodyPr>
           <a:lstStyle/>
           <a:p>
             <a:r>
               <a:rPr lang="en-US" dirty="0" smtClean="0"/>
-              <a:t>Results from Distributed Model</a:t>
-            </a:r>
-            <a:br>
-              <a:rPr lang="en-US" dirty="0" smtClean="0"/>
-            </a:br>
-            <a:r>
-              <a:rPr lang="en-US" dirty="0" smtClean="0"/>
-              <a:t>(Conventional)</a:t>
+              <a:t>Distributed Model (Conventional)</a:t>
             </a:r>
             <a:endParaRPr lang="en-US" dirty="0"/>
           </a:p>
@@ -7527,81 +8298,45 @@
           <a:p>
             <a:r>
               <a:rPr lang="en-US" dirty="0" smtClean="0"/>
-              <a:t>Results go here</a:t>
-            </a:r>
-          </a:p>
-          <a:p>
-            <a:r>
-              <a:rPr lang="en-US" dirty="0" smtClean="0"/>
-              <a:t>…</a:t>
-            </a:r>
-          </a:p>
-          <a:p>
-            <a:r>
-              <a:rPr lang="en-US" dirty="0" smtClean="0"/>
-              <a:t>Some more comments</a:t>
-            </a:r>
+              <a:t>Times decrease with respect to number of workers</a:t>
+            </a:r>
+          </a:p>
+          <a:p>
+            <a:r>
+              <a:rPr lang="en-US" dirty="0" smtClean="0"/>
+              <a:t>Remote data is expensive</a:t>
+            </a:r>
+          </a:p>
+          <a:p>
+            <a:r>
+              <a:rPr lang="en-US" dirty="0" smtClean="0"/>
+              <a:t>Minimum time required to handle requests from same server</a:t>
+            </a:r>
+          </a:p>
+          <a:p>
             <a:endParaRPr lang="en-US" dirty="0" smtClean="0"/>
           </a:p>
-        </p:txBody>
-      </p:sp>
-      <p:sp>
-        <p:nvSpPr>
-          <p:cNvPr id="4" name="Text Box 3"/>
-          <p:cNvSpPr txBox="1">
-            <a:spLocks noChangeArrowheads="1"/>
-          </p:cNvSpPr>
+          <a:p>
+            <a:endParaRPr lang="en-US" dirty="0" smtClean="0"/>
+          </a:p>
+        </p:txBody>
+      </p:sp>
+      <p:graphicFrame>
+        <p:nvGraphicFramePr>
+          <p:cNvPr id="5" name="Chart 4"/>
+          <p:cNvGraphicFramePr/>
           <p:nvPr/>
-        </p:nvSpPr>
-        <p:spPr bwMode="auto">
-          <a:xfrm>
-            <a:off x="4140679" y="1529880"/>
-            <a:ext cx="4525963" cy="5089525"/>
-          </a:xfrm>
-          <a:prstGeom prst="rect">
-            <a:avLst/>
-          </a:prstGeom>
-          <a:noFill/>
-          <a:ln w="9525">
-            <a:noFill/>
-            <a:round/>
-            <a:headEnd/>
-            <a:tailEnd/>
-          </a:ln>
-        </p:spPr>
-        <p:txBody>
-          <a:bodyPr lIns="0" tIns="28224" rIns="0" bIns="0"/>
-          <a:lstStyle/>
-          <a:p>
-            <a:pPr marL="431800" indent="-323850">
-              <a:spcAft>
-                <a:spcPts val="1425"/>
-              </a:spcAft>
-              <a:buSzPct val="45000"/>
-              <a:buFont typeface="Wingdings" charset="2"/>
-              <a:buChar char=""/>
-              <a:tabLst>
-                <a:tab pos="723900" algn="l"/>
-                <a:tab pos="1447800" algn="l"/>
-                <a:tab pos="2171700" algn="l"/>
-                <a:tab pos="2895600" algn="l"/>
-                <a:tab pos="3619500" algn="l"/>
-                <a:tab pos="4343400" algn="l"/>
-              </a:tabLst>
-            </a:pPr>
-            <a:r>
-              <a:rPr lang="en-US" sz="3200" dirty="0">
-                <a:solidFill>
-                  <a:srgbClr val="000000"/>
-                </a:solidFill>
-                <a:ea typeface="DejaVu Sans" charset="0"/>
-                <a:cs typeface="DejaVu Sans" charset="0"/>
-              </a:rPr>
-              <a:t>Graph here</a:t>
-            </a:r>
-          </a:p>
-        </p:txBody>
-      </p:sp>
+        </p:nvGraphicFramePr>
+        <p:xfrm>
+          <a:off x="4140679" y="1529880"/>
+          <a:ext cx="4686300" cy="3856508"/>
+        </p:xfrm>
+        <a:graphic>
+          <a:graphicData uri="http://schemas.openxmlformats.org/drawingml/2006/chart">
+            <c:chart xmlns:c="http://schemas.openxmlformats.org/drawingml/2006/chart" xmlns:r="http://schemas.openxmlformats.org/officeDocument/2006/relationships" r:id="rId2"/>
+          </a:graphicData>
+        </a:graphic>
+      </p:graphicFrame>
     </p:spTree>
   </p:cSld>
   <p:clrMapOvr>
@@ -7647,20 +8382,13 @@
         <p:spPr/>
         <p:txBody>
           <a:bodyPr>
-            <a:normAutofit fontScale="90000"/>
+            <a:normAutofit/>
           </a:bodyPr>
           <a:lstStyle/>
           <a:p>
             <a:r>
               <a:rPr lang="en-US" dirty="0" smtClean="0"/>
-              <a:t>Results from Distributed Model</a:t>
-            </a:r>
-            <a:br>
-              <a:rPr lang="en-US" dirty="0" smtClean="0"/>
-            </a:br>
-            <a:r>
-              <a:rPr lang="en-US" dirty="0" smtClean="0"/>
-              <a:t>(Intelligent)</a:t>
+              <a:t>Distributed Model (Intelligent)</a:t>
             </a:r>
             <a:endParaRPr lang="en-US" dirty="0"/>
           </a:p>
@@ -7704,7 +8432,6 @@
               <a:rPr lang="en-US" dirty="0" smtClean="0"/>
               <a:t>Some more comments</a:t>
             </a:r>
-            <a:endParaRPr lang="en-US" dirty="0" smtClean="0"/>
           </a:p>
         </p:txBody>
       </p:sp>
@@ -8285,275 +9012,4 @@
   </a:objectDefaults>
   <a:extraClrSchemeLst/>
 </a:theme>
-</file>
-
-<file path=ppt/theme/themeOverride1.xml><?xml version="1.0" encoding="utf-8"?>
-<a:themeOverride xmlns:a="http://schemas.openxmlformats.org/drawingml/2006/main">
-  <a:clrScheme name="Aspect">
-    <a:dk1>
-      <a:sysClr val="windowText" lastClr="000000"/>
-    </a:dk1>
-    <a:lt1>
-      <a:sysClr val="window" lastClr="FFFFFF"/>
-    </a:lt1>
-    <a:dk2>
-      <a:srgbClr val="323232"/>
-    </a:dk2>
-    <a:lt2>
-      <a:srgbClr val="E3DED1"/>
-    </a:lt2>
-    <a:accent1>
-      <a:srgbClr val="F07F09"/>
-    </a:accent1>
-    <a:accent2>
-      <a:srgbClr val="9F2936"/>
-    </a:accent2>
-    <a:accent3>
-      <a:srgbClr val="1B587C"/>
-    </a:accent3>
-    <a:accent4>
-      <a:srgbClr val="4E8542"/>
-    </a:accent4>
-    <a:accent5>
-      <a:srgbClr val="604878"/>
-    </a:accent5>
-    <a:accent6>
-      <a:srgbClr val="C19859"/>
-    </a:accent6>
-    <a:hlink>
-      <a:srgbClr val="6B9F25"/>
-    </a:hlink>
-    <a:folHlink>
-      <a:srgbClr val="B26B02"/>
-    </a:folHlink>
-  </a:clrScheme>
-  <a:fontScheme name="Aspect">
-    <a:majorFont>
-      <a:latin typeface="Verdana"/>
-      <a:ea typeface=""/>
-      <a:cs typeface=""/>
-      <a:font script="Jpan" typeface="ＭＳ ゴシック"/>
-      <a:font script="Hang" typeface="굴림"/>
-      <a:font script="Hans" typeface="微软雅黑"/>
-      <a:font script="Hant" typeface="微軟正黑體"/>
-      <a:font script="Arab" typeface="Tahoma"/>
-      <a:font script="Hebr" typeface="Tahoma"/>
-      <a:font script="Thai" typeface="FreesiaUPC"/>
-      <a:font script="Ethi" typeface="Nyala"/>
-      <a:font script="Beng" typeface="Vrinda"/>
-      <a:font script="Gujr" typeface="Shruti"/>
-      <a:font script="Khmr" typeface="DaunPenh"/>
-      <a:font script="Knda" typeface="Tunga"/>
-      <a:font script="Guru" typeface="Raavi"/>
-      <a:font script="Cans" typeface="Euphemia"/>
-      <a:font script="Cher" typeface="Plantagenet Cherokee"/>
-      <a:font script="Yiii" typeface="Microsoft Yi Baiti"/>
-      <a:font script="Tibt" typeface="Microsoft Himalaya"/>
-      <a:font script="Thaa" typeface="MV Boli"/>
-      <a:font script="Deva" typeface="Mangal"/>
-      <a:font script="Telu" typeface="Gautami"/>
-      <a:font script="Taml" typeface="Latha"/>
-      <a:font script="Syrc" typeface="Estrangelo Edessa"/>
-      <a:font script="Orya" typeface="Kalinga"/>
-      <a:font script="Mlym" typeface="Kartika"/>
-      <a:font script="Laoo" typeface="DokChampa"/>
-      <a:font script="Sinh" typeface="Iskoola Pota"/>
-      <a:font script="Mong" typeface="Mongolian Baiti"/>
-      <a:font script="Viet" typeface="Verdana"/>
-      <a:font script="Uigh" typeface="Microsoft Uighur"/>
-    </a:majorFont>
-    <a:minorFont>
-      <a:latin typeface="Verdana"/>
-      <a:ea typeface=""/>
-      <a:cs typeface=""/>
-      <a:font script="Jpan" typeface="ＭＳ ゴシック"/>
-      <a:font script="Hang" typeface="굴림"/>
-      <a:font script="Hans" typeface="微软雅黑"/>
-      <a:font script="Hant" typeface="微軟正黑體"/>
-      <a:font script="Arab" typeface="Tahoma"/>
-      <a:font script="Hebr" typeface="Tahoma"/>
-      <a:font script="Thai" typeface="FreesiaUPC"/>
-      <a:font script="Ethi" typeface="Nyala"/>
-      <a:font script="Beng" typeface="Vrinda"/>
-      <a:font script="Gujr" typeface="Shruti"/>
-      <a:font script="Khmr" typeface="DaunPenh"/>
-      <a:font script="Knda" typeface="Tunga"/>
-      <a:font script="Guru" typeface="Raavi"/>
-      <a:font script="Cans" typeface="Euphemia"/>
-      <a:font script="Cher" typeface="Plantagenet Cherokee"/>
-      <a:font script="Yiii" typeface="Microsoft Yi Baiti"/>
-      <a:font script="Tibt" typeface="Microsoft Himalaya"/>
-      <a:font script="Thaa" typeface="MV Boli"/>
-      <a:font script="Deva" typeface="Mangal"/>
-      <a:font script="Telu" typeface="Gautami"/>
-      <a:font script="Taml" typeface="Latha"/>
-      <a:font script="Syrc" typeface="Estrangelo Edessa"/>
-      <a:font script="Orya" typeface="Kalinga"/>
-      <a:font script="Mlym" typeface="Kartika"/>
-      <a:font script="Laoo" typeface="DokChampa"/>
-      <a:font script="Sinh" typeface="Iskoola Pota"/>
-      <a:font script="Mong" typeface="Mongolian Baiti"/>
-      <a:font script="Viet" typeface="Verdana"/>
-      <a:font script="Uigh" typeface="Microsoft Uighur"/>
-    </a:minorFont>
-  </a:fontScheme>
-  <a:fmtScheme name="Aspect">
-    <a:fillStyleLst>
-      <a:solidFill>
-        <a:schemeClr val="phClr"/>
-      </a:solidFill>
-      <a:gradFill rotWithShape="1">
-        <a:gsLst>
-          <a:gs pos="0">
-            <a:schemeClr val="phClr">
-              <a:tint val="65000"/>
-              <a:satMod val="270000"/>
-            </a:schemeClr>
-          </a:gs>
-          <a:gs pos="25000">
-            <a:schemeClr val="phClr">
-              <a:tint val="60000"/>
-              <a:satMod val="300000"/>
-            </a:schemeClr>
-          </a:gs>
-          <a:gs pos="100000">
-            <a:schemeClr val="phClr">
-              <a:tint val="29000"/>
-              <a:satMod val="400000"/>
-            </a:schemeClr>
-          </a:gs>
-        </a:gsLst>
-        <a:lin ang="16200000" scaled="1"/>
-      </a:gradFill>
-      <a:gradFill rotWithShape="1">
-        <a:gsLst>
-          <a:gs pos="0">
-            <a:schemeClr val="phClr">
-              <a:shade val="45000"/>
-              <a:satMod val="155000"/>
-            </a:schemeClr>
-          </a:gs>
-          <a:gs pos="60000">
-            <a:schemeClr val="phClr">
-              <a:shade val="95000"/>
-              <a:satMod val="150000"/>
-            </a:schemeClr>
-          </a:gs>
-          <a:gs pos="100000">
-            <a:schemeClr val="phClr">
-              <a:tint val="87000"/>
-              <a:satMod val="250000"/>
-            </a:schemeClr>
-          </a:gs>
-        </a:gsLst>
-        <a:lin ang="16200000" scaled="0"/>
-      </a:gradFill>
-    </a:fillStyleLst>
-    <a:lnStyleLst>
-      <a:ln w="9525" cap="flat" cmpd="sng" algn="ctr">
-        <a:solidFill>
-          <a:schemeClr val="phClr">
-            <a:satMod val="150000"/>
-          </a:schemeClr>
-        </a:solidFill>
-        <a:prstDash val="solid"/>
-      </a:ln>
-      <a:ln w="42500" cap="flat" cmpd="sng" algn="ctr">
-        <a:solidFill>
-          <a:schemeClr val="phClr"/>
-        </a:solidFill>
-        <a:prstDash val="solid"/>
-      </a:ln>
-      <a:ln w="38100" cap="flat" cmpd="sng" algn="ctr">
-        <a:solidFill>
-          <a:schemeClr val="phClr"/>
-        </a:solidFill>
-        <a:prstDash val="solid"/>
-      </a:ln>
-    </a:lnStyleLst>
-    <a:effectStyleLst>
-      <a:effectStyle>
-        <a:effectLst>
-          <a:outerShdw blurRad="65500" dist="38100" dir="5400000" rotWithShape="0">
-            <a:srgbClr val="000000">
-              <a:alpha val="40000"/>
-            </a:srgbClr>
-          </a:outerShdw>
-        </a:effectLst>
-      </a:effectStyle>
-      <a:effectStyle>
-        <a:effectLst>
-          <a:outerShdw blurRad="65500" dist="38100" dir="5400000" rotWithShape="0">
-            <a:srgbClr val="000000">
-              <a:alpha val="40000"/>
-            </a:srgbClr>
-          </a:outerShdw>
-        </a:effectLst>
-      </a:effectStyle>
-      <a:effectStyle>
-        <a:effectLst>
-          <a:outerShdw blurRad="65500" dist="38100" dir="5400000" rotWithShape="0">
-            <a:srgbClr val="000000">
-              <a:alpha val="40000"/>
-            </a:srgbClr>
-          </a:outerShdw>
-        </a:effectLst>
-        <a:scene3d>
-          <a:camera prst="orthographicFront" fov="0">
-            <a:rot lat="0" lon="0" rev="0"/>
-          </a:camera>
-          <a:lightRig rig="contrasting" dir="t">
-            <a:rot lat="0" lon="0" rev="12000000"/>
-          </a:lightRig>
-        </a:scene3d>
-        <a:sp3d prstMaterial="powder">
-          <a:bevelT h="50800"/>
-        </a:sp3d>
-      </a:effectStyle>
-    </a:effectStyleLst>
-    <a:bgFillStyleLst>
-      <a:solidFill>
-        <a:schemeClr val="phClr"/>
-      </a:solidFill>
-      <a:gradFill rotWithShape="1">
-        <a:gsLst>
-          <a:gs pos="0">
-            <a:schemeClr val="phClr">
-              <a:shade val="35000"/>
-              <a:satMod val="150000"/>
-            </a:schemeClr>
-          </a:gs>
-          <a:gs pos="45000">
-            <a:schemeClr val="phClr">
-              <a:shade val="68000"/>
-              <a:satMod val="155000"/>
-            </a:schemeClr>
-          </a:gs>
-          <a:gs pos="100000">
-            <a:schemeClr val="phClr">
-              <a:tint val="70000"/>
-              <a:satMod val="175000"/>
-            </a:schemeClr>
-          </a:gs>
-        </a:gsLst>
-        <a:lin ang="16200000" scaled="0"/>
-      </a:gradFill>
-      <a:blipFill>
-        <a:blip xmlns:r="http://schemas.openxmlformats.org/officeDocument/2006/relationships" r:embed="rId1">
-          <a:duotone>
-            <a:schemeClr val="phClr">
-              <a:shade val="800"/>
-              <a:satMod val="150000"/>
-            </a:schemeClr>
-            <a:schemeClr val="phClr">
-              <a:tint val="80000"/>
-              <a:satMod val="150000"/>
-            </a:schemeClr>
-          </a:duotone>
-        </a:blip>
-        <a:tile tx="0" ty="0" sx="75000" sy="75000" flip="none" algn="tl"/>
-      </a:blipFill>
-    </a:bgFillStyleLst>
-  </a:fmtScheme>
-</a:themeOverride>
 </file>
</xml_diff>

<commit_message>
Updates for intelligent data strategies
git-svn-id: file://localhost/tmp/svn2git/svn@2048 defb5e50-622e-49ec-a68e-d72c7db87b45
</commit_message>
<xml_diff>
--- a/papers/data_intensive/eScience09/RoyalSocietyPresentation.pptx
+++ b/papers/data_intensive/eScience09/RoyalSocietyPresentation.pptx
@@ -252,7 +252,7 @@
                   <c:v>1254.4270000000001</c:v>
                 </c:pt>
                 <c:pt idx="2">
-                  <c:v>680.45199999999988</c:v>
+                  <c:v>680.45199999999977</c:v>
                 </c:pt>
                 <c:pt idx="3">
                   <c:v>386.74700000000001</c:v>
@@ -262,11 +262,11 @@
           </c:val>
         </c:ser>
         <c:marker val="1"/>
-        <c:axId val="64211200"/>
-        <c:axId val="64221568"/>
+        <c:axId val="66709760"/>
+        <c:axId val="66724224"/>
       </c:lineChart>
       <c:catAx>
-        <c:axId val="64211200"/>
+        <c:axId val="66709760"/>
         <c:scaling>
           <c:orientation val="minMax"/>
         </c:scaling>
@@ -290,14 +290,14 @@
           <c:layout/>
         </c:title>
         <c:tickLblPos val="nextTo"/>
-        <c:crossAx val="64221568"/>
+        <c:crossAx val="66724224"/>
         <c:crosses val="autoZero"/>
         <c:auto val="1"/>
         <c:lblAlgn val="ctr"/>
         <c:lblOffset val="100"/>
       </c:catAx>
       <c:valAx>
-        <c:axId val="64221568"/>
+        <c:axId val="66724224"/>
         <c:scaling>
           <c:orientation val="minMax"/>
         </c:scaling>
@@ -323,7 +323,7 @@
         </c:title>
         <c:numFmt formatCode="General" sourceLinked="1"/>
         <c:tickLblPos val="nextTo"/>
-        <c:crossAx val="64211200"/>
+        <c:crossAx val="66709760"/>
         <c:crosses val="autoZero"/>
         <c:crossBetween val="between"/>
       </c:valAx>
@@ -339,6 +339,202 @@
 </file>
 
 <file path=ppt/charts/chart2.xml><?xml version="1.0" encoding="utf-8"?>
+<c:chartSpace xmlns:c="http://schemas.openxmlformats.org/drawingml/2006/chart" xmlns:a="http://schemas.openxmlformats.org/drawingml/2006/main" xmlns:r="http://schemas.openxmlformats.org/officeDocument/2006/relationships">
+  <c:lang val="en-US"/>
+  <c:chart>
+    <c:title>
+      <c:tx>
+        <c:rich>
+          <a:bodyPr/>
+          <a:lstStyle/>
+          <a:p>
+            <a:pPr>
+              <a:defRPr/>
+            </a:pPr>
+            <a:r>
+              <a:rPr lang="en-US"/>
+              <a:t>Conventional and Intelligent</a:t>
+            </a:r>
+          </a:p>
+        </c:rich>
+      </c:tx>
+      <c:layout/>
+    </c:title>
+    <c:plotArea>
+      <c:layout/>
+      <c:lineChart>
+        <c:grouping val="stacked"/>
+        <c:ser>
+          <c:idx val="0"/>
+          <c:order val="0"/>
+          <c:tx>
+            <c:strRef>
+              <c:f>Sheet1!$B$1</c:f>
+              <c:strCache>
+                <c:ptCount val="1"/>
+                <c:pt idx="0">
+                  <c:v>Intelligent Model</c:v>
+                </c:pt>
+              </c:strCache>
+            </c:strRef>
+          </c:tx>
+          <c:marker>
+            <c:symbol val="none"/>
+          </c:marker>
+          <c:cat>
+            <c:numLit>
+              <c:formatCode>General</c:formatCode>
+              <c:ptCount val="3"/>
+              <c:pt idx="0">
+                <c:v>2</c:v>
+              </c:pt>
+              <c:pt idx="1">
+                <c:v>4</c:v>
+              </c:pt>
+              <c:pt idx="2">
+                <c:v>8</c:v>
+              </c:pt>
+            </c:numLit>
+          </c:cat>
+          <c:val>
+            <c:numRef>
+              <c:f>Sheet1!$B$2:$B$4</c:f>
+              <c:numCache>
+                <c:formatCode>General</c:formatCode>
+                <c:ptCount val="3"/>
+                <c:pt idx="0">
+                  <c:v>642</c:v>
+                </c:pt>
+                <c:pt idx="1">
+                  <c:v>360</c:v>
+                </c:pt>
+                <c:pt idx="2">
+                  <c:v>317</c:v>
+                </c:pt>
+              </c:numCache>
+            </c:numRef>
+          </c:val>
+        </c:ser>
+        <c:ser>
+          <c:idx val="1"/>
+          <c:order val="1"/>
+          <c:tx>
+            <c:strRef>
+              <c:f>Sheet1!$B$6</c:f>
+              <c:strCache>
+                <c:ptCount val="1"/>
+                <c:pt idx="0">
+                  <c:v>Conventional Model</c:v>
+                </c:pt>
+              </c:strCache>
+            </c:strRef>
+          </c:tx>
+          <c:marker>
+            <c:symbol val="none"/>
+          </c:marker>
+          <c:val>
+            <c:numRef>
+              <c:f>Sheet1!$B$7:$B$9</c:f>
+              <c:numCache>
+                <c:formatCode>General</c:formatCode>
+                <c:ptCount val="3"/>
+                <c:pt idx="0">
+                  <c:v>1254.4269999999999</c:v>
+                </c:pt>
+                <c:pt idx="1">
+                  <c:v>680.452</c:v>
+                </c:pt>
+                <c:pt idx="2">
+                  <c:v>386.74700000000001</c:v>
+                </c:pt>
+              </c:numCache>
+            </c:numRef>
+          </c:val>
+        </c:ser>
+        <c:marker val="1"/>
+        <c:axId val="37462400"/>
+        <c:axId val="37469568"/>
+      </c:lineChart>
+      <c:catAx>
+        <c:axId val="37462400"/>
+        <c:scaling>
+          <c:orientation val="minMax"/>
+        </c:scaling>
+        <c:axPos val="b"/>
+        <c:title>
+          <c:tx>
+            <c:rich>
+              <a:bodyPr/>
+              <a:lstStyle/>
+              <a:p>
+                <a:pPr>
+                  <a:defRPr/>
+                </a:pPr>
+                <a:r>
+                  <a:rPr lang="en-US"/>
+                  <a:t>Number of Workers</a:t>
+                </a:r>
+              </a:p>
+            </c:rich>
+          </c:tx>
+          <c:layout/>
+        </c:title>
+        <c:numFmt formatCode="General" sourceLinked="1"/>
+        <c:tickLblPos val="nextTo"/>
+        <c:crossAx val="37469568"/>
+        <c:crosses val="autoZero"/>
+        <c:auto val="1"/>
+        <c:lblAlgn val="ctr"/>
+        <c:lblOffset val="100"/>
+      </c:catAx>
+      <c:valAx>
+        <c:axId val="37469568"/>
+        <c:scaling>
+          <c:orientation val="minMax"/>
+        </c:scaling>
+        <c:axPos val="l"/>
+        <c:majorGridlines/>
+        <c:title>
+          <c:tx>
+            <c:rich>
+              <a:bodyPr rot="-5400000" vert="horz"/>
+              <a:lstStyle/>
+              <a:p>
+                <a:pPr>
+                  <a:defRPr/>
+                </a:pPr>
+                <a:r>
+                  <a:rPr lang="en-US"/>
+                  <a:t>Time</a:t>
+                </a:r>
+                <a:r>
+                  <a:rPr lang="en-US" baseline="0"/>
+                  <a:t> (Seconds)</a:t>
+                </a:r>
+                <a:endParaRPr lang="en-US"/>
+              </a:p>
+            </c:rich>
+          </c:tx>
+          <c:layout/>
+        </c:title>
+        <c:numFmt formatCode="General" sourceLinked="1"/>
+        <c:tickLblPos val="nextTo"/>
+        <c:crossAx val="37462400"/>
+        <c:crosses val="autoZero"/>
+        <c:crossBetween val="between"/>
+      </c:valAx>
+    </c:plotArea>
+    <c:legend>
+      <c:legendPos val="r"/>
+      <c:layout/>
+    </c:legend>
+    <c:plotVisOnly val="1"/>
+  </c:chart>
+  <c:externalData r:id="rId1"/>
+</c:chartSpace>
+</file>
+
+<file path=ppt/charts/chart3.xml><?xml version="1.0" encoding="utf-8"?>
 <c:chartSpace xmlns:c="http://schemas.openxmlformats.org/drawingml/2006/chart" xmlns:a="http://schemas.openxmlformats.org/drawingml/2006/main" xmlns:r="http://schemas.openxmlformats.org/officeDocument/2006/relationships">
   <c:lang val="en-US"/>
   <c:chart>
@@ -416,13 +612,13 @@
                 <c:formatCode>General</c:formatCode>
                 <c:ptCount val="4"/>
                 <c:pt idx="0">
-                  <c:v>493.99799999999993</c:v>
+                  <c:v>493.99799999999988</c:v>
                 </c:pt>
                 <c:pt idx="1">
-                  <c:v>244.99800000000005</c:v>
+                  <c:v>244.99800000000008</c:v>
                 </c:pt>
                 <c:pt idx="2">
-                  <c:v>166.99800000000005</c:v>
+                  <c:v>166.99800000000008</c:v>
                 </c:pt>
                 <c:pt idx="3">
                   <c:v>112.998</c:v>
@@ -447,13 +643,13 @@
                 <c:formatCode>General</c:formatCode>
                 <c:ptCount val="4"/>
                 <c:pt idx="1">
-                  <c:v>445.0019999999999</c:v>
+                  <c:v>445.00199999999984</c:v>
                 </c:pt>
                 <c:pt idx="2">
                   <c:v>336</c:v>
                 </c:pt>
                 <c:pt idx="3">
-                  <c:v>190.99800000000002</c:v>
+                  <c:v>190.99800000000005</c:v>
                 </c:pt>
               </c:numCache>
             </c:numRef>
@@ -491,11 +687,11 @@
           </c:val>
         </c:ser>
         <c:marker val="1"/>
-        <c:axId val="64392192"/>
-        <c:axId val="64394368"/>
+        <c:axId val="66751488"/>
+        <c:axId val="66757760"/>
       </c:lineChart>
       <c:catAx>
-        <c:axId val="64392192"/>
+        <c:axId val="66751488"/>
         <c:scaling>
           <c:orientation val="minMax"/>
         </c:scaling>
@@ -523,14 +719,14 @@
           <c:layout/>
         </c:title>
         <c:tickLblPos val="nextTo"/>
-        <c:crossAx val="64394368"/>
+        <c:crossAx val="66757760"/>
         <c:crosses val="autoZero"/>
         <c:auto val="1"/>
         <c:lblAlgn val="ctr"/>
         <c:lblOffset val="100"/>
       </c:catAx>
       <c:valAx>
-        <c:axId val="64394368"/>
+        <c:axId val="66757760"/>
         <c:scaling>
           <c:orientation val="minMax"/>
         </c:scaling>
@@ -556,7 +752,7 @@
         </c:title>
         <c:numFmt formatCode="General" sourceLinked="1"/>
         <c:tickLblPos val="nextTo"/>
-        <c:crossAx val="64392192"/>
+        <c:crossAx val="66751488"/>
         <c:crosses val="autoZero"/>
         <c:crossBetween val="between"/>
       </c:valAx>
@@ -8435,63 +8631,22 @@
           </a:p>
         </p:txBody>
       </p:sp>
-      <p:sp>
-        <p:nvSpPr>
-          <p:cNvPr id="4" name="Text Box 3"/>
-          <p:cNvSpPr txBox="1">
-            <a:spLocks noChangeArrowheads="1"/>
-          </p:cNvSpPr>
+      <p:graphicFrame>
+        <p:nvGraphicFramePr>
+          <p:cNvPr id="6" name="Chart 5"/>
+          <p:cNvGraphicFramePr/>
           <p:nvPr/>
-        </p:nvSpPr>
-        <p:spPr bwMode="auto">
-          <a:xfrm>
-            <a:off x="4140679" y="1529880"/>
-            <a:ext cx="4525963" cy="5089525"/>
-          </a:xfrm>
-          <a:prstGeom prst="rect">
-            <a:avLst/>
-          </a:prstGeom>
-          <a:noFill/>
-          <a:ln w="9525">
-            <a:noFill/>
-            <a:round/>
-            <a:headEnd/>
-            <a:tailEnd/>
-          </a:ln>
-        </p:spPr>
-        <p:txBody>
-          <a:bodyPr lIns="0" tIns="28224" rIns="0" bIns="0"/>
-          <a:lstStyle/>
-          <a:p>
-            <a:pPr marL="431800" indent="-323850">
-              <a:spcAft>
-                <a:spcPts val="1425"/>
-              </a:spcAft>
-              <a:buSzPct val="45000"/>
-              <a:buFont typeface="Wingdings" charset="2"/>
-              <a:buChar char=""/>
-              <a:tabLst>
-                <a:tab pos="723900" algn="l"/>
-                <a:tab pos="1447800" algn="l"/>
-                <a:tab pos="2171700" algn="l"/>
-                <a:tab pos="2895600" algn="l"/>
-                <a:tab pos="3619500" algn="l"/>
-                <a:tab pos="4343400" algn="l"/>
-              </a:tabLst>
-            </a:pPr>
-            <a:r>
-              <a:rPr lang="en-US" sz="3200" dirty="0">
-                <a:solidFill>
-                  <a:srgbClr val="000000"/>
-                </a:solidFill>
-                <a:ea typeface="DejaVu Sans" charset="0"/>
-                <a:cs typeface="DejaVu Sans" charset="0"/>
-              </a:rPr>
-              <a:t>Graph here</a:t>
-            </a:r>
-          </a:p>
-        </p:txBody>
-      </p:sp>
+        </p:nvGraphicFramePr>
+        <p:xfrm>
+          <a:off x="4094641" y="1529880"/>
+          <a:ext cx="4765153" cy="3499320"/>
+        </p:xfrm>
+        <a:graphic>
+          <a:graphicData uri="http://schemas.openxmlformats.org/drawingml/2006/chart">
+            <c:chart xmlns:c="http://schemas.openxmlformats.org/drawingml/2006/chart" xmlns:r="http://schemas.openxmlformats.org/officeDocument/2006/relationships" r:id="rId2"/>
+          </a:graphicData>
+        </a:graphic>
+      </p:graphicFrame>
     </p:spTree>
   </p:cSld>
   <p:clrMapOvr>

</xml_diff>

<commit_message>
Added Chris' graphs and Betty's intro
git-svn-id: file://localhost/tmp/svn2git/svn@2049 defb5e50-622e-49ec-a68e-d72c7db87b45
</commit_message>
<xml_diff>
--- a/papers/data_intensive/eScience09/RoyalSocietyPresentation.pptx
+++ b/papers/data_intensive/eScience09/RoyalSocietyPresentation.pptx
@@ -5,26 +5,27 @@
     <p:sldMasterId id="2147483660" r:id="rId1"/>
   </p:sldMasterIdLst>
   <p:notesMasterIdLst>
-    <p:notesMasterId r:id="rId19"/>
+    <p:notesMasterId r:id="rId20"/>
   </p:notesMasterIdLst>
   <p:sldIdLst>
-    <p:sldId id="256" r:id="rId2"/>
-    <p:sldId id="321" r:id="rId3"/>
-    <p:sldId id="322" r:id="rId4"/>
-    <p:sldId id="258" r:id="rId5"/>
-    <p:sldId id="311" r:id="rId6"/>
-    <p:sldId id="312" r:id="rId7"/>
-    <p:sldId id="313" r:id="rId8"/>
-    <p:sldId id="315" r:id="rId9"/>
-    <p:sldId id="319" r:id="rId10"/>
-    <p:sldId id="323" r:id="rId11"/>
-    <p:sldId id="316" r:id="rId12"/>
-    <p:sldId id="314" r:id="rId13"/>
-    <p:sldId id="317" r:id="rId14"/>
-    <p:sldId id="320" r:id="rId15"/>
-    <p:sldId id="318" r:id="rId16"/>
-    <p:sldId id="324" r:id="rId17"/>
-    <p:sldId id="310" r:id="rId18"/>
+    <p:sldId id="325" r:id="rId2"/>
+    <p:sldId id="326" r:id="rId3"/>
+    <p:sldId id="327" r:id="rId4"/>
+    <p:sldId id="328" r:id="rId5"/>
+    <p:sldId id="329" r:id="rId6"/>
+    <p:sldId id="258" r:id="rId7"/>
+    <p:sldId id="311" r:id="rId8"/>
+    <p:sldId id="312" r:id="rId9"/>
+    <p:sldId id="315" r:id="rId10"/>
+    <p:sldId id="319" r:id="rId11"/>
+    <p:sldId id="313" r:id="rId12"/>
+    <p:sldId id="316" r:id="rId13"/>
+    <p:sldId id="314" r:id="rId14"/>
+    <p:sldId id="317" r:id="rId15"/>
+    <p:sldId id="320" r:id="rId16"/>
+    <p:sldId id="318" r:id="rId17"/>
+    <p:sldId id="324" r:id="rId18"/>
+    <p:sldId id="310" r:id="rId19"/>
   </p:sldIdLst>
   <p:sldSz cx="9144000" cy="6858000" type="screen4x3"/>
   <p:notesSz cx="6858000" cy="9144000"/>
@@ -252,7 +253,7 @@
                   <c:v>1254.4270000000001</c:v>
                 </c:pt>
                 <c:pt idx="2">
-                  <c:v>680.45199999999977</c:v>
+                  <c:v>680.45199999999966</c:v>
                 </c:pt>
                 <c:pt idx="3">
                   <c:v>386.74700000000001</c:v>
@@ -262,11 +263,11 @@
           </c:val>
         </c:ser>
         <c:marker val="1"/>
-        <c:axId val="66709760"/>
-        <c:axId val="66724224"/>
+        <c:axId val="56224000"/>
+        <c:axId val="56426880"/>
       </c:lineChart>
       <c:catAx>
-        <c:axId val="66709760"/>
+        <c:axId val="56224000"/>
         <c:scaling>
           <c:orientation val="minMax"/>
         </c:scaling>
@@ -290,14 +291,14 @@
           <c:layout/>
         </c:title>
         <c:tickLblPos val="nextTo"/>
-        <c:crossAx val="66724224"/>
+        <c:crossAx val="56426880"/>
         <c:crosses val="autoZero"/>
         <c:auto val="1"/>
         <c:lblAlgn val="ctr"/>
         <c:lblOffset val="100"/>
       </c:catAx>
       <c:valAx>
-        <c:axId val="66724224"/>
+        <c:axId val="56426880"/>
         <c:scaling>
           <c:orientation val="minMax"/>
         </c:scaling>
@@ -323,7 +324,7 @@
         </c:title>
         <c:numFmt formatCode="General" sourceLinked="1"/>
         <c:tickLblPos val="nextTo"/>
-        <c:crossAx val="66709760"/>
+        <c:crossAx val="56224000"/>
         <c:crosses val="autoZero"/>
         <c:crossBetween val="between"/>
       </c:valAx>
@@ -439,10 +440,10 @@
                 <c:formatCode>General</c:formatCode>
                 <c:ptCount val="3"/>
                 <c:pt idx="0">
-                  <c:v>1254.4269999999999</c:v>
+                  <c:v>1254.4270000000001</c:v>
                 </c:pt>
                 <c:pt idx="1">
-                  <c:v>680.452</c:v>
+                  <c:v>680.45199999999988</c:v>
                 </c:pt>
                 <c:pt idx="2">
                   <c:v>386.74700000000001</c:v>
@@ -452,11 +453,11 @@
           </c:val>
         </c:ser>
         <c:marker val="1"/>
-        <c:axId val="37462400"/>
-        <c:axId val="37469568"/>
+        <c:axId val="56464896"/>
+        <c:axId val="56466816"/>
       </c:lineChart>
       <c:catAx>
-        <c:axId val="37462400"/>
+        <c:axId val="56464896"/>
         <c:scaling>
           <c:orientation val="minMax"/>
         </c:scaling>
@@ -481,14 +482,14 @@
         </c:title>
         <c:numFmt formatCode="General" sourceLinked="1"/>
         <c:tickLblPos val="nextTo"/>
-        <c:crossAx val="37469568"/>
+        <c:crossAx val="56466816"/>
         <c:crosses val="autoZero"/>
         <c:auto val="1"/>
         <c:lblAlgn val="ctr"/>
         <c:lblOffset val="100"/>
       </c:catAx>
       <c:valAx>
-        <c:axId val="37469568"/>
+        <c:axId val="56466816"/>
         <c:scaling>
           <c:orientation val="minMax"/>
         </c:scaling>
@@ -519,7 +520,7 @@
         </c:title>
         <c:numFmt formatCode="General" sourceLinked="1"/>
         <c:tickLblPos val="nextTo"/>
-        <c:crossAx val="37462400"/>
+        <c:crossAx val="56464896"/>
         <c:crosses val="autoZero"/>
         <c:crossBetween val="between"/>
       </c:valAx>
@@ -535,6 +536,122 @@
 </file>
 
 <file path=ppt/charts/chart3.xml><?xml version="1.0" encoding="utf-8"?>
+<c:chartSpace xmlns:c="http://schemas.openxmlformats.org/drawingml/2006/chart" xmlns:a="http://schemas.openxmlformats.org/drawingml/2006/main" xmlns:r="http://schemas.openxmlformats.org/officeDocument/2006/relationships">
+  <c:lang val="en-US"/>
+  <c:chart>
+    <c:title>
+      <c:tx>
+        <c:rich>
+          <a:bodyPr/>
+          <a:lstStyle/>
+          <a:p>
+            <a:pPr>
+              <a:defRPr/>
+            </a:pPr>
+            <a:r>
+              <a:rPr lang="en-US"/>
+              <a:t>Comparison</a:t>
+            </a:r>
+            <a:r>
+              <a:rPr lang="en-US" baseline="0"/>
+              <a:t>  of Intelligent and Conventional</a:t>
+            </a:r>
+            <a:endParaRPr lang="en-US"/>
+          </a:p>
+        </c:rich>
+      </c:tx>
+      <c:layout/>
+    </c:title>
+    <c:plotArea>
+      <c:layout/>
+      <c:barChart>
+        <c:barDir val="col"/>
+        <c:grouping val="clustered"/>
+        <c:ser>
+          <c:idx val="0"/>
+          <c:order val="0"/>
+          <c:cat>
+            <c:strLit>
+              <c:ptCount val="2"/>
+              <c:pt idx="0">
+                <c:v>Convetional</c:v>
+              </c:pt>
+              <c:pt idx="1">
+                <c:v>Intelligent</c:v>
+              </c:pt>
+            </c:strLit>
+          </c:cat>
+          <c:val>
+            <c:numRef>
+              <c:f>Sheet1!$A$1:$A$2</c:f>
+              <c:numCache>
+                <c:formatCode>General</c:formatCode>
+                <c:ptCount val="2"/>
+                <c:pt idx="0">
+                  <c:v>680.42</c:v>
+                </c:pt>
+                <c:pt idx="1">
+                  <c:v>360</c:v>
+                </c:pt>
+              </c:numCache>
+            </c:numRef>
+          </c:val>
+        </c:ser>
+        <c:axId val="65167744"/>
+        <c:axId val="65222144"/>
+      </c:barChart>
+      <c:catAx>
+        <c:axId val="65167744"/>
+        <c:scaling>
+          <c:orientation val="minMax"/>
+        </c:scaling>
+        <c:axPos val="b"/>
+        <c:tickLblPos val="nextTo"/>
+        <c:crossAx val="65222144"/>
+        <c:crosses val="autoZero"/>
+        <c:auto val="1"/>
+        <c:lblAlgn val="ctr"/>
+        <c:lblOffset val="100"/>
+      </c:catAx>
+      <c:valAx>
+        <c:axId val="65222144"/>
+        <c:scaling>
+          <c:orientation val="minMax"/>
+        </c:scaling>
+        <c:axPos val="l"/>
+        <c:majorGridlines/>
+        <c:title>
+          <c:tx>
+            <c:rich>
+              <a:bodyPr rot="-5400000" vert="horz"/>
+              <a:lstStyle/>
+              <a:p>
+                <a:pPr>
+                  <a:defRPr/>
+                </a:pPr>
+                <a:r>
+                  <a:rPr lang="en-US"/>
+                  <a:t>Time (seconds)</a:t>
+                </a:r>
+              </a:p>
+            </c:rich>
+          </c:tx>
+          <c:layout/>
+        </c:title>
+        <c:numFmt formatCode="General" sourceLinked="1"/>
+        <c:tickLblPos val="nextTo"/>
+        <c:crossAx val="65167744"/>
+        <c:crosses val="autoZero"/>
+        <c:crossBetween val="between"/>
+      </c:valAx>
+    </c:plotArea>
+    <c:plotVisOnly val="1"/>
+  </c:chart>
+  <c:externalData r:id="rId1"/>
+</c:chartSpace>
+</file>
+
+<file path=ppt/charts/chart4.xml><?xml version="1.0" encoding="utf-8"?>
 <c:chartSpace xmlns:c="http://schemas.openxmlformats.org/drawingml/2006/chart" xmlns:a="http://schemas.openxmlformats.org/drawingml/2006/main" xmlns:r="http://schemas.openxmlformats.org/officeDocument/2006/relationships">
   <c:lang val="en-US"/>
   <c:chart>
@@ -612,13 +729,13 @@
                 <c:formatCode>General</c:formatCode>
                 <c:ptCount val="4"/>
                 <c:pt idx="0">
-                  <c:v>493.99799999999988</c:v>
+                  <c:v>493.99799999999976</c:v>
                 </c:pt>
                 <c:pt idx="1">
-                  <c:v>244.99800000000008</c:v>
+                  <c:v>244.9980000000001</c:v>
                 </c:pt>
                 <c:pt idx="2">
-                  <c:v>166.99800000000008</c:v>
+                  <c:v>166.9980000000001</c:v>
                 </c:pt>
                 <c:pt idx="3">
                   <c:v>112.998</c:v>
@@ -643,13 +760,13 @@
                 <c:formatCode>General</c:formatCode>
                 <c:ptCount val="4"/>
                 <c:pt idx="1">
-                  <c:v>445.00199999999984</c:v>
+                  <c:v>445.00199999999978</c:v>
                 </c:pt>
                 <c:pt idx="2">
                   <c:v>336</c:v>
                 </c:pt>
                 <c:pt idx="3">
-                  <c:v>190.99800000000005</c:v>
+                  <c:v>190.99800000000008</c:v>
                 </c:pt>
               </c:numCache>
             </c:numRef>
@@ -687,11 +804,11 @@
           </c:val>
         </c:ser>
         <c:marker val="1"/>
-        <c:axId val="66751488"/>
-        <c:axId val="66757760"/>
+        <c:axId val="57215232"/>
+        <c:axId val="57225600"/>
       </c:lineChart>
       <c:catAx>
-        <c:axId val="66751488"/>
+        <c:axId val="57215232"/>
         <c:scaling>
           <c:orientation val="minMax"/>
         </c:scaling>
@@ -719,14 +836,14 @@
           <c:layout/>
         </c:title>
         <c:tickLblPos val="nextTo"/>
-        <c:crossAx val="66757760"/>
+        <c:crossAx val="57225600"/>
         <c:crosses val="autoZero"/>
         <c:auto val="1"/>
         <c:lblAlgn val="ctr"/>
         <c:lblOffset val="100"/>
       </c:catAx>
       <c:valAx>
-        <c:axId val="66757760"/>
+        <c:axId val="57225600"/>
         <c:scaling>
           <c:orientation val="minMax"/>
         </c:scaling>
@@ -752,7 +869,7 @@
         </c:title>
         <c:numFmt formatCode="General" sourceLinked="1"/>
         <c:tickLblPos val="nextTo"/>
-        <c:crossAx val="66751488"/>
+        <c:crossAx val="57215232"/>
         <c:crosses val="autoZero"/>
         <c:crossBetween val="between"/>
       </c:valAx>
@@ -1192,7 +1309,7 @@
             <a:fld id="{D344DA2A-F2F4-D74A-8AEC-1933B33E97E0}" type="slidenum">
               <a:rPr lang="en-US" smtClean="0"/>
               <a:pPr/>
-              <a:t>13</a:t>
+              <a:t>14</a:t>
             </a:fld>
             <a:endParaRPr lang="en-US"/>
           </a:p>
@@ -1323,7 +1440,7 @@
             <a:fld id="{D344DA2A-F2F4-D74A-8AEC-1933B33E97E0}" type="slidenum">
               <a:rPr lang="en-US" smtClean="0"/>
               <a:pPr/>
-              <a:t>14</a:t>
+              <a:t>15</a:t>
             </a:fld>
             <a:endParaRPr lang="en-US"/>
           </a:p>
@@ -6475,8 +6592,8 @@
         </p:nvSpPr>
         <p:spPr>
           <a:xfrm>
-            <a:off x="887664" y="3514165"/>
-            <a:ext cx="5925512" cy="1815353"/>
+            <a:off x="887664" y="3034553"/>
+            <a:ext cx="8001000" cy="3823447"/>
           </a:xfrm>
         </p:spPr>
         <p:txBody>
@@ -6516,21 +6633,14 @@
             <p:ph type="ctrTitle"/>
           </p:nvPr>
         </p:nvSpPr>
-        <p:spPr>
-          <a:xfrm>
-            <a:off x="0" y="1497106"/>
-            <a:ext cx="8915400" cy="2522258"/>
-          </a:xfrm>
-        </p:spPr>
-        <p:txBody>
-          <a:bodyPr>
-            <a:noAutofit/>
-          </a:bodyPr>
-          <a:lstStyle/>
-          <a:p>
-            <a:r>
-              <a:rPr lang="en-US" dirty="0" smtClean="0"/>
-              <a:t>Understanding Performance Implications of Distributed Filesystems in a Data-Intensive Application</a:t>
+        <p:spPr/>
+        <p:txBody>
+          <a:bodyPr/>
+          <a:lstStyle/>
+          <a:p>
+            <a:r>
+              <a:rPr lang="en-US" dirty="0" smtClean="0"/>
+              <a:t>SAGA ALL-PAIRS</a:t>
             </a:r>
             <a:endParaRPr lang="en-US" dirty="0"/>
           </a:p>
@@ -6681,7 +6791,7 @@
           <a:p>
             <a:r>
               <a:rPr lang="en-US" dirty="0" smtClean="0"/>
-              <a:t>Intelligent vs. Conventional</a:t>
+              <a:t>Distributed Model (Intelligent)</a:t>
             </a:r>
             <a:endParaRPr lang="en-US" dirty="0"/>
           </a:p>
@@ -6700,7 +6810,7 @@
         <p:spPr>
           <a:xfrm>
             <a:off x="757947" y="1529880"/>
-            <a:ext cx="7918462" cy="4608884"/>
+            <a:ext cx="3382732" cy="4608884"/>
           </a:xfrm>
         </p:spPr>
         <p:txBody>
@@ -6711,29 +6821,39 @@
           <a:p>
             <a:r>
               <a:rPr lang="en-US" dirty="0" smtClean="0"/>
-              <a:t>Intelligent may have overhead, but it pays off if data is large</a:t>
-            </a:r>
-          </a:p>
-          <a:p>
-            <a:pPr lvl="1"/>
-            <a:r>
-              <a:rPr lang="en-US" dirty="0" smtClean="0"/>
-              <a:t>Simple intelligent measurements can improve performance</a:t>
-            </a:r>
-          </a:p>
-          <a:p>
-            <a:pPr lvl="1"/>
-            <a:r>
-              <a:rPr lang="en-US" dirty="0" smtClean="0">
-                <a:solidFill>
-                  <a:srgbClr val="FF0000"/>
-                </a:solidFill>
-              </a:rPr>
-              <a:t>Explain comparisons of graphs here</a:t>
-            </a:r>
-          </a:p>
-        </p:txBody>
-      </p:sp>
+              <a:t>Results go here</a:t>
+            </a:r>
+          </a:p>
+          <a:p>
+            <a:r>
+              <a:rPr lang="en-US" dirty="0" smtClean="0"/>
+              <a:t>…</a:t>
+            </a:r>
+          </a:p>
+          <a:p>
+            <a:r>
+              <a:rPr lang="en-US" dirty="0" smtClean="0"/>
+              <a:t>Some more comments</a:t>
+            </a:r>
+          </a:p>
+        </p:txBody>
+      </p:sp>
+      <p:graphicFrame>
+        <p:nvGraphicFramePr>
+          <p:cNvPr id="6" name="Chart 5"/>
+          <p:cNvGraphicFramePr/>
+          <p:nvPr/>
+        </p:nvGraphicFramePr>
+        <p:xfrm>
+          <a:off x="4094641" y="1529880"/>
+          <a:ext cx="4765153" cy="3499320"/>
+        </p:xfrm>
+        <a:graphic>
+          <a:graphicData uri="http://schemas.openxmlformats.org/drawingml/2006/chart">
+            <c:chart xmlns:c="http://schemas.openxmlformats.org/drawingml/2006/chart" xmlns:r="http://schemas.openxmlformats.org/officeDocument/2006/relationships" r:id="rId2"/>
+          </a:graphicData>
+        </a:graphic>
+      </p:graphicFrame>
     </p:spTree>
   </p:cSld>
   <p:clrMapOvr>
@@ -6783,7 +6903,7 @@
           <a:p>
             <a:r>
               <a:rPr lang="en-US" dirty="0" smtClean="0"/>
-              <a:t>Lessons Learned</a:t>
+              <a:t>Results from Comparative Tests</a:t>
             </a:r>
             <a:endParaRPr lang="en-US" dirty="0"/>
           </a:p>
@@ -6799,7 +6919,12 @@
             <p:ph idx="1"/>
           </p:nvPr>
         </p:nvSpPr>
-        <p:spPr/>
+        <p:spPr>
+          <a:xfrm>
+            <a:off x="757947" y="1529880"/>
+            <a:ext cx="3169817" cy="4608884"/>
+          </a:xfrm>
+        </p:spPr>
         <p:txBody>
           <a:bodyPr>
             <a:normAutofit/>
@@ -6808,58 +6933,49 @@
           <a:p>
             <a:r>
               <a:rPr lang="en-US" dirty="0" smtClean="0"/>
-              <a:t>Very simple tools to measure data dependencies can be very effective.  Some measurements used</a:t>
-            </a:r>
-          </a:p>
-          <a:p>
-            <a:pPr lvl="1"/>
-            <a:r>
-              <a:rPr lang="en-US" dirty="0" smtClean="0"/>
-              <a:t>Ping time</a:t>
-            </a:r>
-          </a:p>
-          <a:p>
-            <a:pPr lvl="1"/>
-            <a:r>
-              <a:rPr lang="en-US" dirty="0" smtClean="0"/>
-              <a:t>Small file transfer time</a:t>
-            </a:r>
-          </a:p>
-          <a:p>
-            <a:pPr lvl="1"/>
-            <a:r>
-              <a:rPr lang="en-US" dirty="0" smtClean="0"/>
-              <a:t>Number of hops</a:t>
-            </a:r>
-          </a:p>
-          <a:p>
-            <a:r>
-              <a:rPr lang="en-US" dirty="0" smtClean="0"/>
-              <a:t>More complex measurements are possible</a:t>
-            </a:r>
-          </a:p>
-          <a:p>
-            <a:pPr lvl="1"/>
-            <a:r>
-              <a:rPr lang="en-US" dirty="0" smtClean="0"/>
-              <a:t>Throughput</a:t>
-            </a:r>
-          </a:p>
-          <a:p>
-            <a:pPr lvl="1"/>
-            <a:r>
-              <a:rPr lang="en-US" dirty="0" smtClean="0"/>
-              <a:t>Queue times</a:t>
-            </a:r>
-          </a:p>
-          <a:p>
-            <a:r>
-              <a:rPr lang="en-US" dirty="0" smtClean="0"/>
-              <a:t>Ignoring data dependencies is no longer an option</a:t>
-            </a:r>
-          </a:p>
-        </p:txBody>
-      </p:sp>
+              <a:t>Intelligence is worth the overhead</a:t>
+            </a:r>
+          </a:p>
+          <a:p>
+            <a:r>
+              <a:rPr lang="en-US" dirty="0" smtClean="0"/>
+              <a:t>Intelligence ~1% overall time</a:t>
+            </a:r>
+          </a:p>
+          <a:p>
+            <a:r>
+              <a:rPr lang="en-US" dirty="0" smtClean="0"/>
+              <a:t>~50</a:t>
+            </a:r>
+            <a:r>
+              <a:rPr lang="en-US" dirty="0" smtClean="0"/>
+              <a:t>% reduction in overall time!</a:t>
+            </a:r>
+          </a:p>
+          <a:p>
+            <a:r>
+              <a:rPr lang="en-US" dirty="0" smtClean="0"/>
+              <a:t>Very simple intelligence</a:t>
+            </a:r>
+          </a:p>
+        </p:txBody>
+      </p:sp>
+      <p:graphicFrame>
+        <p:nvGraphicFramePr>
+          <p:cNvPr id="5" name="Chart 4"/>
+          <p:cNvGraphicFramePr/>
+          <p:nvPr/>
+        </p:nvGraphicFramePr>
+        <p:xfrm>
+          <a:off x="3927764" y="1735282"/>
+          <a:ext cx="4572000" cy="4436918"/>
+        </p:xfrm>
+        <a:graphic>
+          <a:graphicData uri="http://schemas.openxmlformats.org/drawingml/2006/chart">
+            <c:chart xmlns:c="http://schemas.openxmlformats.org/drawingml/2006/chart" xmlns:r="http://schemas.openxmlformats.org/officeDocument/2006/relationships" r:id="rId2"/>
+          </a:graphicData>
+        </a:graphic>
+      </p:graphicFrame>
     </p:spTree>
   </p:cSld>
   <p:clrMapOvr>
@@ -6909,7 +7025,7 @@
           <a:p>
             <a:r>
               <a:rPr lang="en-US" dirty="0" smtClean="0"/>
-              <a:t>Distributed Filesystem Model</a:t>
+              <a:t>Lessons Learned</a:t>
             </a:r>
             <a:endParaRPr lang="en-US" dirty="0"/>
           </a:p>
@@ -6934,66 +7050,54 @@
           <a:p>
             <a:r>
               <a:rPr lang="en-US" dirty="0" smtClean="0"/>
-              <a:t>Abstract layer between application and local filesystems</a:t>
-            </a:r>
-          </a:p>
-          <a:p>
-            <a:r>
-              <a:rPr lang="en-US" dirty="0" smtClean="0"/>
-              <a:t>Some examples include</a:t>
+              <a:t>Very simple tools to measure data dependencies can be very effective.  Some measurements used</a:t>
             </a:r>
           </a:p>
           <a:p>
             <a:pPr lvl="1"/>
             <a:r>
               <a:rPr lang="en-US" dirty="0" smtClean="0"/>
-              <a:t>HDFS – </a:t>
-            </a:r>
-            <a:r>
-              <a:rPr lang="en-US" dirty="0" err="1" smtClean="0"/>
-              <a:t>Hadoop’s</a:t>
-            </a:r>
-            <a:r>
-              <a:rPr lang="en-US" dirty="0" smtClean="0"/>
-              <a:t> filesystem</a:t>
+              <a:t>Ping time</a:t>
             </a:r>
           </a:p>
           <a:p>
             <a:pPr lvl="1"/>
             <a:r>
               <a:rPr lang="en-US" dirty="0" smtClean="0"/>
-              <a:t>GFS – Google’s filesystem</a:t>
+              <a:t>Small file transfer time</a:t>
             </a:r>
           </a:p>
           <a:p>
             <a:pPr lvl="1"/>
             <a:r>
-              <a:rPr lang="en-US" dirty="0" err="1" smtClean="0"/>
-              <a:t>KosmosFS</a:t>
-            </a:r>
-            <a:r>
-              <a:rPr lang="en-US" dirty="0" smtClean="0"/>
-              <a:t> – open source C++ filesystem</a:t>
-            </a:r>
-          </a:p>
-          <a:p>
-            <a:r>
-              <a:rPr lang="en-US" dirty="0" smtClean="0"/>
-              <a:t>Encapsulates Handling Data</a:t>
+              <a:rPr lang="en-US" dirty="0" smtClean="0"/>
+              <a:t>Number of hops</a:t>
+            </a:r>
+          </a:p>
+          <a:p>
+            <a:r>
+              <a:rPr lang="en-US" dirty="0" smtClean="0"/>
+              <a:t>More complex measurements are possible</a:t>
             </a:r>
           </a:p>
           <a:p>
             <a:pPr lvl="1"/>
             <a:r>
               <a:rPr lang="en-US" dirty="0" smtClean="0"/>
-              <a:t>Handles data displacement</a:t>
+              <a:t>Throughput</a:t>
             </a:r>
           </a:p>
           <a:p>
             <a:pPr lvl="1"/>
             <a:r>
               <a:rPr lang="en-US" dirty="0" smtClean="0"/>
-              <a:t>Handles data requests</a:t>
+              <a:t>Queue times</a:t>
+            </a:r>
+          </a:p>
+          <a:p>
+            <a:r>
+              <a:rPr lang="en-US" dirty="0" smtClean="0"/>
+              <a:t>Ignoring data dependencies is no longer an option</a:t>
             </a:r>
           </a:p>
         </p:txBody>
@@ -7047,7 +7151,7 @@
           <a:p>
             <a:r>
               <a:rPr lang="en-US" dirty="0" smtClean="0"/>
-              <a:t>Distributed Filesystem</a:t>
+              <a:t>Distributed Filesystem Model</a:t>
             </a:r>
             <a:endParaRPr lang="en-US" dirty="0"/>
           </a:p>
@@ -7072,60 +7176,66 @@
           <a:p>
             <a:r>
               <a:rPr lang="en-US" dirty="0" smtClean="0"/>
-              <a:t>Pros</a:t>
+              <a:t>Abstract layer between application and local filesystems</a:t>
+            </a:r>
+          </a:p>
+          <a:p>
+            <a:r>
+              <a:rPr lang="en-US" dirty="0" smtClean="0"/>
+              <a:t>Some examples include</a:t>
             </a:r>
           </a:p>
           <a:p>
             <a:pPr lvl="1"/>
             <a:r>
               <a:rPr lang="en-US" dirty="0" smtClean="0"/>
-              <a:t>Replication</a:t>
+              <a:t>HDFS – </a:t>
+            </a:r>
+            <a:r>
+              <a:rPr lang="en-US" dirty="0" err="1" smtClean="0"/>
+              <a:t>Hadoop’s</a:t>
+            </a:r>
+            <a:r>
+              <a:rPr lang="en-US" dirty="0" smtClean="0"/>
+              <a:t> filesystem</a:t>
             </a:r>
           </a:p>
           <a:p>
             <a:pPr lvl="1"/>
             <a:r>
               <a:rPr lang="en-US" dirty="0" smtClean="0"/>
-              <a:t>Fault tolerance</a:t>
+              <a:t>GFS – Google’s filesystem</a:t>
             </a:r>
           </a:p>
           <a:p>
             <a:pPr lvl="1"/>
             <a:r>
-              <a:rPr lang="en-US" dirty="0" smtClean="0"/>
-              <a:t>Capability to handle data dependencies </a:t>
-            </a:r>
-          </a:p>
-          <a:p>
-            <a:r>
-              <a:rPr lang="en-US" dirty="0" smtClean="0"/>
-              <a:t>Cons</a:t>
+              <a:rPr lang="en-US" dirty="0" err="1" smtClean="0"/>
+              <a:t>KosmosFS</a:t>
+            </a:r>
+            <a:r>
+              <a:rPr lang="en-US" dirty="0" smtClean="0"/>
+              <a:t> – open source C++ filesystem</a:t>
+            </a:r>
+          </a:p>
+          <a:p>
+            <a:r>
+              <a:rPr lang="en-US" dirty="0" smtClean="0"/>
+              <a:t>Encapsulates Handling Data</a:t>
             </a:r>
           </a:p>
           <a:p>
             <a:pPr lvl="1"/>
             <a:r>
               <a:rPr lang="en-US" dirty="0" smtClean="0"/>
-              <a:t>Overhead</a:t>
+              <a:t>Handles data displacement</a:t>
             </a:r>
           </a:p>
           <a:p>
             <a:pPr lvl="1"/>
             <a:r>
               <a:rPr lang="en-US" dirty="0" smtClean="0"/>
-              <a:t>Inability to control work placement</a:t>
-            </a:r>
-          </a:p>
-          <a:p>
-            <a:r>
-              <a:rPr lang="en-US" dirty="0" smtClean="0"/>
-              <a:t>Is it worth it to use a distributed filesystem?</a:t>
-            </a:r>
-          </a:p>
-          <a:p>
-            <a:r>
-              <a:rPr lang="en-US" dirty="0" smtClean="0"/>
-              <a:t>What does a distributed filesystem worry about?</a:t>
+              <a:t>Handles data requests</a:t>
             </a:r>
           </a:p>
         </p:txBody>
@@ -7179,7 +7289,7 @@
           <a:p>
             <a:r>
               <a:rPr lang="en-US" dirty="0" smtClean="0"/>
-              <a:t>Results from DFS tests</a:t>
+              <a:t>Distributed Filesystem</a:t>
             </a:r>
             <a:endParaRPr lang="en-US" dirty="0"/>
           </a:p>
@@ -7195,12 +7305,7 @@
             <p:ph idx="1"/>
           </p:nvPr>
         </p:nvSpPr>
-        <p:spPr>
-          <a:xfrm>
-            <a:off x="471076" y="1529880"/>
-            <a:ext cx="3195489" cy="4608884"/>
-          </a:xfrm>
-        </p:spPr>
+        <p:spPr/>
         <p:txBody>
           <a:bodyPr>
             <a:normAutofit/>
@@ -7209,45 +7314,64 @@
           <a:p>
             <a:r>
               <a:rPr lang="en-US" dirty="0" smtClean="0"/>
-              <a:t>Read 2.3 Gigabytes</a:t>
-            </a:r>
-          </a:p>
-          <a:p>
-            <a:r>
-              <a:rPr lang="en-US" dirty="0" smtClean="0"/>
-              <a:t>No Coordination</a:t>
-            </a:r>
-          </a:p>
-          <a:p>
-            <a:r>
-              <a:rPr lang="en-US" dirty="0" smtClean="0"/>
-              <a:t>Handled Multiple Requests</a:t>
-            </a:r>
-          </a:p>
-          <a:p>
-            <a:r>
-              <a:rPr lang="en-US" dirty="0" smtClean="0"/>
-              <a:t>Some overhead for multiple dataservers in filesystem</a:t>
-            </a:r>
-          </a:p>
-        </p:txBody>
-      </p:sp>
-      <p:graphicFrame>
-        <p:nvGraphicFramePr>
-          <p:cNvPr id="5" name="Chart 4"/>
-          <p:cNvGraphicFramePr/>
-          <p:nvPr/>
-        </p:nvGraphicFramePr>
-        <p:xfrm>
-          <a:off x="3478306" y="1362075"/>
-          <a:ext cx="5460627" cy="4527737"/>
-        </p:xfrm>
-        <a:graphic>
-          <a:graphicData uri="http://schemas.openxmlformats.org/drawingml/2006/chart">
-            <c:chart xmlns:c="http://schemas.openxmlformats.org/drawingml/2006/chart" xmlns:r="http://schemas.openxmlformats.org/officeDocument/2006/relationships" r:id="rId3"/>
-          </a:graphicData>
-        </a:graphic>
-      </p:graphicFrame>
+              <a:t>Pros</a:t>
+            </a:r>
+          </a:p>
+          <a:p>
+            <a:pPr lvl="1"/>
+            <a:r>
+              <a:rPr lang="en-US" dirty="0" smtClean="0"/>
+              <a:t>Replication</a:t>
+            </a:r>
+          </a:p>
+          <a:p>
+            <a:pPr lvl="1"/>
+            <a:r>
+              <a:rPr lang="en-US" dirty="0" smtClean="0"/>
+              <a:t>Fault tolerance</a:t>
+            </a:r>
+          </a:p>
+          <a:p>
+            <a:pPr lvl="1"/>
+            <a:r>
+              <a:rPr lang="en-US" dirty="0" smtClean="0"/>
+              <a:t>Capability to handle data dependencies </a:t>
+            </a:r>
+          </a:p>
+          <a:p>
+            <a:r>
+              <a:rPr lang="en-US" dirty="0" smtClean="0"/>
+              <a:t>Cons</a:t>
+            </a:r>
+          </a:p>
+          <a:p>
+            <a:pPr lvl="1"/>
+            <a:r>
+              <a:rPr lang="en-US" dirty="0" smtClean="0"/>
+              <a:t>Overhead</a:t>
+            </a:r>
+          </a:p>
+          <a:p>
+            <a:pPr lvl="1"/>
+            <a:r>
+              <a:rPr lang="en-US" dirty="0" smtClean="0"/>
+              <a:t>Inability to control work placement</a:t>
+            </a:r>
+          </a:p>
+          <a:p>
+            <a:r>
+              <a:rPr lang="en-US" dirty="0" smtClean="0"/>
+              <a:t>Is it worth it to use a distributed filesystem?</a:t>
+            </a:r>
+          </a:p>
+          <a:p>
+            <a:r>
+              <a:rPr lang="en-US" dirty="0" smtClean="0"/>
+              <a:t>What does a distributed filesystem worry about?</a:t>
+            </a:r>
+          </a:p>
+        </p:txBody>
+      </p:sp>
     </p:spTree>
   </p:cSld>
   <p:clrMapOvr>
@@ -7297,7 +7421,7 @@
           <a:p>
             <a:r>
               <a:rPr lang="en-US" dirty="0" smtClean="0"/>
-              <a:t>Recap</a:t>
+              <a:t>Results from DFS tests</a:t>
             </a:r>
             <a:endParaRPr lang="en-US" dirty="0"/>
           </a:p>
@@ -7313,7 +7437,12 @@
             <p:ph idx="1"/>
           </p:nvPr>
         </p:nvSpPr>
-        <p:spPr/>
+        <p:spPr>
+          <a:xfrm>
+            <a:off x="471076" y="1529880"/>
+            <a:ext cx="3195489" cy="4608884"/>
+          </a:xfrm>
+        </p:spPr>
         <p:txBody>
           <a:bodyPr>
             <a:normAutofit/>
@@ -7321,61 +7450,46 @@
           <a:lstStyle/>
           <a:p>
             <a:r>
-              <a:rPr lang="en-US" dirty="0" err="1" smtClean="0"/>
-              <a:t>AllPairs</a:t>
-            </a:r>
-            <a:endParaRPr lang="en-US" dirty="0" smtClean="0"/>
-          </a:p>
-          <a:p>
-            <a:pPr lvl="1"/>
-            <a:r>
-              <a:rPr lang="en-US" dirty="0" smtClean="0"/>
-              <a:t>Application framework to create an n by m comparison matrix</a:t>
-            </a:r>
-          </a:p>
-          <a:p>
-            <a:pPr lvl="1"/>
-            <a:r>
-              <a:rPr lang="en-US" dirty="0" smtClean="0"/>
-              <a:t>Data intensive</a:t>
-            </a:r>
-          </a:p>
-          <a:p>
-            <a:r>
-              <a:rPr lang="en-US" dirty="0" smtClean="0"/>
-              <a:t>Models used today</a:t>
-            </a:r>
-          </a:p>
-          <a:p>
-            <a:pPr lvl="1"/>
-            <a:r>
-              <a:rPr lang="en-US" dirty="0" smtClean="0"/>
-              <a:t>Distributed Filesystem</a:t>
-            </a:r>
-          </a:p>
-          <a:p>
-            <a:pPr lvl="1"/>
-            <a:r>
-              <a:rPr lang="en-US" dirty="0" smtClean="0"/>
-              <a:t>Distributed</a:t>
-            </a:r>
-          </a:p>
-          <a:p>
-            <a:pPr lvl="2"/>
-            <a:r>
-              <a:rPr lang="en-US" dirty="0" smtClean="0"/>
-              <a:t>Conventional</a:t>
-            </a:r>
-          </a:p>
-          <a:p>
-            <a:pPr lvl="2"/>
-            <a:r>
-              <a:rPr lang="en-US" dirty="0" smtClean="0"/>
-              <a:t>Intelligent</a:t>
-            </a:r>
-          </a:p>
-        </p:txBody>
-      </p:sp>
+              <a:rPr lang="en-US" dirty="0" smtClean="0"/>
+              <a:t>Read 2.3 Gigabytes</a:t>
+            </a:r>
+          </a:p>
+          <a:p>
+            <a:r>
+              <a:rPr lang="en-US" dirty="0" smtClean="0"/>
+              <a:t>No Coordination</a:t>
+            </a:r>
+          </a:p>
+          <a:p>
+            <a:r>
+              <a:rPr lang="en-US" dirty="0" smtClean="0"/>
+              <a:t>Handled Multiple Requests</a:t>
+            </a:r>
+          </a:p>
+          <a:p>
+            <a:r>
+              <a:rPr lang="en-US" dirty="0" smtClean="0"/>
+              <a:t>Some overhead for multiple dataservers in filesystem</a:t>
+            </a:r>
+          </a:p>
+        </p:txBody>
+      </p:sp>
+      <p:graphicFrame>
+        <p:nvGraphicFramePr>
+          <p:cNvPr id="5" name="Chart 4"/>
+          <p:cNvGraphicFramePr/>
+          <p:nvPr/>
+        </p:nvGraphicFramePr>
+        <p:xfrm>
+          <a:off x="3478306" y="1362075"/>
+          <a:ext cx="5460627" cy="4527737"/>
+        </p:xfrm>
+        <a:graphic>
+          <a:graphicData uri="http://schemas.openxmlformats.org/drawingml/2006/chart">
+            <c:chart xmlns:c="http://schemas.openxmlformats.org/drawingml/2006/chart" xmlns:r="http://schemas.openxmlformats.org/officeDocument/2006/relationships" r:id="rId3"/>
+          </a:graphicData>
+        </a:graphic>
+      </p:graphicFrame>
     </p:spTree>
   </p:cSld>
   <p:clrMapOvr>
@@ -7425,7 +7539,7 @@
           <a:p>
             <a:r>
               <a:rPr lang="en-US" dirty="0" smtClean="0"/>
-              <a:t>Conclusions</a:t>
+              <a:t>Recap</a:t>
             </a:r>
             <a:endParaRPr lang="en-US" dirty="0"/>
           </a:p>
@@ -7449,88 +7563,57 @@
           <a:lstStyle/>
           <a:p>
             <a:r>
-              <a:rPr lang="en-US" dirty="0" smtClean="0"/>
-              <a:t>Data intensive applications need overhead for efficiency</a:t>
-            </a:r>
+              <a:rPr lang="en-US" dirty="0" err="1" smtClean="0"/>
+              <a:t>AllPairs</a:t>
+            </a:r>
+            <a:endParaRPr lang="en-US" dirty="0" smtClean="0"/>
           </a:p>
           <a:p>
             <a:pPr lvl="1"/>
             <a:r>
               <a:rPr lang="en-US" dirty="0" smtClean="0"/>
-              <a:t>Distributed Filesystem Model</a:t>
+              <a:t>Application framework to create an n by m comparison matrix</a:t>
             </a:r>
           </a:p>
           <a:p>
             <a:pPr lvl="1"/>
             <a:r>
               <a:rPr lang="en-US" dirty="0" smtClean="0"/>
-              <a:t>Intelligent Distributed Model</a:t>
-            </a:r>
-          </a:p>
-          <a:p>
-            <a:r>
-              <a:rPr lang="en-US" dirty="0" smtClean="0"/>
-              <a:t>We were able to improve performance up to </a:t>
-            </a:r>
-            <a:r>
-              <a:rPr lang="en-US" dirty="0" smtClean="0">
-                <a:solidFill>
-                  <a:srgbClr val="FF0000"/>
-                </a:solidFill>
-              </a:rPr>
-              <a:t>??%</a:t>
-            </a:r>
-            <a:r>
-              <a:rPr lang="en-US" dirty="0" smtClean="0">
-                <a:solidFill>
-                  <a:schemeClr val="tx1"/>
-                </a:solidFill>
-              </a:rPr>
-              <a:t> </a:t>
-            </a:r>
-            <a:r>
-              <a:rPr lang="en-US" dirty="0" smtClean="0"/>
-              <a:t>on some cases</a:t>
-            </a:r>
-          </a:p>
-          <a:p>
-            <a:r>
-              <a:rPr lang="en-US" dirty="0" smtClean="0"/>
-              <a:t>Distributed filesystems should also be able to move work around the data</a:t>
-            </a:r>
-          </a:p>
-          <a:p>
-            <a:r>
-              <a:rPr lang="en-US" dirty="0" smtClean="0"/>
-              <a:t>More distribution does not always improve performance</a:t>
+              <a:t>Data intensive</a:t>
+            </a:r>
+          </a:p>
+          <a:p>
+            <a:r>
+              <a:rPr lang="en-US" dirty="0" smtClean="0"/>
+              <a:t>Models used today</a:t>
             </a:r>
           </a:p>
           <a:p>
             <a:pPr lvl="1"/>
             <a:r>
               <a:rPr lang="en-US" dirty="0" smtClean="0"/>
-              <a:t>Amdahl’s Law</a:t>
+              <a:t>Distributed Filesystem</a:t>
+            </a:r>
+          </a:p>
+          <a:p>
+            <a:pPr lvl="1"/>
+            <a:r>
+              <a:rPr lang="en-US" dirty="0" smtClean="0"/>
+              <a:t>Distributed</a:t>
             </a:r>
           </a:p>
           <a:p>
             <a:pPr lvl="2"/>
             <a:r>
-              <a:rPr lang="en-US" sz="2000" dirty="0" smtClean="0">
-                <a:solidFill>
-                  <a:schemeClr val="tx1">
-                    <a:lumMod val="65000"/>
-                    <a:lumOff val="35000"/>
-                  </a:schemeClr>
-                </a:solidFill>
-              </a:rPr>
-              <a:t>Work takes a specified amount of time</a:t>
-            </a:r>
-          </a:p>
-          <a:p>
-            <a:pPr lvl="1"/>
-            <a:r>
-              <a:rPr lang="en-US" dirty="0" smtClean="0"/>
-              <a:t>Network latency and data/work transfers</a:t>
+              <a:rPr lang="en-US" dirty="0" smtClean="0"/>
+              <a:t>Conventional</a:t>
+            </a:r>
+          </a:p>
+          <a:p>
+            <a:pPr lvl="2"/>
+            <a:r>
+              <a:rPr lang="en-US" dirty="0" smtClean="0"/>
+              <a:t>Intelligent</a:t>
             </a:r>
           </a:p>
         </p:txBody>
@@ -7569,6 +7652,165 @@
       </p:grpSpPr>
       <p:sp>
         <p:nvSpPr>
+          <p:cNvPr id="2" name="Title 1"/>
+          <p:cNvSpPr>
+            <a:spLocks noGrp="1"/>
+          </p:cNvSpPr>
+          <p:nvPr>
+            <p:ph type="title"/>
+          </p:nvPr>
+        </p:nvSpPr>
+        <p:spPr/>
+        <p:txBody>
+          <a:bodyPr/>
+          <a:lstStyle/>
+          <a:p>
+            <a:r>
+              <a:rPr lang="en-US" dirty="0" smtClean="0"/>
+              <a:t>Conclusions</a:t>
+            </a:r>
+            <a:endParaRPr lang="en-US" dirty="0"/>
+          </a:p>
+        </p:txBody>
+      </p:sp>
+      <p:sp>
+        <p:nvSpPr>
+          <p:cNvPr id="3" name="Content Placeholder 2"/>
+          <p:cNvSpPr>
+            <a:spLocks noGrp="1"/>
+          </p:cNvSpPr>
+          <p:nvPr>
+            <p:ph idx="1"/>
+          </p:nvPr>
+        </p:nvSpPr>
+        <p:spPr/>
+        <p:txBody>
+          <a:bodyPr>
+            <a:normAutofit/>
+          </a:bodyPr>
+          <a:lstStyle/>
+          <a:p>
+            <a:r>
+              <a:rPr lang="en-US" dirty="0" smtClean="0"/>
+              <a:t>Data intensive applications need overhead for efficiency</a:t>
+            </a:r>
+          </a:p>
+          <a:p>
+            <a:pPr lvl="1"/>
+            <a:r>
+              <a:rPr lang="en-US" dirty="0" smtClean="0"/>
+              <a:t>Distributed Filesystem Model</a:t>
+            </a:r>
+          </a:p>
+          <a:p>
+            <a:pPr lvl="1"/>
+            <a:r>
+              <a:rPr lang="en-US" dirty="0" smtClean="0"/>
+              <a:t>Intelligent Distributed Model</a:t>
+            </a:r>
+          </a:p>
+          <a:p>
+            <a:r>
+              <a:rPr lang="en-US" dirty="0" smtClean="0"/>
+              <a:t>We were able to improve performance up to </a:t>
+            </a:r>
+            <a:r>
+              <a:rPr lang="en-US" dirty="0" smtClean="0">
+                <a:solidFill>
+                  <a:srgbClr val="FF0000"/>
+                </a:solidFill>
+              </a:rPr>
+              <a:t>50%</a:t>
+            </a:r>
+            <a:r>
+              <a:rPr lang="en-US" dirty="0" smtClean="0">
+                <a:solidFill>
+                  <a:schemeClr val="tx1"/>
+                </a:solidFill>
+              </a:rPr>
+              <a:t> </a:t>
+            </a:r>
+            <a:r>
+              <a:rPr lang="en-US" dirty="0" smtClean="0"/>
+              <a:t>on some cases</a:t>
+            </a:r>
+          </a:p>
+          <a:p>
+            <a:r>
+              <a:rPr lang="en-US" dirty="0" smtClean="0"/>
+              <a:t>Distributed filesystems should also be able to move work around the data</a:t>
+            </a:r>
+          </a:p>
+          <a:p>
+            <a:r>
+              <a:rPr lang="en-US" dirty="0" smtClean="0"/>
+              <a:t>More distribution does not always improve performance</a:t>
+            </a:r>
+          </a:p>
+          <a:p>
+            <a:pPr lvl="1"/>
+            <a:r>
+              <a:rPr lang="en-US" dirty="0" smtClean="0"/>
+              <a:t>Amdahl’s Law</a:t>
+            </a:r>
+          </a:p>
+          <a:p>
+            <a:pPr lvl="2"/>
+            <a:r>
+              <a:rPr lang="en-US" sz="2000" dirty="0" smtClean="0">
+                <a:solidFill>
+                  <a:schemeClr val="tx1">
+                    <a:lumMod val="65000"/>
+                    <a:lumOff val="35000"/>
+                  </a:schemeClr>
+                </a:solidFill>
+              </a:rPr>
+              <a:t>Work takes a specified amount of time</a:t>
+            </a:r>
+          </a:p>
+          <a:p>
+            <a:pPr lvl="1"/>
+            <a:r>
+              <a:rPr lang="en-US" dirty="0" smtClean="0"/>
+              <a:t>Network latency and data/work transfers</a:t>
+            </a:r>
+          </a:p>
+        </p:txBody>
+      </p:sp>
+    </p:spTree>
+  </p:cSld>
+  <p:clrMapOvr>
+    <a:masterClrMapping/>
+  </p:clrMapOvr>
+  <p:timing>
+    <p:tnLst>
+      <p:par>
+        <p:cTn id="1" dur="indefinite" restart="never" nodeType="tmRoot"/>
+      </p:par>
+    </p:tnLst>
+  </p:timing>
+</p:sld>
+</file>
+
+<file path=ppt/slides/slide18.xml><?xml version="1.0" encoding="utf-8"?>
+<p:sld xmlns:a="http://schemas.openxmlformats.org/drawingml/2006/main" xmlns:r="http://schemas.openxmlformats.org/officeDocument/2006/relationships" xmlns:p="http://schemas.openxmlformats.org/presentationml/2006/main">
+  <p:cSld>
+    <p:spTree>
+      <p:nvGrpSpPr>
+        <p:cNvPr id="1" name=""/>
+        <p:cNvGrpSpPr/>
+        <p:nvPr/>
+      </p:nvGrpSpPr>
+      <p:grpSpPr>
+        <a:xfrm>
+          <a:off x="0" y="0"/>
+          <a:ext cx="0" cy="0"/>
+          <a:chOff x="0" y="0"/>
+          <a:chExt cx="0" cy="0"/>
+        </a:xfrm>
+      </p:grpSpPr>
+      <p:sp>
+        <p:nvSpPr>
           <p:cNvPr id="68610" name="Title 1"/>
           <p:cNvSpPr>
             <a:spLocks noGrp="1"/>
@@ -7741,92 +7983,69 @@
         <p:spPr/>
         <p:txBody>
           <a:bodyPr>
-            <a:normAutofit fontScale="90000"/>
-          </a:bodyPr>
-          <a:lstStyle/>
-          <a:p>
-            <a:r>
-              <a:rPr lang="en-US" dirty="0" smtClean="0"/>
-              <a:t>SAGA – Simple API for Grid Applications</a:t>
-            </a:r>
-            <a:endParaRPr lang="en-US" dirty="0"/>
-          </a:p>
-        </p:txBody>
-      </p:sp>
-      <p:sp>
-        <p:nvSpPr>
-          <p:cNvPr id="3" name="Content Placeholder 2"/>
-          <p:cNvSpPr>
-            <a:spLocks noGrp="1"/>
-          </p:cNvSpPr>
-          <p:nvPr>
-            <p:ph idx="1"/>
-          </p:nvPr>
-        </p:nvSpPr>
-        <p:spPr/>
-        <p:txBody>
-          <a:bodyPr>
             <a:normAutofit/>
           </a:bodyPr>
           <a:lstStyle/>
           <a:p>
             <a:r>
               <a:rPr lang="en-US" dirty="0" smtClean="0"/>
-              <a:t>The SAGA Philosophy</a:t>
+              <a:t>Data-Intensive Applications</a:t>
+            </a:r>
+            <a:endParaRPr lang="en-US" dirty="0"/>
+          </a:p>
+        </p:txBody>
+      </p:sp>
+      <p:sp>
+        <p:nvSpPr>
+          <p:cNvPr id="3" name="Content Placeholder 2"/>
+          <p:cNvSpPr>
+            <a:spLocks noGrp="1"/>
+          </p:cNvSpPr>
+          <p:nvPr>
+            <p:ph idx="1"/>
+          </p:nvPr>
+        </p:nvSpPr>
+        <p:spPr/>
+        <p:txBody>
+          <a:bodyPr/>
+          <a:lstStyle/>
+          <a:p>
+            <a:r>
+              <a:rPr lang="en-US" dirty="0" smtClean="0"/>
+              <a:t>Grids, Clouds and Cloud-like infrastructure supporting the solution of large problems</a:t>
             </a:r>
           </a:p>
           <a:p>
             <a:pPr lvl="1"/>
             <a:r>
               <a:rPr lang="en-US" dirty="0" smtClean="0"/>
-              <a:t>A Fresh Perspective on Distributed Applications and CI</a:t>
-            </a:r>
-          </a:p>
-          <a:p>
-            <a:r>
-              <a:rPr lang="en-US" dirty="0" smtClean="0"/>
-              <a:t>SAGA in a Nutshell</a:t>
-            </a:r>
-          </a:p>
-          <a:p>
-            <a:pPr lvl="1"/>
-            <a:r>
-              <a:rPr lang="en-US" dirty="0" smtClean="0"/>
-              <a:t>SAGA Landscape</a:t>
-            </a:r>
-          </a:p>
-          <a:p>
-            <a:pPr lvl="1"/>
-            <a:r>
-              <a:rPr lang="en-US" dirty="0" smtClean="0"/>
-              <a:t>Individual APIs</a:t>
-            </a:r>
-          </a:p>
-          <a:p>
-            <a:pPr lvl="1"/>
-            <a:r>
-              <a:rPr lang="en-US" dirty="0" smtClean="0"/>
-              <a:t>OGF standard</a:t>
-            </a:r>
-          </a:p>
-          <a:p>
-            <a:r>
-              <a:rPr lang="en-US" dirty="0" smtClean="0"/>
-              <a:t>SAGA in action</a:t>
-            </a:r>
-          </a:p>
-          <a:p>
-            <a:pPr lvl="1"/>
-            <a:r>
-              <a:rPr lang="en-US" dirty="0" smtClean="0"/>
-              <a:t>Applications</a:t>
-            </a:r>
-          </a:p>
-          <a:p>
-            <a:pPr lvl="1"/>
-            <a:r>
-              <a:rPr lang="en-US" dirty="0" smtClean="0"/>
-              <a:t>Tools, Frameworks, Gateways, Access Layers..</a:t>
+              <a:t>Google’s 20 </a:t>
+            </a:r>
+            <a:r>
+              <a:rPr lang="en-US" dirty="0" err="1" smtClean="0"/>
+              <a:t>petabytes</a:t>
+            </a:r>
+            <a:r>
+              <a:rPr lang="en-US" dirty="0" smtClean="0"/>
+              <a:t> of data processed per day</a:t>
+            </a:r>
+          </a:p>
+          <a:p>
+            <a:r>
+              <a:rPr lang="en-US" dirty="0" smtClean="0"/>
+              <a:t>Unique performance issues as data sets become large</a:t>
+            </a:r>
+          </a:p>
+          <a:p>
+            <a:r>
+              <a:rPr lang="en-US" dirty="0" smtClean="0"/>
+              <a:t>Developer should take precautions when placing, scheduling and managing such large volumes of data</a:t>
+            </a:r>
+          </a:p>
+          <a:p>
+            <a:r>
+              <a:rPr lang="en-US" dirty="0" smtClean="0"/>
+              <a:t>Scalable placement and management techniques are required (e.g., distributed file-systems)</a:t>
             </a:r>
           </a:p>
         </p:txBody>
@@ -7876,13 +8095,13 @@
         <p:spPr/>
         <p:txBody>
           <a:bodyPr>
-            <a:normAutofit/>
+            <a:normAutofit fontScale="90000"/>
           </a:bodyPr>
           <a:lstStyle/>
           <a:p>
             <a:r>
-              <a:rPr lang="en-US" dirty="0" err="1" smtClean="0"/>
-              <a:t>AllPairs</a:t>
+              <a:rPr lang="en-US" dirty="0" smtClean="0"/>
+              <a:t>SAGA – Simple API for Grid Applications</a:t>
             </a:r>
             <a:endParaRPr lang="en-US" dirty="0"/>
           </a:p>
@@ -7906,26 +8125,63 @@
           <a:lstStyle/>
           <a:p>
             <a:r>
-              <a:rPr lang="en-US" dirty="0" err="1" smtClean="0"/>
-              <a:t>Yada</a:t>
-            </a:r>
-            <a:r>
-              <a:rPr lang="en-US" dirty="0" smtClean="0"/>
-              <a:t> </a:t>
-            </a:r>
-            <a:r>
-              <a:rPr lang="en-US" dirty="0" err="1" smtClean="0"/>
-              <a:t>yada</a:t>
-            </a:r>
-            <a:r>
-              <a:rPr lang="en-US" dirty="0" smtClean="0"/>
-              <a:t> </a:t>
-            </a:r>
-            <a:r>
-              <a:rPr lang="en-US" smtClean="0"/>
-              <a:t>yada</a:t>
-            </a:r>
-            <a:endParaRPr lang="en-US" dirty="0" smtClean="0"/>
+              <a:rPr lang="en-US" dirty="0" smtClean="0"/>
+              <a:t>The SAGA Philosophy</a:t>
+            </a:r>
+          </a:p>
+          <a:p>
+            <a:pPr lvl="1"/>
+            <a:r>
+              <a:rPr lang="en-US" dirty="0" smtClean="0"/>
+              <a:t>A Fresh Perspective on Distributed Applications and CI</a:t>
+            </a:r>
+          </a:p>
+          <a:p>
+            <a:r>
+              <a:rPr lang="en-US" dirty="0" smtClean="0"/>
+              <a:t>SAGA in a Nutshell</a:t>
+            </a:r>
+          </a:p>
+          <a:p>
+            <a:pPr lvl="1"/>
+            <a:r>
+              <a:rPr lang="en-US" dirty="0" smtClean="0"/>
+              <a:t>SAGA Landscape</a:t>
+            </a:r>
+          </a:p>
+          <a:p>
+            <a:pPr lvl="1"/>
+            <a:r>
+              <a:rPr lang="en-US" dirty="0" smtClean="0"/>
+              <a:t>Individual APIs</a:t>
+            </a:r>
+          </a:p>
+          <a:p>
+            <a:pPr lvl="1"/>
+            <a:r>
+              <a:rPr lang="en-US" dirty="0" smtClean="0"/>
+              <a:t>OGF standard</a:t>
+            </a:r>
+          </a:p>
+          <a:p>
+            <a:r>
+              <a:rPr lang="en-US" dirty="0" smtClean="0"/>
+              <a:t>SAGA in action</a:t>
+            </a:r>
+          </a:p>
+          <a:p>
+            <a:pPr lvl="1"/>
+            <a:r>
+              <a:rPr lang="en-US" dirty="0" smtClean="0"/>
+              <a:t>Applications</a:t>
+            </a:r>
+          </a:p>
+          <a:p>
+            <a:pPr lvl="1"/>
+            <a:r>
+              <a:rPr lang="en-US" dirty="0" smtClean="0"/>
+              <a:t>Tools, Frameworks, Gateways, Access Layers..</a:t>
+            </a:r>
           </a:p>
         </p:txBody>
       </p:sp>
@@ -7978,7 +8234,7 @@
           <a:p>
             <a:r>
               <a:rPr lang="en-US" dirty="0" smtClean="0"/>
-              <a:t>Central Model</a:t>
+              <a:t>All-Pair Abstraction</a:t>
             </a:r>
             <a:endParaRPr lang="en-US" dirty="0"/>
           </a:p>
@@ -8003,38 +8259,47 @@
           <a:p>
             <a:r>
               <a:rPr lang="en-US" dirty="0" smtClean="0"/>
-              <a:t>Model traditionally used</a:t>
-            </a:r>
-          </a:p>
-          <a:p>
-            <a:r>
-              <a:rPr lang="en-US" dirty="0" smtClean="0"/>
-              <a:t>Data at central site</a:t>
-            </a:r>
-          </a:p>
-          <a:p>
-            <a:r>
-              <a:rPr lang="en-US" dirty="0" smtClean="0"/>
-              <a:t>Data Access	</a:t>
+              <a:t>We want to understand</a:t>
             </a:r>
           </a:p>
           <a:p>
             <a:pPr lvl="1"/>
             <a:r>
               <a:rPr lang="en-US" dirty="0" smtClean="0"/>
-              <a:t>Resource requests data from central site</a:t>
-            </a:r>
-          </a:p>
-          <a:p>
-            <a:r>
-              <a:rPr lang="en-US" dirty="0" smtClean="0"/>
-              <a:t>Compute assumed large, data I/O assumed small</a:t>
-            </a:r>
-          </a:p>
-          <a:p>
-            <a:r>
-              <a:rPr lang="en-US" dirty="0" smtClean="0"/>
-              <a:t>Bottleneck forms when data becomes larger</a:t>
+              <a:t>Performance tradeoffs of a DFS compared to “regular” distribution and placement techniques</a:t>
+            </a:r>
+          </a:p>
+          <a:p>
+            <a:pPr lvl="1"/>
+            <a:r>
+              <a:rPr lang="en-US" dirty="0" smtClean="0"/>
+              <a:t>How sensitive the performance is in the context of a real data-intensive distributed application.</a:t>
+            </a:r>
+          </a:p>
+          <a:p>
+            <a:r>
+              <a:rPr lang="en-US" dirty="0" smtClean="0"/>
+              <a:t>We use a grid-enabled All-Pair abstraction</a:t>
+            </a:r>
+          </a:p>
+          <a:p>
+            <a:pPr lvl="1"/>
+            <a:r>
+              <a:rPr lang="en-US" dirty="0" smtClean="0"/>
+              <a:t>Applies an operation on the input data-set such that every possible pair in the set is input to the operation.</a:t>
+            </a:r>
+          </a:p>
+          <a:p>
+            <a:r>
+              <a:rPr lang="en-US" dirty="0" smtClean="0"/>
+              <a:t>Our application compares ‘genome’ files that consist of random combinations of ACGT</a:t>
+            </a:r>
+          </a:p>
+          <a:p>
+            <a:pPr lvl="1"/>
+            <a:r>
+              <a:rPr lang="en-US" dirty="0" smtClean="0"/>
+              <a:t>Use a weight measure to measure to similarity of the strings </a:t>
             </a:r>
           </a:p>
         </p:txBody>
@@ -8083,29 +8348,6 @@
         </p:nvSpPr>
         <p:spPr/>
         <p:txBody>
-          <a:bodyPr/>
-          <a:lstStyle/>
-          <a:p>
-            <a:r>
-              <a:rPr lang="en-US" dirty="0" smtClean="0"/>
-              <a:t>Distributed Model</a:t>
-            </a:r>
-            <a:endParaRPr lang="en-US" dirty="0"/>
-          </a:p>
-        </p:txBody>
-      </p:sp>
-      <p:sp>
-        <p:nvSpPr>
-          <p:cNvPr id="3" name="Content Placeholder 2"/>
-          <p:cNvSpPr>
-            <a:spLocks noGrp="1"/>
-          </p:cNvSpPr>
-          <p:nvPr>
-            <p:ph idx="1"/>
-          </p:nvPr>
-        </p:nvSpPr>
-        <p:spPr/>
-        <p:txBody>
           <a:bodyPr>
             <a:normAutofit/>
           </a:bodyPr>
@@ -8113,54 +8355,83 @@
           <a:p>
             <a:r>
               <a:rPr lang="en-US" dirty="0" smtClean="0"/>
-              <a:t>Data is spread over many machines</a:t>
-            </a:r>
-          </a:p>
-          <a:p>
-            <a:r>
-              <a:rPr lang="en-US" dirty="0" smtClean="0"/>
-              <a:t>Data Access</a:t>
+              <a:t>All-Pairs + Large Data</a:t>
+            </a:r>
+            <a:endParaRPr lang="en-US" dirty="0"/>
+          </a:p>
+        </p:txBody>
+      </p:sp>
+      <p:sp>
+        <p:nvSpPr>
+          <p:cNvPr id="3" name="Content Placeholder 2"/>
+          <p:cNvSpPr>
+            <a:spLocks noGrp="1"/>
+          </p:cNvSpPr>
+          <p:nvPr>
+            <p:ph idx="1"/>
+          </p:nvPr>
+        </p:nvSpPr>
+        <p:spPr/>
+        <p:txBody>
+          <a:bodyPr>
+            <a:normAutofit/>
+          </a:bodyPr>
+          <a:lstStyle/>
+          <a:p>
+            <a:r>
+              <a:rPr lang="en-US" dirty="0" smtClean="0"/>
+              <a:t>The application spawns distributed jobs to run sets of these pairs. </a:t>
+            </a:r>
+          </a:p>
+          <a:p>
+            <a:r>
+              <a:rPr lang="en-US" dirty="0" smtClean="0"/>
+              <a:t>The problem becomes:</a:t>
             </a:r>
           </a:p>
           <a:p>
             <a:pPr lvl="1"/>
             <a:r>
               <a:rPr lang="en-US" dirty="0" smtClean="0"/>
-              <a:t>Resources share data with other resources</a:t>
-            </a:r>
-          </a:p>
-          <a:p>
-            <a:r>
-              <a:rPr lang="en-US" dirty="0" smtClean="0"/>
-              <a:t>Conventional Model</a:t>
+              <a:t>Determining which pairs to put into a set, and with which distributed resource to run that set. </a:t>
             </a:r>
           </a:p>
           <a:p>
             <a:pPr lvl="1"/>
             <a:r>
               <a:rPr lang="en-US" dirty="0" smtClean="0"/>
-              <a:t>No planning when placing data</a:t>
-            </a:r>
-          </a:p>
-          <a:p>
-            <a:r>
-              <a:rPr lang="en-US" dirty="0" smtClean="0"/>
-              <a:t>Intelligent Model</a:t>
-            </a:r>
-          </a:p>
-          <a:p>
-            <a:pPr lvl="1"/>
-            <a:r>
-              <a:rPr lang="en-US" dirty="0" smtClean="0"/>
-              <a:t>Data is dynamic</a:t>
-            </a:r>
-          </a:p>
-          <a:p>
-            <a:pPr lvl="1"/>
-            <a:r>
-              <a:rPr lang="en-US" dirty="0" smtClean="0"/>
-              <a:t>Task is mapped to a resource based on tasks’ data dependencies</a:t>
-            </a:r>
+              <a:t>Data management vs. computation</a:t>
+            </a:r>
+          </a:p>
+          <a:p>
+            <a:pPr lvl="2"/>
+            <a:r>
+              <a:rPr lang="en-US" dirty="0" smtClean="0"/>
+              <a:t> There may be a slower, but network-close resource</a:t>
+            </a:r>
+          </a:p>
+          <a:p>
+            <a:r>
+              <a:rPr lang="en-US" dirty="0" smtClean="0"/>
+              <a:t>We used </a:t>
+            </a:r>
+            <a:r>
+              <a:rPr lang="en-US" dirty="0" err="1" smtClean="0"/>
+              <a:t>CloudStore</a:t>
+            </a:r>
+            <a:r>
+              <a:rPr lang="en-US" dirty="0" smtClean="0"/>
+              <a:t> (formerly </a:t>
+            </a:r>
+            <a:r>
+              <a:rPr lang="en-US" dirty="0" err="1" smtClean="0"/>
+              <a:t>KosmosFS</a:t>
+            </a:r>
+            <a:r>
+              <a:rPr lang="en-US" dirty="0" smtClean="0"/>
+              <a:t>), an open-source high performance DFS based on Google's distributed filesystem GFS.</a:t>
+            </a:r>
+            <a:endParaRPr lang="en-US" dirty="0"/>
           </a:p>
         </p:txBody>
       </p:sp>
@@ -8213,7 +8484,7 @@
           <a:p>
             <a:r>
               <a:rPr lang="en-US" dirty="0" smtClean="0"/>
-              <a:t>Central vs. Distributed</a:t>
+              <a:t>Central Model</a:t>
             </a:r>
             <a:endParaRPr lang="en-US" dirty="0"/>
           </a:p>
@@ -8238,55 +8509,38 @@
           <a:p>
             <a:r>
               <a:rPr lang="en-US" dirty="0" smtClean="0"/>
-              <a:t>Central</a:t>
+              <a:t>Model traditionally used</a:t>
+            </a:r>
+          </a:p>
+          <a:p>
+            <a:r>
+              <a:rPr lang="en-US" dirty="0" smtClean="0"/>
+              <a:t>Data at central site</a:t>
+            </a:r>
+          </a:p>
+          <a:p>
+            <a:r>
+              <a:rPr lang="en-US" dirty="0" smtClean="0"/>
+              <a:t>Data Access	</a:t>
             </a:r>
           </a:p>
           <a:p>
             <a:pPr lvl="1"/>
             <a:r>
               <a:rPr lang="en-US" dirty="0" smtClean="0"/>
-              <a:t>Ignore dependencies</a:t>
-            </a:r>
-          </a:p>
-          <a:p>
-            <a:r>
-              <a:rPr lang="en-US" dirty="0" smtClean="0"/>
-              <a:t>Distributed</a:t>
-            </a:r>
-          </a:p>
-          <a:p>
-            <a:pPr lvl="1"/>
-            <a:r>
-              <a:rPr lang="en-US" dirty="0" smtClean="0"/>
-              <a:t>Conventional</a:t>
-            </a:r>
-          </a:p>
-          <a:p>
-            <a:pPr lvl="2"/>
-            <a:r>
-              <a:rPr lang="en-US" dirty="0" smtClean="0"/>
-              <a:t>Removes central dependency</a:t>
-            </a:r>
-          </a:p>
-          <a:p>
-            <a:pPr lvl="2"/>
-            <a:r>
-              <a:rPr lang="en-US" dirty="0" smtClean="0"/>
-              <a:t>Ignore dependencies</a:t>
-            </a:r>
-          </a:p>
-          <a:p>
-            <a:pPr lvl="1"/>
-            <a:r>
-              <a:rPr lang="en-US" dirty="0" smtClean="0"/>
-              <a:t>Intelligent</a:t>
-            </a:r>
-          </a:p>
-          <a:p>
-            <a:pPr lvl="2"/>
-            <a:r>
-              <a:rPr lang="en-US" dirty="0" smtClean="0"/>
-              <a:t>Utilize knowledge of network latency and data dependencies</a:t>
+              <a:t>Resource requests data from central site</a:t>
+            </a:r>
+          </a:p>
+          <a:p>
+            <a:r>
+              <a:rPr lang="en-US" dirty="0" smtClean="0"/>
+              <a:t>Compute assumed large, data I/O assumed small</a:t>
+            </a:r>
+          </a:p>
+          <a:p>
+            <a:r>
+              <a:rPr lang="en-US" dirty="0" smtClean="0"/>
+              <a:t>Bottleneck forms when data becomes larger</a:t>
             </a:r>
           </a:p>
         </p:txBody>
@@ -8340,7 +8594,7 @@
           <a:p>
             <a:r>
               <a:rPr lang="en-US" dirty="0" smtClean="0"/>
-              <a:t>Results from Comparative Tests</a:t>
+              <a:t>Distributed Model</a:t>
             </a:r>
             <a:endParaRPr lang="en-US" dirty="0"/>
           </a:p>
@@ -8356,12 +8610,7 @@
             <p:ph idx="1"/>
           </p:nvPr>
         </p:nvSpPr>
-        <p:spPr>
-          <a:xfrm>
-            <a:off x="757947" y="1529880"/>
-            <a:ext cx="4797464" cy="4608884"/>
-          </a:xfrm>
-        </p:spPr>
+        <p:spPr/>
         <p:txBody>
           <a:bodyPr>
             <a:normAutofit/>
@@ -8370,49 +8619,57 @@
           <a:p>
             <a:r>
               <a:rPr lang="en-US" dirty="0" smtClean="0"/>
-              <a:t>Intelligence is worth the overhead</a:t>
-            </a:r>
-          </a:p>
-          <a:p>
-            <a:r>
-              <a:rPr lang="en-US" dirty="0" smtClean="0"/>
-              <a:t>Intelligence ~1% overall time</a:t>
-            </a:r>
-          </a:p>
-          <a:p>
-            <a:r>
-              <a:rPr lang="en-US" dirty="0" smtClean="0"/>
-              <a:t>~40% reduction in overall time!</a:t>
-            </a:r>
-          </a:p>
-          <a:p>
-            <a:r>
-              <a:rPr lang="en-US" dirty="0" smtClean="0"/>
-              <a:t>Very simple intelligence</a:t>
-            </a:r>
-          </a:p>
-        </p:txBody>
-      </p:sp>
-      <p:graphicFrame>
-        <p:nvGraphicFramePr>
-          <p:cNvPr id="162818" name="Object 2"/>
-          <p:cNvGraphicFramePr>
-            <a:graphicFrameLocks noChangeAspect="1"/>
-          </p:cNvGraphicFramePr>
-          <p:nvPr/>
-        </p:nvGraphicFramePr>
-        <p:xfrm>
-          <a:off x="5059392" y="2133600"/>
-          <a:ext cx="3876667" cy="4370289"/>
-        </p:xfrm>
-        <a:graphic>
-          <a:graphicData uri="http://schemas.openxmlformats.org/presentationml/2006/ole">
-            <p:oleObj spid="_x0000_s162818" r:id="rId3" imgW="5190840" imgH="5847840" progId="">
-              <p:embed/>
-            </p:oleObj>
-          </a:graphicData>
-        </a:graphic>
-      </p:graphicFrame>
+              <a:t>Data is spread over many machines</a:t>
+            </a:r>
+          </a:p>
+          <a:p>
+            <a:r>
+              <a:rPr lang="en-US" dirty="0" smtClean="0"/>
+              <a:t>Data Access</a:t>
+            </a:r>
+          </a:p>
+          <a:p>
+            <a:pPr lvl="1"/>
+            <a:r>
+              <a:rPr lang="en-US" dirty="0" smtClean="0"/>
+              <a:t>Resources share data with other resources</a:t>
+            </a:r>
+          </a:p>
+          <a:p>
+            <a:r>
+              <a:rPr lang="en-US" dirty="0" smtClean="0"/>
+              <a:t>Conventional Model</a:t>
+            </a:r>
+          </a:p>
+          <a:p>
+            <a:pPr lvl="1"/>
+            <a:r>
+              <a:rPr lang="en-US" dirty="0" smtClean="0"/>
+              <a:t>No planning when placing data</a:t>
+            </a:r>
+          </a:p>
+          <a:p>
+            <a:r>
+              <a:rPr lang="en-US" dirty="0" smtClean="0"/>
+              <a:t>Intelligent Model</a:t>
+            </a:r>
+          </a:p>
+          <a:p>
+            <a:pPr lvl="1"/>
+            <a:r>
+              <a:rPr lang="en-US" dirty="0" smtClean="0"/>
+              <a:t>Data is dynamic</a:t>
+            </a:r>
+          </a:p>
+          <a:p>
+            <a:pPr lvl="1"/>
+            <a:r>
+              <a:rPr lang="en-US" dirty="0" smtClean="0"/>
+              <a:t>Task is mapped to a resource based on tasks’ data dependencies</a:t>
+            </a:r>
+          </a:p>
+        </p:txBody>
+      </p:sp>
     </p:spTree>
   </p:cSld>
   <p:clrMapOvr>
@@ -8457,6 +8714,29 @@
         </p:nvSpPr>
         <p:spPr/>
         <p:txBody>
+          <a:bodyPr/>
+          <a:lstStyle/>
+          <a:p>
+            <a:r>
+              <a:rPr lang="en-US" dirty="0" smtClean="0"/>
+              <a:t>Central vs. Distributed</a:t>
+            </a:r>
+            <a:endParaRPr lang="en-US" dirty="0"/>
+          </a:p>
+        </p:txBody>
+      </p:sp>
+      <p:sp>
+        <p:nvSpPr>
+          <p:cNvPr id="3" name="Content Placeholder 2"/>
+          <p:cNvSpPr>
+            <a:spLocks noGrp="1"/>
+          </p:cNvSpPr>
+          <p:nvPr>
+            <p:ph idx="1"/>
+          </p:nvPr>
+        </p:nvSpPr>
+        <p:spPr/>
+        <p:txBody>
           <a:bodyPr>
             <a:normAutofit/>
           </a:bodyPr>
@@ -8464,75 +8744,59 @@
           <a:p>
             <a:r>
               <a:rPr lang="en-US" dirty="0" smtClean="0"/>
-              <a:t>Distributed Model (Conventional)</a:t>
-            </a:r>
-            <a:endParaRPr lang="en-US" dirty="0"/>
-          </a:p>
-        </p:txBody>
-      </p:sp>
-      <p:sp>
-        <p:nvSpPr>
-          <p:cNvPr id="3" name="Content Placeholder 2"/>
-          <p:cNvSpPr>
-            <a:spLocks noGrp="1"/>
-          </p:cNvSpPr>
-          <p:nvPr>
-            <p:ph idx="1"/>
-          </p:nvPr>
-        </p:nvSpPr>
-        <p:spPr>
-          <a:xfrm>
-            <a:off x="757947" y="1529880"/>
-            <a:ext cx="3382732" cy="4608884"/>
-          </a:xfrm>
-        </p:spPr>
-        <p:txBody>
-          <a:bodyPr>
-            <a:normAutofit/>
-          </a:bodyPr>
-          <a:lstStyle/>
-          <a:p>
-            <a:r>
-              <a:rPr lang="en-US" dirty="0" smtClean="0"/>
-              <a:t>Times decrease with respect to number of workers</a:t>
-            </a:r>
-          </a:p>
-          <a:p>
-            <a:r>
-              <a:rPr lang="en-US" dirty="0" smtClean="0"/>
-              <a:t>Remote data is expensive</a:t>
-            </a:r>
-          </a:p>
-          <a:p>
-            <a:r>
-              <a:rPr lang="en-US" dirty="0" smtClean="0"/>
-              <a:t>Minimum time required to handle requests from same server</a:t>
-            </a:r>
-          </a:p>
-          <a:p>
-            <a:endParaRPr lang="en-US" dirty="0" smtClean="0"/>
-          </a:p>
-          <a:p>
-            <a:endParaRPr lang="en-US" dirty="0" smtClean="0"/>
-          </a:p>
-        </p:txBody>
-      </p:sp>
-      <p:graphicFrame>
-        <p:nvGraphicFramePr>
-          <p:cNvPr id="5" name="Chart 4"/>
-          <p:cNvGraphicFramePr/>
-          <p:nvPr/>
-        </p:nvGraphicFramePr>
-        <p:xfrm>
-          <a:off x="4140679" y="1529880"/>
-          <a:ext cx="4686300" cy="3856508"/>
-        </p:xfrm>
-        <a:graphic>
-          <a:graphicData uri="http://schemas.openxmlformats.org/drawingml/2006/chart">
-            <c:chart xmlns:c="http://schemas.openxmlformats.org/drawingml/2006/chart" xmlns:r="http://schemas.openxmlformats.org/officeDocument/2006/relationships" r:id="rId2"/>
-          </a:graphicData>
-        </a:graphic>
-      </p:graphicFrame>
+              <a:t>Central</a:t>
+            </a:r>
+          </a:p>
+          <a:p>
+            <a:pPr lvl="1"/>
+            <a:r>
+              <a:rPr lang="en-US" dirty="0" smtClean="0"/>
+              <a:t>Ignore dependencies</a:t>
+            </a:r>
+          </a:p>
+          <a:p>
+            <a:r>
+              <a:rPr lang="en-US" dirty="0" smtClean="0"/>
+              <a:t>Distributed</a:t>
+            </a:r>
+          </a:p>
+          <a:p>
+            <a:pPr lvl="1"/>
+            <a:r>
+              <a:rPr lang="en-US" dirty="0" smtClean="0"/>
+              <a:t>Conventional</a:t>
+            </a:r>
+          </a:p>
+          <a:p>
+            <a:pPr lvl="2"/>
+            <a:r>
+              <a:rPr lang="en-US" dirty="0" smtClean="0"/>
+              <a:t>Removes central dependency</a:t>
+            </a:r>
+          </a:p>
+          <a:p>
+            <a:pPr lvl="2"/>
+            <a:r>
+              <a:rPr lang="en-US" dirty="0" smtClean="0"/>
+              <a:t>Ignore dependencies</a:t>
+            </a:r>
+          </a:p>
+          <a:p>
+            <a:pPr lvl="1"/>
+            <a:r>
+              <a:rPr lang="en-US" dirty="0" smtClean="0"/>
+              <a:t>Intelligent</a:t>
+            </a:r>
+          </a:p>
+          <a:p>
+            <a:pPr lvl="2"/>
+            <a:r>
+              <a:rPr lang="en-US" dirty="0" smtClean="0"/>
+              <a:t>Utilize knowledge of network latency and data dependencies</a:t>
+            </a:r>
+          </a:p>
+        </p:txBody>
+      </p:sp>
     </p:spTree>
   </p:cSld>
   <p:clrMapOvr>
@@ -8584,7 +8848,7 @@
           <a:p>
             <a:r>
               <a:rPr lang="en-US" dirty="0" smtClean="0"/>
-              <a:t>Distributed Model (Intelligent)</a:t>
+              <a:t>Distributed Model (Conventional)</a:t>
             </a:r>
             <a:endParaRPr lang="en-US" dirty="0"/>
           </a:p>
@@ -8614,32 +8878,38 @@
           <a:p>
             <a:r>
               <a:rPr lang="en-US" dirty="0" smtClean="0"/>
-              <a:t>Results go here</a:t>
-            </a:r>
-          </a:p>
-          <a:p>
-            <a:r>
-              <a:rPr lang="en-US" dirty="0" smtClean="0"/>
-              <a:t>…</a:t>
-            </a:r>
-          </a:p>
-          <a:p>
-            <a:r>
-              <a:rPr lang="en-US" dirty="0" smtClean="0"/>
-              <a:t>Some more comments</a:t>
-            </a:r>
+              <a:t>Times decrease with respect to number of workers</a:t>
+            </a:r>
+          </a:p>
+          <a:p>
+            <a:r>
+              <a:rPr lang="en-US" dirty="0" smtClean="0"/>
+              <a:t>Remote data is expensive</a:t>
+            </a:r>
+          </a:p>
+          <a:p>
+            <a:r>
+              <a:rPr lang="en-US" dirty="0" smtClean="0"/>
+              <a:t>Minimum time required to handle requests from same server</a:t>
+            </a:r>
+          </a:p>
+          <a:p>
+            <a:endParaRPr lang="en-US" dirty="0" smtClean="0"/>
+          </a:p>
+          <a:p>
+            <a:endParaRPr lang="en-US" dirty="0" smtClean="0"/>
           </a:p>
         </p:txBody>
       </p:sp>
       <p:graphicFrame>
         <p:nvGraphicFramePr>
-          <p:cNvPr id="6" name="Chart 5"/>
+          <p:cNvPr id="5" name="Chart 4"/>
           <p:cNvGraphicFramePr/>
           <p:nvPr/>
         </p:nvGraphicFramePr>
         <p:xfrm>
-          <a:off x="4094641" y="1529880"/>
-          <a:ext cx="4765153" cy="3499320"/>
+          <a:off x="4140679" y="1529880"/>
+          <a:ext cx="4686300" cy="3856508"/>
         </p:xfrm>
         <a:graphic>
           <a:graphicData uri="http://schemas.openxmlformats.org/drawingml/2006/chart">

</xml_diff>

<commit_message>
Updates again, Shantenu, please comment
git-svn-id: file://localhost/tmp/svn2git/svn@2050 defb5e50-622e-49ec-a68e-d72c7db87b45
</commit_message>
<xml_diff>
--- a/papers/data_intensive/eScience09/RoyalSocietyPresentation.pptx
+++ b/papers/data_intensive/eScience09/RoyalSocietyPresentation.pptx
@@ -253,7 +253,7 @@
                   <c:v>1254.4270000000001</c:v>
                 </c:pt>
                 <c:pt idx="2">
-                  <c:v>680.45199999999966</c:v>
+                  <c:v>680.45199999999954</c:v>
                 </c:pt>
                 <c:pt idx="3">
                   <c:v>386.74700000000001</c:v>
@@ -263,11 +263,11 @@
           </c:val>
         </c:ser>
         <c:marker val="1"/>
-        <c:axId val="56224000"/>
-        <c:axId val="56426880"/>
+        <c:axId val="65198336"/>
+        <c:axId val="66326912"/>
       </c:lineChart>
       <c:catAx>
-        <c:axId val="56224000"/>
+        <c:axId val="65198336"/>
         <c:scaling>
           <c:orientation val="minMax"/>
         </c:scaling>
@@ -291,14 +291,14 @@
           <c:layout/>
         </c:title>
         <c:tickLblPos val="nextTo"/>
-        <c:crossAx val="56426880"/>
+        <c:crossAx val="66326912"/>
         <c:crosses val="autoZero"/>
         <c:auto val="1"/>
         <c:lblAlgn val="ctr"/>
         <c:lblOffset val="100"/>
       </c:catAx>
       <c:valAx>
-        <c:axId val="56426880"/>
+        <c:axId val="66326912"/>
         <c:scaling>
           <c:orientation val="minMax"/>
         </c:scaling>
@@ -324,7 +324,7 @@
         </c:title>
         <c:numFmt formatCode="General" sourceLinked="1"/>
         <c:tickLblPos val="nextTo"/>
-        <c:crossAx val="56224000"/>
+        <c:crossAx val="65198336"/>
         <c:crosses val="autoZero"/>
         <c:crossBetween val="between"/>
       </c:valAx>
@@ -443,7 +443,7 @@
                   <c:v>1254.4270000000001</c:v>
                 </c:pt>
                 <c:pt idx="1">
-                  <c:v>680.45199999999988</c:v>
+                  <c:v>680.45199999999977</c:v>
                 </c:pt>
                 <c:pt idx="2">
                   <c:v>386.74700000000001</c:v>
@@ -453,11 +453,11 @@
           </c:val>
         </c:ser>
         <c:marker val="1"/>
-        <c:axId val="56464896"/>
-        <c:axId val="56466816"/>
+        <c:axId val="66360832"/>
+        <c:axId val="66362752"/>
       </c:lineChart>
       <c:catAx>
-        <c:axId val="56464896"/>
+        <c:axId val="66360832"/>
         <c:scaling>
           <c:orientation val="minMax"/>
         </c:scaling>
@@ -482,14 +482,14 @@
         </c:title>
         <c:numFmt formatCode="General" sourceLinked="1"/>
         <c:tickLblPos val="nextTo"/>
-        <c:crossAx val="56466816"/>
+        <c:crossAx val="66362752"/>
         <c:crosses val="autoZero"/>
         <c:auto val="1"/>
         <c:lblAlgn val="ctr"/>
         <c:lblOffset val="100"/>
       </c:catAx>
       <c:valAx>
-        <c:axId val="56466816"/>
+        <c:axId val="66362752"/>
         <c:scaling>
           <c:orientation val="minMax"/>
         </c:scaling>
@@ -520,7 +520,7 @@
         </c:title>
         <c:numFmt formatCode="General" sourceLinked="1"/>
         <c:tickLblPos val="nextTo"/>
-        <c:crossAx val="56464896"/>
+        <c:crossAx val="66360832"/>
         <c:crosses val="autoZero"/>
         <c:crossBetween val="between"/>
       </c:valAx>
@@ -597,24 +597,24 @@
             </c:numRef>
           </c:val>
         </c:ser>
-        <c:axId val="65167744"/>
-        <c:axId val="65222144"/>
+        <c:axId val="66658304"/>
+        <c:axId val="66659840"/>
       </c:barChart>
       <c:catAx>
-        <c:axId val="65167744"/>
+        <c:axId val="66658304"/>
         <c:scaling>
           <c:orientation val="minMax"/>
         </c:scaling>
         <c:axPos val="b"/>
         <c:tickLblPos val="nextTo"/>
-        <c:crossAx val="65222144"/>
+        <c:crossAx val="66659840"/>
         <c:crosses val="autoZero"/>
         <c:auto val="1"/>
         <c:lblAlgn val="ctr"/>
         <c:lblOffset val="100"/>
       </c:catAx>
       <c:valAx>
-        <c:axId val="65222144"/>
+        <c:axId val="66659840"/>
         <c:scaling>
           <c:orientation val="minMax"/>
         </c:scaling>
@@ -640,7 +640,7 @@
         </c:title>
         <c:numFmt formatCode="General" sourceLinked="1"/>
         <c:tickLblPos val="nextTo"/>
-        <c:crossAx val="65167744"/>
+        <c:crossAx val="66658304"/>
         <c:crosses val="autoZero"/>
         <c:crossBetween val="between"/>
       </c:valAx>
@@ -729,13 +729,13 @@
                 <c:formatCode>General</c:formatCode>
                 <c:ptCount val="4"/>
                 <c:pt idx="0">
-                  <c:v>493.99799999999976</c:v>
+                  <c:v>493.99799999999965</c:v>
                 </c:pt>
                 <c:pt idx="1">
-                  <c:v>244.9980000000001</c:v>
+                  <c:v>244.99800000000013</c:v>
                 </c:pt>
                 <c:pt idx="2">
-                  <c:v>166.9980000000001</c:v>
+                  <c:v>166.99800000000013</c:v>
                 </c:pt>
                 <c:pt idx="3">
                   <c:v>112.998</c:v>
@@ -760,13 +760,13 @@
                 <c:formatCode>General</c:formatCode>
                 <c:ptCount val="4"/>
                 <c:pt idx="1">
-                  <c:v>445.00199999999978</c:v>
+                  <c:v>445.00199999999967</c:v>
                 </c:pt>
                 <c:pt idx="2">
                   <c:v>336</c:v>
                 </c:pt>
                 <c:pt idx="3">
-                  <c:v>190.99800000000008</c:v>
+                  <c:v>190.9980000000001</c:v>
                 </c:pt>
               </c:numCache>
             </c:numRef>
@@ -804,11 +804,11 @@
           </c:val>
         </c:ser>
         <c:marker val="1"/>
-        <c:axId val="57215232"/>
-        <c:axId val="57225600"/>
+        <c:axId val="66711552"/>
+        <c:axId val="66713472"/>
       </c:lineChart>
       <c:catAx>
-        <c:axId val="57215232"/>
+        <c:axId val="66711552"/>
         <c:scaling>
           <c:orientation val="minMax"/>
         </c:scaling>
@@ -836,14 +836,14 @@
           <c:layout/>
         </c:title>
         <c:tickLblPos val="nextTo"/>
-        <c:crossAx val="57225600"/>
+        <c:crossAx val="66713472"/>
         <c:crosses val="autoZero"/>
         <c:auto val="1"/>
         <c:lblAlgn val="ctr"/>
         <c:lblOffset val="100"/>
       </c:catAx>
       <c:valAx>
-        <c:axId val="57225600"/>
+        <c:axId val="66713472"/>
         <c:scaling>
           <c:orientation val="minMax"/>
         </c:scaling>
@@ -869,7 +869,7 @@
         </c:title>
         <c:numFmt formatCode="General" sourceLinked="1"/>
         <c:tickLblPos val="nextTo"/>
-        <c:crossAx val="57215232"/>
+        <c:crossAx val="66711552"/>
         <c:crosses val="autoZero"/>
         <c:crossBetween val="between"/>
       </c:valAx>
@@ -6809,8 +6809,8 @@
         </p:nvSpPr>
         <p:spPr>
           <a:xfrm>
-            <a:off x="757947" y="1529880"/>
-            <a:ext cx="3382732" cy="4608884"/>
+            <a:off x="602901" y="1529880"/>
+            <a:ext cx="3768132" cy="4608884"/>
           </a:xfrm>
         </p:spPr>
         <p:txBody>
@@ -6821,20 +6821,37 @@
           <a:p>
             <a:r>
               <a:rPr lang="en-US" dirty="0" smtClean="0"/>
-              <a:t>Results go here</a:t>
-            </a:r>
-          </a:p>
-          <a:p>
-            <a:r>
-              <a:rPr lang="en-US" dirty="0" smtClean="0"/>
-              <a:t>…</a:t>
-            </a:r>
-          </a:p>
-          <a:p>
-            <a:r>
-              <a:rPr lang="en-US" dirty="0" smtClean="0"/>
-              <a:t>Some more comments</a:t>
-            </a:r>
+              <a:t>Many 2.3 gigabyte files</a:t>
+            </a:r>
+          </a:p>
+          <a:p>
+            <a:r>
+              <a:rPr lang="en-US" dirty="0" smtClean="0"/>
+              <a:t>Adding workers eventually becomes ineffective</a:t>
+            </a:r>
+          </a:p>
+          <a:p>
+            <a:pPr lvl="1"/>
+            <a:r>
+              <a:rPr lang="en-US" dirty="0" smtClean="0"/>
+              <a:t>Need intelligence for speedup</a:t>
+            </a:r>
+          </a:p>
+          <a:p>
+            <a:r>
+              <a:rPr lang="en-US" dirty="0" smtClean="0"/>
+              <a:t>Scales similarly</a:t>
+            </a:r>
+          </a:p>
+          <a:p>
+            <a:r>
+              <a:rPr lang="en-US" dirty="0" smtClean="0"/>
+              <a:t>Overhead negligible</a:t>
+            </a:r>
+            <a:endParaRPr lang="en-US" dirty="0" smtClean="0"/>
+          </a:p>
+          <a:p>
+            <a:endParaRPr lang="en-US" dirty="0" smtClean="0"/>
           </a:p>
         </p:txBody>
       </p:sp>
@@ -6945,11 +6962,7 @@
           <a:p>
             <a:r>
               <a:rPr lang="en-US" dirty="0" smtClean="0"/>
-              <a:t>~50</a:t>
-            </a:r>
-            <a:r>
-              <a:rPr lang="en-US" dirty="0" smtClean="0"/>
-              <a:t>% reduction in overall time!</a:t>
+              <a:t>~50% reduction in overall time!</a:t>
             </a:r>
           </a:p>
           <a:p>
@@ -7451,20 +7464,43 @@
           <a:p>
             <a:r>
               <a:rPr lang="en-US" dirty="0" smtClean="0"/>
-              <a:t>Read 2.3 Gigabytes</a:t>
-            </a:r>
-          </a:p>
-          <a:p>
-            <a:r>
-              <a:rPr lang="en-US" dirty="0" smtClean="0"/>
-              <a:t>No Coordination</a:t>
-            </a:r>
-          </a:p>
-          <a:p>
-            <a:r>
-              <a:rPr lang="en-US" dirty="0" smtClean="0"/>
-              <a:t>Handled Multiple Requests</a:t>
-            </a:r>
+              <a:t>Read 2.3 </a:t>
+            </a:r>
+            <a:r>
+              <a:rPr lang="en-US" dirty="0" smtClean="0"/>
+              <a:t>gigabytes</a:t>
+            </a:r>
+            <a:endParaRPr lang="en-US" dirty="0" smtClean="0"/>
+          </a:p>
+          <a:p>
+            <a:r>
+              <a:rPr lang="en-US" dirty="0" smtClean="0"/>
+              <a:t>No </a:t>
+            </a:r>
+            <a:r>
+              <a:rPr lang="en-US" dirty="0" smtClean="0"/>
+              <a:t>coordination</a:t>
+            </a:r>
+            <a:endParaRPr lang="en-US" dirty="0" smtClean="0"/>
+          </a:p>
+          <a:p>
+            <a:r>
+              <a:rPr lang="en-US" dirty="0" smtClean="0"/>
+              <a:t>Handled </a:t>
+            </a:r>
+            <a:r>
+              <a:rPr lang="en-US" dirty="0" smtClean="0"/>
+              <a:t>multiple </a:t>
+            </a:r>
+            <a:r>
+              <a:rPr lang="en-US" dirty="0" smtClean="0"/>
+              <a:t>r</a:t>
+            </a:r>
+            <a:r>
+              <a:rPr lang="en-US" dirty="0" smtClean="0"/>
+              <a:t>equests</a:t>
+            </a:r>
+            <a:endParaRPr lang="en-US" dirty="0" smtClean="0"/>
           </a:p>
           <a:p>
             <a:r>
@@ -7738,8 +7774,13 @@
           <a:p>
             <a:r>
               <a:rPr lang="en-US" dirty="0" smtClean="0"/>
-              <a:t>Distributed filesystems should also be able to move work around the data</a:t>
-            </a:r>
+              <a:t>Distributed filesystems should also be able to move work around the </a:t>
+            </a:r>
+            <a:r>
+              <a:rPr lang="en-US" dirty="0" smtClean="0"/>
+              <a:t>data to achieve even better performance</a:t>
+            </a:r>
+            <a:endParaRPr lang="en-US" dirty="0" smtClean="0"/>
           </a:p>
           <a:p>
             <a:r>
@@ -8012,14 +8053,23 @@
           <a:p>
             <a:r>
               <a:rPr lang="en-US" dirty="0" smtClean="0"/>
-              <a:t>Grids, Clouds and Cloud-like infrastructure supporting the solution of large problems</a:t>
-            </a:r>
+              <a:t>There are Grids</a:t>
+            </a:r>
+            <a:r>
+              <a:rPr lang="en-US" dirty="0" smtClean="0"/>
+              <a:t>, Clouds and Cloud-like infrastructure supporting the solution of large </a:t>
+            </a:r>
+            <a:r>
+              <a:rPr lang="en-US" dirty="0" smtClean="0"/>
+              <a:t>problems</a:t>
+            </a:r>
+            <a:endParaRPr lang="en-US" dirty="0" smtClean="0"/>
           </a:p>
           <a:p>
             <a:pPr lvl="1"/>
             <a:r>
               <a:rPr lang="en-US" dirty="0" smtClean="0"/>
-              <a:t>Google’s 20 </a:t>
+              <a:t>Google processes 20 </a:t>
             </a:r>
             <a:r>
               <a:rPr lang="en-US" dirty="0" err="1" smtClean="0"/>
@@ -8027,19 +8077,39 @@
             </a:r>
             <a:r>
               <a:rPr lang="en-US" dirty="0" smtClean="0"/>
-              <a:t> of data processed per day</a:t>
-            </a:r>
-          </a:p>
-          <a:p>
-            <a:r>
-              <a:rPr lang="en-US" dirty="0" smtClean="0"/>
-              <a:t>Unique performance issues as data sets become large</a:t>
-            </a:r>
-          </a:p>
-          <a:p>
-            <a:r>
-              <a:rPr lang="en-US" dirty="0" smtClean="0"/>
-              <a:t>Developer should take precautions when placing, scheduling and managing such large volumes of data</a:t>
+              <a:t> of data </a:t>
+            </a:r>
+            <a:r>
+              <a:rPr lang="en-US" dirty="0" smtClean="0"/>
+              <a:t>per </a:t>
+            </a:r>
+            <a:r>
+              <a:rPr lang="en-US" dirty="0" smtClean="0"/>
+              <a:t>day</a:t>
+            </a:r>
+          </a:p>
+          <a:p>
+            <a:r>
+              <a:rPr lang="en-US" dirty="0" smtClean="0"/>
+              <a:t>Unique performance </a:t>
+            </a:r>
+            <a:r>
+              <a:rPr lang="en-US" dirty="0" smtClean="0"/>
+              <a:t>issues arise </a:t>
+            </a:r>
+            <a:r>
+              <a:rPr lang="en-US" dirty="0" smtClean="0"/>
+              <a:t>as data sets become large</a:t>
+            </a:r>
+          </a:p>
+          <a:p>
+            <a:r>
+              <a:rPr lang="en-US" dirty="0" smtClean="0"/>
+              <a:t>Developers </a:t>
+            </a:r>
+            <a:r>
+              <a:rPr lang="en-US" dirty="0" smtClean="0"/>
+              <a:t>should take precautions when placing, scheduling and managing such large volumes of data</a:t>
             </a:r>
           </a:p>
           <a:p>
@@ -8133,8 +8203,13 @@
             <a:pPr lvl="1"/>
             <a:r>
               <a:rPr lang="en-US" dirty="0" smtClean="0"/>
-              <a:t>A Fresh Perspective on Distributed Applications and CI</a:t>
-            </a:r>
+              <a:t>A Fresh Perspective on Distributed </a:t>
+            </a:r>
+            <a:r>
+              <a:rPr lang="en-US" dirty="0" smtClean="0"/>
+              <a:t>Applications</a:t>
+            </a:r>
+            <a:endParaRPr lang="en-US" dirty="0" smtClean="0"/>
           </a:p>
           <a:p>
             <a:r>
@@ -8180,8 +8255,13 @@
             <a:pPr lvl="1"/>
             <a:r>
               <a:rPr lang="en-US" dirty="0" smtClean="0"/>
-              <a:t>Tools, Frameworks, Gateways, Access Layers..</a:t>
-            </a:r>
+              <a:t>Tools, Frameworks, Gateways, Access Layers</a:t>
+            </a:r>
+            <a:r>
+              <a:rPr lang="en-US" dirty="0" smtClean="0"/>
+              <a:t>.</a:t>
+            </a:r>
+            <a:endParaRPr lang="en-US" dirty="0" smtClean="0"/>
           </a:p>
         </p:txBody>
       </p:sp>
@@ -8407,13 +8487,17 @@
             <a:pPr lvl="2"/>
             <a:r>
               <a:rPr lang="en-US" dirty="0" smtClean="0"/>
-              <a:t> There may be a slower, but network-close resource</a:t>
-            </a:r>
-          </a:p>
-          <a:p>
-            <a:r>
-              <a:rPr lang="en-US" dirty="0" smtClean="0"/>
-              <a:t>We used </a:t>
+              <a:t>Data transfer times become important</a:t>
+            </a:r>
+          </a:p>
+          <a:p>
+            <a:r>
+              <a:rPr lang="en-US" dirty="0" smtClean="0"/>
+              <a:t>We </a:t>
+            </a:r>
+            <a:r>
+              <a:rPr lang="en-US" dirty="0" smtClean="0"/>
+              <a:t>used </a:t>
             </a:r>
             <a:r>
               <a:rPr lang="en-US" dirty="0" err="1" smtClean="0"/>

</xml_diff>

<commit_message>
Made changes Shantenu asked for
git-svn-id: file://localhost/tmp/svn2git/svn@2051 defb5e50-622e-49ec-a68e-d72c7db87b45
</commit_message>
<xml_diff>
--- a/papers/data_intensive/eScience09/RoyalSocietyPresentation.pptx
+++ b/papers/data_intensive/eScience09/RoyalSocietyPresentation.pptx
@@ -253,7 +253,7 @@
                   <c:v>1254.4270000000001</c:v>
                 </c:pt>
                 <c:pt idx="2">
-                  <c:v>680.45199999999954</c:v>
+                  <c:v>680.45199999999932</c:v>
                 </c:pt>
                 <c:pt idx="3">
                   <c:v>386.74700000000001</c:v>
@@ -263,11 +263,11 @@
           </c:val>
         </c:ser>
         <c:marker val="1"/>
-        <c:axId val="65198336"/>
-        <c:axId val="66326912"/>
+        <c:axId val="62580992"/>
+        <c:axId val="62591360"/>
       </c:lineChart>
       <c:catAx>
-        <c:axId val="65198336"/>
+        <c:axId val="62580992"/>
         <c:scaling>
           <c:orientation val="minMax"/>
         </c:scaling>
@@ -291,14 +291,14 @@
           <c:layout/>
         </c:title>
         <c:tickLblPos val="nextTo"/>
-        <c:crossAx val="66326912"/>
+        <c:crossAx val="62591360"/>
         <c:crosses val="autoZero"/>
         <c:auto val="1"/>
         <c:lblAlgn val="ctr"/>
         <c:lblOffset val="100"/>
       </c:catAx>
       <c:valAx>
-        <c:axId val="66326912"/>
+        <c:axId val="62591360"/>
         <c:scaling>
           <c:orientation val="minMax"/>
         </c:scaling>
@@ -324,7 +324,7 @@
         </c:title>
         <c:numFmt formatCode="General" sourceLinked="1"/>
         <c:tickLblPos val="nextTo"/>
-        <c:crossAx val="65198336"/>
+        <c:crossAx val="62580992"/>
         <c:crosses val="autoZero"/>
         <c:crossBetween val="between"/>
       </c:valAx>
@@ -443,7 +443,7 @@
                   <c:v>1254.4270000000001</c:v>
                 </c:pt>
                 <c:pt idx="1">
-                  <c:v>680.45199999999977</c:v>
+                  <c:v>680.45199999999966</c:v>
                 </c:pt>
                 <c:pt idx="2">
                   <c:v>386.74700000000001</c:v>
@@ -453,11 +453,11 @@
           </c:val>
         </c:ser>
         <c:marker val="1"/>
-        <c:axId val="66360832"/>
-        <c:axId val="66362752"/>
+        <c:axId val="62625280"/>
+        <c:axId val="62627200"/>
       </c:lineChart>
       <c:catAx>
-        <c:axId val="66360832"/>
+        <c:axId val="62625280"/>
         <c:scaling>
           <c:orientation val="minMax"/>
         </c:scaling>
@@ -482,14 +482,14 @@
         </c:title>
         <c:numFmt formatCode="General" sourceLinked="1"/>
         <c:tickLblPos val="nextTo"/>
-        <c:crossAx val="66362752"/>
+        <c:crossAx val="62627200"/>
         <c:crosses val="autoZero"/>
         <c:auto val="1"/>
         <c:lblAlgn val="ctr"/>
         <c:lblOffset val="100"/>
       </c:catAx>
       <c:valAx>
-        <c:axId val="66362752"/>
+        <c:axId val="62627200"/>
         <c:scaling>
           <c:orientation val="minMax"/>
         </c:scaling>
@@ -520,7 +520,7 @@
         </c:title>
         <c:numFmt formatCode="General" sourceLinked="1"/>
         <c:tickLblPos val="nextTo"/>
-        <c:crossAx val="66360832"/>
+        <c:crossAx val="62625280"/>
         <c:crosses val="autoZero"/>
         <c:crossBetween val="between"/>
       </c:valAx>
@@ -597,24 +597,24 @@
             </c:numRef>
           </c:val>
         </c:ser>
-        <c:axId val="66658304"/>
-        <c:axId val="66659840"/>
+        <c:axId val="63967232"/>
+        <c:axId val="63968768"/>
       </c:barChart>
       <c:catAx>
-        <c:axId val="66658304"/>
+        <c:axId val="63967232"/>
         <c:scaling>
           <c:orientation val="minMax"/>
         </c:scaling>
         <c:axPos val="b"/>
         <c:tickLblPos val="nextTo"/>
-        <c:crossAx val="66659840"/>
+        <c:crossAx val="63968768"/>
         <c:crosses val="autoZero"/>
         <c:auto val="1"/>
         <c:lblAlgn val="ctr"/>
         <c:lblOffset val="100"/>
       </c:catAx>
       <c:valAx>
-        <c:axId val="66659840"/>
+        <c:axId val="63968768"/>
         <c:scaling>
           <c:orientation val="minMax"/>
         </c:scaling>
@@ -640,7 +640,7 @@
         </c:title>
         <c:numFmt formatCode="General" sourceLinked="1"/>
         <c:tickLblPos val="nextTo"/>
-        <c:crossAx val="66658304"/>
+        <c:crossAx val="63967232"/>
         <c:crosses val="autoZero"/>
         <c:crossBetween val="between"/>
       </c:valAx>
@@ -729,13 +729,13 @@
                 <c:formatCode>General</c:formatCode>
                 <c:ptCount val="4"/>
                 <c:pt idx="0">
-                  <c:v>493.99799999999965</c:v>
+                  <c:v>493.99799999999959</c:v>
                 </c:pt>
                 <c:pt idx="1">
-                  <c:v>244.99800000000013</c:v>
+                  <c:v>244.99800000000016</c:v>
                 </c:pt>
                 <c:pt idx="2">
-                  <c:v>166.99800000000013</c:v>
+                  <c:v>166.99800000000016</c:v>
                 </c:pt>
                 <c:pt idx="3">
                   <c:v>112.998</c:v>
@@ -760,13 +760,13 @@
                 <c:formatCode>General</c:formatCode>
                 <c:ptCount val="4"/>
                 <c:pt idx="1">
-                  <c:v>445.00199999999967</c:v>
+                  <c:v>445.00199999999961</c:v>
                 </c:pt>
                 <c:pt idx="2">
                   <c:v>336</c:v>
                 </c:pt>
                 <c:pt idx="3">
-                  <c:v>190.9980000000001</c:v>
+                  <c:v>190.99800000000013</c:v>
                 </c:pt>
               </c:numCache>
             </c:numRef>
@@ -804,11 +804,11 @@
           </c:val>
         </c:ser>
         <c:marker val="1"/>
-        <c:axId val="66711552"/>
-        <c:axId val="66713472"/>
+        <c:axId val="64024576"/>
+        <c:axId val="64026496"/>
       </c:lineChart>
       <c:catAx>
-        <c:axId val="66711552"/>
+        <c:axId val="64024576"/>
         <c:scaling>
           <c:orientation val="minMax"/>
         </c:scaling>
@@ -836,14 +836,14 @@
           <c:layout/>
         </c:title>
         <c:tickLblPos val="nextTo"/>
-        <c:crossAx val="66713472"/>
+        <c:crossAx val="64026496"/>
         <c:crosses val="autoZero"/>
         <c:auto val="1"/>
         <c:lblAlgn val="ctr"/>
         <c:lblOffset val="100"/>
       </c:catAx>
       <c:valAx>
-        <c:axId val="66713472"/>
+        <c:axId val="64026496"/>
         <c:scaling>
           <c:orientation val="minMax"/>
         </c:scaling>
@@ -869,7 +869,7 @@
         </c:title>
         <c:numFmt formatCode="General" sourceLinked="1"/>
         <c:tickLblPos val="nextTo"/>
-        <c:crossAx val="66711552"/>
+        <c:crossAx val="64024576"/>
         <c:crosses val="autoZero"/>
         <c:crossBetween val="between"/>
       </c:valAx>
@@ -6821,8 +6821,15 @@
           <a:p>
             <a:r>
               <a:rPr lang="en-US" dirty="0" smtClean="0"/>
-              <a:t>Many 2.3 gigabyte files</a:t>
-            </a:r>
+              <a:t>Each worker reads 2.3 gigabytes of data</a:t>
+            </a:r>
+          </a:p>
+          <a:p>
+            <a:r>
+              <a:rPr lang="en-US" dirty="0" smtClean="0"/>
+              <a:t>8x8 matrix.  Each file 287 megabytes</a:t>
+            </a:r>
+            <a:endParaRPr lang="en-US" dirty="0" smtClean="0"/>
           </a:p>
           <a:p>
             <a:r>
@@ -6848,7 +6855,6 @@
               <a:rPr lang="en-US" dirty="0" smtClean="0"/>
               <a:t>Overhead negligible</a:t>
             </a:r>
-            <a:endParaRPr lang="en-US" dirty="0" smtClean="0"/>
           </a:p>
           <a:p>
             <a:endParaRPr lang="en-US" dirty="0" smtClean="0"/>
@@ -7464,43 +7470,20 @@
           <a:p>
             <a:r>
               <a:rPr lang="en-US" dirty="0" smtClean="0"/>
-              <a:t>Read 2.3 </a:t>
-            </a:r>
-            <a:r>
-              <a:rPr lang="en-US" dirty="0" smtClean="0"/>
-              <a:t>gigabytes</a:t>
-            </a:r>
-            <a:endParaRPr lang="en-US" dirty="0" smtClean="0"/>
-          </a:p>
-          <a:p>
-            <a:r>
-              <a:rPr lang="en-US" dirty="0" smtClean="0"/>
-              <a:t>No </a:t>
-            </a:r>
-            <a:r>
-              <a:rPr lang="en-US" dirty="0" smtClean="0"/>
-              <a:t>coordination</a:t>
-            </a:r>
-            <a:endParaRPr lang="en-US" dirty="0" smtClean="0"/>
-          </a:p>
-          <a:p>
-            <a:r>
-              <a:rPr lang="en-US" dirty="0" smtClean="0"/>
-              <a:t>Handled </a:t>
-            </a:r>
-            <a:r>
-              <a:rPr lang="en-US" dirty="0" smtClean="0"/>
-              <a:t>multiple </a:t>
-            </a:r>
-            <a:r>
-              <a:rPr lang="en-US" dirty="0" smtClean="0"/>
-              <a:t>r</a:t>
-            </a:r>
-            <a:r>
-              <a:rPr lang="en-US" dirty="0" smtClean="0"/>
-              <a:t>equests</a:t>
-            </a:r>
-            <a:endParaRPr lang="en-US" dirty="0" smtClean="0"/>
+              <a:t>Read 2.3 gigabytes</a:t>
+            </a:r>
+          </a:p>
+          <a:p>
+            <a:r>
+              <a:rPr lang="en-US" dirty="0" smtClean="0"/>
+              <a:t>No coordination</a:t>
+            </a:r>
+          </a:p>
+          <a:p>
+            <a:r>
+              <a:rPr lang="en-US" dirty="0" smtClean="0"/>
+              <a:t>Handled multiple requests</a:t>
+            </a:r>
           </a:p>
           <a:p>
             <a:r>
@@ -7774,13 +7757,8 @@
           <a:p>
             <a:r>
               <a:rPr lang="en-US" dirty="0" smtClean="0"/>
-              <a:t>Distributed filesystems should also be able to move work around the </a:t>
-            </a:r>
-            <a:r>
-              <a:rPr lang="en-US" dirty="0" smtClean="0"/>
-              <a:t>data to achieve even better performance</a:t>
-            </a:r>
-            <a:endParaRPr lang="en-US" dirty="0" smtClean="0"/>
+              <a:t>Distributed filesystems should also be able to move work around the data to achieve even better performance</a:t>
+            </a:r>
           </a:p>
           <a:p>
             <a:r>
@@ -8053,17 +8031,8 @@
           <a:p>
             <a:r>
               <a:rPr lang="en-US" dirty="0" smtClean="0"/>
-              <a:t>There are Grids</a:t>
-            </a:r>
-            <a:r>
-              <a:rPr lang="en-US" dirty="0" smtClean="0"/>
-              <a:t>, Clouds and Cloud-like infrastructure supporting the solution of large </a:t>
-            </a:r>
-            <a:r>
-              <a:rPr lang="en-US" dirty="0" smtClean="0"/>
-              <a:t>problems</a:t>
-            </a:r>
-            <a:endParaRPr lang="en-US" dirty="0" smtClean="0"/>
+              <a:t>There are Grids, Clouds and Cloud-like infrastructure supporting the solution of large problems</a:t>
+            </a:r>
           </a:p>
           <a:p>
             <a:pPr lvl="1"/>
@@ -8077,39 +8046,19 @@
             </a:r>
             <a:r>
               <a:rPr lang="en-US" dirty="0" smtClean="0"/>
-              <a:t> of data </a:t>
-            </a:r>
-            <a:r>
-              <a:rPr lang="en-US" dirty="0" smtClean="0"/>
-              <a:t>per </a:t>
-            </a:r>
-            <a:r>
-              <a:rPr lang="en-US" dirty="0" smtClean="0"/>
-              <a:t>day</a:t>
-            </a:r>
-          </a:p>
-          <a:p>
-            <a:r>
-              <a:rPr lang="en-US" dirty="0" smtClean="0"/>
-              <a:t>Unique performance </a:t>
-            </a:r>
-            <a:r>
-              <a:rPr lang="en-US" dirty="0" smtClean="0"/>
-              <a:t>issues arise </a:t>
-            </a:r>
-            <a:r>
-              <a:rPr lang="en-US" dirty="0" smtClean="0"/>
-              <a:t>as data sets become large</a:t>
-            </a:r>
-          </a:p>
-          <a:p>
-            <a:r>
-              <a:rPr lang="en-US" dirty="0" smtClean="0"/>
-              <a:t>Developers </a:t>
-            </a:r>
-            <a:r>
-              <a:rPr lang="en-US" dirty="0" smtClean="0"/>
-              <a:t>should take precautions when placing, scheduling and managing such large volumes of data</a:t>
+              <a:t> of data per day</a:t>
+            </a:r>
+          </a:p>
+          <a:p>
+            <a:r>
+              <a:rPr lang="en-US" dirty="0" smtClean="0"/>
+              <a:t>Unique performance issues arise as data sets become large</a:t>
+            </a:r>
+          </a:p>
+          <a:p>
+            <a:r>
+              <a:rPr lang="en-US" dirty="0" smtClean="0"/>
+              <a:t>Developers should take precautions when placing, scheduling and managing such large volumes of data</a:t>
             </a:r>
           </a:p>
           <a:p>
@@ -8203,65 +8152,55 @@
             <a:pPr lvl="1"/>
             <a:r>
               <a:rPr lang="en-US" dirty="0" smtClean="0"/>
-              <a:t>A Fresh Perspective on Distributed </a:t>
-            </a:r>
+              <a:t>A Fresh Perspective on Distributed Applications</a:t>
+            </a:r>
+          </a:p>
+          <a:p>
+            <a:r>
+              <a:rPr lang="en-US" dirty="0" smtClean="0"/>
+              <a:t>SAGA in a Nutshell</a:t>
+            </a:r>
+          </a:p>
+          <a:p>
+            <a:pPr lvl="1"/>
+            <a:r>
+              <a:rPr lang="en-US" dirty="0" smtClean="0"/>
+              <a:t>SAGA Landscape</a:t>
+            </a:r>
+          </a:p>
+          <a:p>
+            <a:pPr lvl="1"/>
+            <a:r>
+              <a:rPr lang="en-US" dirty="0" smtClean="0"/>
+              <a:t>Individual APIs</a:t>
+            </a:r>
+          </a:p>
+          <a:p>
+            <a:pPr lvl="1"/>
+            <a:r>
+              <a:rPr lang="en-US" dirty="0" smtClean="0"/>
+              <a:t>OGF standard</a:t>
+            </a:r>
+          </a:p>
+          <a:p>
+            <a:r>
+              <a:rPr lang="en-US" dirty="0" smtClean="0"/>
+              <a:t>SAGA in action</a:t>
+            </a:r>
+          </a:p>
+          <a:p>
+            <a:pPr lvl="1"/>
             <a:r>
               <a:rPr lang="en-US" dirty="0" smtClean="0"/>
               <a:t>Applications</a:t>
             </a:r>
-            <a:endParaRPr lang="en-US" dirty="0" smtClean="0"/>
-          </a:p>
-          <a:p>
-            <a:r>
-              <a:rPr lang="en-US" dirty="0" smtClean="0"/>
-              <a:t>SAGA in a Nutshell</a:t>
-            </a:r>
           </a:p>
           <a:p>
             <a:pPr lvl="1"/>
             <a:r>
               <a:rPr lang="en-US" dirty="0" smtClean="0"/>
-              <a:t>SAGA Landscape</a:t>
-            </a:r>
-          </a:p>
-          <a:p>
-            <a:pPr lvl="1"/>
-            <a:r>
-              <a:rPr lang="en-US" dirty="0" smtClean="0"/>
-              <a:t>Individual APIs</a:t>
-            </a:r>
-          </a:p>
-          <a:p>
-            <a:pPr lvl="1"/>
-            <a:r>
-              <a:rPr lang="en-US" dirty="0" smtClean="0"/>
-              <a:t>OGF standard</a:t>
-            </a:r>
-          </a:p>
-          <a:p>
-            <a:r>
-              <a:rPr lang="en-US" dirty="0" smtClean="0"/>
-              <a:t>SAGA in action</a:t>
-            </a:r>
-          </a:p>
-          <a:p>
-            <a:pPr lvl="1"/>
-            <a:r>
-              <a:rPr lang="en-US" dirty="0" smtClean="0"/>
-              <a:t>Applications</a:t>
-            </a:r>
-          </a:p>
-          <a:p>
-            <a:pPr lvl="1"/>
-            <a:r>
-              <a:rPr lang="en-US" dirty="0" smtClean="0"/>
-              <a:t>Tools, Frameworks, Gateways, Access Layers</a:t>
-            </a:r>
-            <a:r>
-              <a:rPr lang="en-US" dirty="0" smtClean="0"/>
-              <a:t>.</a:t>
-            </a:r>
-            <a:endParaRPr lang="en-US" dirty="0" smtClean="0"/>
+              <a:t>Tools, Frameworks, Gateways, Access Layers.</a:t>
+            </a:r>
           </a:p>
         </p:txBody>
       </p:sp>
@@ -8493,11 +8432,7 @@
           <a:p>
             <a:r>
               <a:rPr lang="en-US" dirty="0" smtClean="0"/>
-              <a:t>We </a:t>
-            </a:r>
-            <a:r>
-              <a:rPr lang="en-US" dirty="0" smtClean="0"/>
-              <a:t>used </a:t>
+              <a:t>We used </a:t>
             </a:r>
             <a:r>
               <a:rPr lang="en-US" dirty="0" err="1" smtClean="0"/>
@@ -8876,6 +8811,14 @@
             <a:pPr lvl="2"/>
             <a:r>
               <a:rPr lang="en-US" dirty="0" smtClean="0"/>
+              <a:t>Minimize data transfer time</a:t>
+            </a:r>
+            <a:endParaRPr lang="en-US" dirty="0" smtClean="0"/>
+          </a:p>
+          <a:p>
+            <a:pPr lvl="2"/>
+            <a:r>
+              <a:rPr lang="en-US" dirty="0" smtClean="0"/>
               <a:t>Utilize knowledge of network latency and data dependencies</a:t>
             </a:r>
           </a:p>
@@ -8956,13 +8899,30 @@
         </p:spPr>
         <p:txBody>
           <a:bodyPr>
-            <a:normAutofit/>
+            <a:normAutofit lnSpcReduction="10000"/>
           </a:bodyPr>
           <a:lstStyle/>
           <a:p>
             <a:r>
               <a:rPr lang="en-US" dirty="0" smtClean="0"/>
-              <a:t>Times decrease with respect to number of workers</a:t>
+              <a:t>Each worker reads 2.3 gigabytes of data</a:t>
+            </a:r>
+          </a:p>
+          <a:p>
+            <a:r>
+              <a:rPr lang="en-US" dirty="0" smtClean="0"/>
+              <a:t>8x8 matrix.  Each file 287 megabytes</a:t>
+            </a:r>
+            <a:endParaRPr lang="en-US" dirty="0" smtClean="0"/>
+          </a:p>
+          <a:p>
+            <a:r>
+              <a:rPr lang="en-US" dirty="0" smtClean="0"/>
+              <a:t>Times </a:t>
+            </a:r>
+            <a:r>
+              <a:rPr lang="en-US" dirty="0" smtClean="0"/>
+              <a:t>decrease with respect to number of workers</a:t>
             </a:r>
           </a:p>
           <a:p>

</xml_diff>

<commit_message>
A version that seems to compile ...  (need natbib.bib available, as well as rspublic.cls and kluwer.bst).  Let me know if it does not work.
git-svn-id: file://localhost/tmp/svn2git/svn@2074 defb5e50-622e-49ec-a68e-d72c7db87b45
</commit_message>
<xml_diff>
--- a/papers/data_intensive/eScience09/RoyalSocietyPresentation.pptx
+++ b/papers/data_intensive/eScience09/RoyalSocietyPresentation.pptx
@@ -1,31 +1,32 @@
 
 <file path=ppt/presentation.xml><?xml version="1.0" encoding="utf-8"?>
-<p:presentation xmlns:a="http://schemas.openxmlformats.org/drawingml/2006/main" xmlns:r="http://schemas.openxmlformats.org/officeDocument/2006/relationships" xmlns:p="http://schemas.openxmlformats.org/presentationml/2006/main" saveSubsetFonts="1" autoCompressPictures="0">
+<p:presentation xmlns:a="http://schemas.openxmlformats.org/drawingml/2006/main" xmlns:r="http://schemas.openxmlformats.org/officeDocument/2006/relationships" xmlns:mc="http://schemas.openxmlformats.org/markup-compatibility/2006" xmlns:mv="urn:schemas-microsoft-com:mac:vml" xmlns:p="http://schemas.openxmlformats.org/presentationml/2006/main" mc:Ignorable="mv" mc:PreserveAttributes="mv:*" saveSubsetFonts="1" autoCompressPictures="0">
   <p:sldMasterIdLst>
     <p:sldMasterId id="2147483660" r:id="rId1"/>
   </p:sldMasterIdLst>
   <p:notesMasterIdLst>
-    <p:notesMasterId r:id="rId20"/>
+    <p:notesMasterId r:id="rId21"/>
   </p:notesMasterIdLst>
   <p:sldIdLst>
     <p:sldId id="325" r:id="rId2"/>
-    <p:sldId id="326" r:id="rId3"/>
-    <p:sldId id="327" r:id="rId4"/>
-    <p:sldId id="328" r:id="rId5"/>
-    <p:sldId id="329" r:id="rId6"/>
-    <p:sldId id="258" r:id="rId7"/>
-    <p:sldId id="311" r:id="rId8"/>
-    <p:sldId id="312" r:id="rId9"/>
-    <p:sldId id="315" r:id="rId10"/>
-    <p:sldId id="319" r:id="rId11"/>
-    <p:sldId id="313" r:id="rId12"/>
-    <p:sldId id="316" r:id="rId13"/>
-    <p:sldId id="314" r:id="rId14"/>
-    <p:sldId id="317" r:id="rId15"/>
-    <p:sldId id="320" r:id="rId16"/>
-    <p:sldId id="318" r:id="rId17"/>
-    <p:sldId id="324" r:id="rId18"/>
-    <p:sldId id="310" r:id="rId19"/>
+    <p:sldId id="330" r:id="rId3"/>
+    <p:sldId id="326" r:id="rId4"/>
+    <p:sldId id="327" r:id="rId5"/>
+    <p:sldId id="328" r:id="rId6"/>
+    <p:sldId id="329" r:id="rId7"/>
+    <p:sldId id="258" r:id="rId8"/>
+    <p:sldId id="311" r:id="rId9"/>
+    <p:sldId id="312" r:id="rId10"/>
+    <p:sldId id="315" r:id="rId11"/>
+    <p:sldId id="319" r:id="rId12"/>
+    <p:sldId id="313" r:id="rId13"/>
+    <p:sldId id="316" r:id="rId14"/>
+    <p:sldId id="314" r:id="rId15"/>
+    <p:sldId id="317" r:id="rId16"/>
+    <p:sldId id="320" r:id="rId17"/>
+    <p:sldId id="318" r:id="rId18"/>
+    <p:sldId id="324" r:id="rId19"/>
+    <p:sldId id="310" r:id="rId20"/>
   </p:sldIdLst>
   <p:sldSz cx="9144000" cy="6858000" type="screen4x3"/>
   <p:notesSz cx="6858000" cy="9144000"/>
@@ -129,7 +130,9 @@
 
 <file path=ppt/charts/chart1.xml><?xml version="1.0" encoding="utf-8"?>
 <c:chartSpace xmlns:c="http://schemas.openxmlformats.org/drawingml/2006/chart" xmlns:a="http://schemas.openxmlformats.org/drawingml/2006/main" xmlns:r="http://schemas.openxmlformats.org/officeDocument/2006/relationships">
+  <c:date1904 val="1"/>
   <c:lang val="en-US"/>
+  <c:style val="2"/>
   <c:chart>
     <c:title>
       <c:tx>
@@ -186,16 +189,16 @@
               <c:formatCode>General</c:formatCode>
               <c:ptCount val="4"/>
               <c:pt idx="0">
-                <c:v>1</c:v>
+                <c:v>1.0</c:v>
               </c:pt>
               <c:pt idx="1">
-                <c:v>2</c:v>
+                <c:v>2.0</c:v>
               </c:pt>
               <c:pt idx="2">
-                <c:v>4</c:v>
+                <c:v>4.0</c:v>
               </c:pt>
               <c:pt idx="3">
-                <c:v>8</c:v>
+                <c:v>8.0</c:v>
               </c:pt>
             </c:numLit>
           </c:cat>
@@ -206,16 +209,16 @@
                 <c:formatCode>General</c:formatCode>
                 <c:ptCount val="4"/>
                 <c:pt idx="0">
-                  <c:v>400</c:v>
+                  <c:v>400.0</c:v>
                 </c:pt>
                 <c:pt idx="1">
-                  <c:v>396</c:v>
+                  <c:v>396.0</c:v>
                 </c:pt>
                 <c:pt idx="2">
-                  <c:v>322</c:v>
+                  <c:v>322.0</c:v>
                 </c:pt>
                 <c:pt idx="3">
-                  <c:v>325</c:v>
+                  <c:v>325.0</c:v>
                 </c:pt>
               </c:numCache>
             </c:numRef>
@@ -235,16 +238,16 @@
               <c:formatCode>General</c:formatCode>
               <c:ptCount val="4"/>
               <c:pt idx="0">
-                <c:v>1</c:v>
+                <c:v>1.0</c:v>
               </c:pt>
               <c:pt idx="1">
-                <c:v>2</c:v>
+                <c:v>2.0</c:v>
               </c:pt>
               <c:pt idx="2">
-                <c:v>4</c:v>
+                <c:v>4.0</c:v>
               </c:pt>
               <c:pt idx="3">
-                <c:v>8</c:v>
+                <c:v>8.0</c:v>
               </c:pt>
             </c:numLit>
           </c:cat>
@@ -255,16 +258,16 @@
                 <c:formatCode>General</c:formatCode>
                 <c:ptCount val="4"/>
                 <c:pt idx="0">
-                  <c:v>7360</c:v>
+                  <c:v>7360.0</c:v>
                 </c:pt>
                 <c:pt idx="1">
-                  <c:v>3680</c:v>
+                  <c:v>3680.0</c:v>
                 </c:pt>
                 <c:pt idx="2">
-                  <c:v>1840</c:v>
+                  <c:v>1840.0</c:v>
                 </c:pt>
                 <c:pt idx="3">
-                  <c:v>989</c:v>
+                  <c:v>989.0</c:v>
                 </c:pt>
               </c:numCache>
             </c:numRef>
@@ -284,16 +287,16 @@
               <c:formatCode>General</c:formatCode>
               <c:ptCount val="4"/>
               <c:pt idx="0">
-                <c:v>1</c:v>
+                <c:v>1.0</c:v>
               </c:pt>
               <c:pt idx="1">
-                <c:v>2</c:v>
+                <c:v>2.0</c:v>
               </c:pt>
               <c:pt idx="2">
-                <c:v>4</c:v>
+                <c:v>4.0</c:v>
               </c:pt>
               <c:pt idx="3">
-                <c:v>8</c:v>
+                <c:v>8.0</c:v>
               </c:pt>
             </c:numLit>
           </c:cat>
@@ -304,24 +307,24 @@
                 <c:formatCode>General</c:formatCode>
                 <c:ptCount val="4"/>
                 <c:pt idx="1">
-                  <c:v>1254.4269999999999</c:v>
+                  <c:v>1254.427</c:v>
                 </c:pt>
                 <c:pt idx="2">
-                  <c:v>680.452</c:v>
+                  <c:v>680.4519999999999</c:v>
                 </c:pt>
                 <c:pt idx="3">
-                  <c:v>386.74700000000001</c:v>
+                  <c:v>386.747</c:v>
                 </c:pt>
               </c:numCache>
             </c:numRef>
           </c:val>
         </c:ser>
         <c:marker val="1"/>
-        <c:axId val="82794752"/>
-        <c:axId val="82830848"/>
+        <c:axId val="953844200"/>
+        <c:axId val="777417976"/>
       </c:lineChart>
       <c:catAx>
-        <c:axId val="82794752"/>
+        <c:axId val="953844200"/>
         <c:scaling>
           <c:orientation val="minMax"/>
         </c:scaling>
@@ -346,14 +349,14 @@
         </c:title>
         <c:numFmt formatCode="General" sourceLinked="1"/>
         <c:tickLblPos val="nextTo"/>
-        <c:crossAx val="82830848"/>
+        <c:crossAx val="777417976"/>
         <c:crosses val="autoZero"/>
         <c:auto val="1"/>
         <c:lblAlgn val="ctr"/>
         <c:lblOffset val="100"/>
       </c:catAx>
       <c:valAx>
-        <c:axId val="82830848"/>
+        <c:axId val="777417976"/>
         <c:scaling>
           <c:orientation val="minMax"/>
         </c:scaling>
@@ -379,7 +382,7 @@
         </c:title>
         <c:numFmt formatCode="General" sourceLinked="1"/>
         <c:tickLblPos val="nextTo"/>
-        <c:crossAx val="82794752"/>
+        <c:crossAx val="953844200"/>
         <c:crosses val="autoZero"/>
         <c:crossBetween val="between"/>
       </c:valAx>
@@ -396,7 +399,9 @@
 
 <file path=ppt/charts/chart2.xml><?xml version="1.0" encoding="utf-8"?>
 <c:chartSpace xmlns:c="http://schemas.openxmlformats.org/drawingml/2006/chart" xmlns:a="http://schemas.openxmlformats.org/drawingml/2006/main" xmlns:r="http://schemas.openxmlformats.org/officeDocument/2006/relationships">
+  <c:date1904 val="1"/>
   <c:lang val="en-US"/>
+  <c:style val="2"/>
   <c:chart>
     <c:title>
       <c:tx>
@@ -434,13 +439,13 @@
               <c:formatCode>General</c:formatCode>
               <c:ptCount val="3"/>
               <c:pt idx="0">
-                <c:v>2</c:v>
+                <c:v>2.0</c:v>
               </c:pt>
               <c:pt idx="1">
-                <c:v>4</c:v>
+                <c:v>4.0</c:v>
               </c:pt>
               <c:pt idx="2">
-                <c:v>8</c:v>
+                <c:v>8.0</c:v>
               </c:pt>
             </c:numLit>
           </c:cat>
@@ -451,13 +456,13 @@
                 <c:formatCode>General</c:formatCode>
                 <c:ptCount val="3"/>
                 <c:pt idx="0">
-                  <c:v>642</c:v>
+                  <c:v>642.0</c:v>
                 </c:pt>
                 <c:pt idx="1">
-                  <c:v>360</c:v>
+                  <c:v>360.0</c:v>
                 </c:pt>
                 <c:pt idx="2">
-                  <c:v>317</c:v>
+                  <c:v>317.0</c:v>
                 </c:pt>
               </c:numCache>
             </c:numRef>
@@ -477,13 +482,13 @@
               <c:formatCode>General</c:formatCode>
               <c:ptCount val="3"/>
               <c:pt idx="0">
-                <c:v>2</c:v>
+                <c:v>2.0</c:v>
               </c:pt>
               <c:pt idx="1">
-                <c:v>4</c:v>
+                <c:v>4.0</c:v>
               </c:pt>
               <c:pt idx="2">
-                <c:v>8</c:v>
+                <c:v>8.0</c:v>
               </c:pt>
             </c:numLit>
           </c:cat>
@@ -494,24 +499,24 @@
                 <c:formatCode>General</c:formatCode>
                 <c:ptCount val="3"/>
                 <c:pt idx="0">
-                  <c:v>1254.4269999999999</c:v>
+                  <c:v>1254.427</c:v>
                 </c:pt>
                 <c:pt idx="1">
-                  <c:v>680.452</c:v>
+                  <c:v>680.4519999999999</c:v>
                 </c:pt>
                 <c:pt idx="2">
-                  <c:v>386.74700000000001</c:v>
+                  <c:v>386.747</c:v>
                 </c:pt>
               </c:numCache>
             </c:numRef>
           </c:val>
         </c:ser>
         <c:marker val="1"/>
-        <c:axId val="36569088"/>
-        <c:axId val="36571008"/>
+        <c:axId val="894627208"/>
+        <c:axId val="922770264"/>
       </c:lineChart>
       <c:catAx>
-        <c:axId val="36569088"/>
+        <c:axId val="894627208"/>
         <c:scaling>
           <c:orientation val="minMax"/>
         </c:scaling>
@@ -536,14 +541,14 @@
         </c:title>
         <c:numFmt formatCode="General" sourceLinked="1"/>
         <c:tickLblPos val="nextTo"/>
-        <c:crossAx val="36571008"/>
+        <c:crossAx val="922770264"/>
         <c:crosses val="autoZero"/>
         <c:auto val="1"/>
         <c:lblAlgn val="ctr"/>
         <c:lblOffset val="100"/>
       </c:catAx>
       <c:valAx>
-        <c:axId val="36571008"/>
+        <c:axId val="922770264"/>
         <c:scaling>
           <c:orientation val="minMax"/>
         </c:scaling>
@@ -569,7 +574,7 @@
         </c:title>
         <c:numFmt formatCode="General" sourceLinked="1"/>
         <c:tickLblPos val="nextTo"/>
-        <c:crossAx val="36569088"/>
+        <c:crossAx val="894627208"/>
         <c:crosses val="autoZero"/>
         <c:crossBetween val="between"/>
       </c:valAx>
@@ -587,6 +592,7 @@
 <file path=ppt/charts/chart3.xml><?xml version="1.0" encoding="utf-8"?>
 <c:chartSpace xmlns:c="http://schemas.openxmlformats.org/drawingml/2006/chart" xmlns:a="http://schemas.openxmlformats.org/drawingml/2006/main" xmlns:r="http://schemas.openxmlformats.org/officeDocument/2006/relationships">
   <c:lang val="en-US"/>
+  <c:style val="2"/>
   <c:chart>
     <c:title>
       <c:tx>
@@ -640,30 +646,30 @@
                   <c:v>680.42</c:v>
                 </c:pt>
                 <c:pt idx="1">
-                  <c:v>360</c:v>
+                  <c:v>360.0</c:v>
                 </c:pt>
               </c:numCache>
             </c:numRef>
           </c:val>
         </c:ser>
-        <c:axId val="68882432"/>
-        <c:axId val="68883968"/>
+        <c:axId val="838477624"/>
+        <c:axId val="743075000"/>
       </c:barChart>
       <c:catAx>
-        <c:axId val="68882432"/>
+        <c:axId val="838477624"/>
         <c:scaling>
           <c:orientation val="minMax"/>
         </c:scaling>
         <c:axPos val="b"/>
         <c:tickLblPos val="nextTo"/>
-        <c:crossAx val="68883968"/>
+        <c:crossAx val="743075000"/>
         <c:crosses val="autoZero"/>
         <c:auto val="1"/>
         <c:lblAlgn val="ctr"/>
         <c:lblOffset val="100"/>
       </c:catAx>
       <c:valAx>
-        <c:axId val="68883968"/>
+        <c:axId val="743075000"/>
         <c:scaling>
           <c:orientation val="minMax"/>
         </c:scaling>
@@ -689,7 +695,7 @@
         </c:title>
         <c:numFmt formatCode="General" sourceLinked="1"/>
         <c:tickLblPos val="nextTo"/>
-        <c:crossAx val="68882432"/>
+        <c:crossAx val="838477624"/>
         <c:crosses val="autoZero"/>
         <c:crossBetween val="between"/>
       </c:valAx>
@@ -702,7 +708,9 @@
 
 <file path=ppt/charts/chart4.xml><?xml version="1.0" encoding="utf-8"?>
 <c:chartSpace xmlns:c="http://schemas.openxmlformats.org/drawingml/2006/chart" xmlns:a="http://schemas.openxmlformats.org/drawingml/2006/main" xmlns:r="http://schemas.openxmlformats.org/officeDocument/2006/relationships">
+  <c:date1904 val="1"/>
   <c:lang val="en-US"/>
+  <c:style val="2"/>
   <c:chart>
     <c:title>
       <c:tx>
@@ -747,16 +755,16 @@
                 <c:formatCode>General</c:formatCode>
                 <c:ptCount val="4"/>
                 <c:pt idx="0">
-                  <c:v>228.99600000000001</c:v>
+                  <c:v>228.996</c:v>
                 </c:pt>
                 <c:pt idx="1">
-                  <c:v>141.99600000000001</c:v>
+                  <c:v>141.996</c:v>
                 </c:pt>
                 <c:pt idx="2">
-                  <c:v>138</c:v>
+                  <c:v>138.0</c:v>
                 </c:pt>
                 <c:pt idx="3">
-                  <c:v>138.99600000000001</c:v>
+                  <c:v>138.996</c:v>
                 </c:pt>
               </c:numCache>
             </c:numRef>
@@ -778,13 +786,13 @@
                 <c:formatCode>General</c:formatCode>
                 <c:ptCount val="4"/>
                 <c:pt idx="0">
-                  <c:v>493.99799999999954</c:v>
+                  <c:v>493.9979999999995</c:v>
                 </c:pt>
                 <c:pt idx="1">
-                  <c:v>244.99800000000019</c:v>
+                  <c:v>244.9980000000002</c:v>
                 </c:pt>
                 <c:pt idx="2">
-                  <c:v>166.99800000000019</c:v>
+                  <c:v>166.9980000000002</c:v>
                 </c:pt>
                 <c:pt idx="3">
                   <c:v>112.998</c:v>
@@ -809,13 +817,13 @@
                 <c:formatCode>General</c:formatCode>
                 <c:ptCount val="4"/>
                 <c:pt idx="1">
-                  <c:v>445.00199999999955</c:v>
+                  <c:v>445.0019999999995</c:v>
                 </c:pt>
                 <c:pt idx="2">
-                  <c:v>336</c:v>
+                  <c:v>336.0</c:v>
                 </c:pt>
                 <c:pt idx="3">
-                  <c:v>190.99800000000016</c:v>
+                  <c:v>190.9980000000002</c:v>
                 </c:pt>
               </c:numCache>
             </c:numRef>
@@ -837,27 +845,27 @@
                 <c:formatCode>General</c:formatCode>
                 <c:ptCount val="4"/>
                 <c:pt idx="0">
-                  <c:v>1881</c:v>
+                  <c:v>1881.0</c:v>
                 </c:pt>
                 <c:pt idx="1">
-                  <c:v>976.99800000000005</c:v>
+                  <c:v>976.998</c:v>
                 </c:pt>
                 <c:pt idx="2">
-                  <c:v>556.91399999999999</c:v>
+                  <c:v>556.914</c:v>
                 </c:pt>
                 <c:pt idx="3">
-                  <c:v>403.96200000000005</c:v>
+                  <c:v>403.962</c:v>
                 </c:pt>
               </c:numCache>
             </c:numRef>
           </c:val>
         </c:ser>
         <c:marker val="1"/>
-        <c:axId val="69140480"/>
-        <c:axId val="69142400"/>
+        <c:axId val="698754104"/>
+        <c:axId val="838554184"/>
       </c:lineChart>
       <c:catAx>
-        <c:axId val="69140480"/>
+        <c:axId val="698754104"/>
         <c:scaling>
           <c:orientation val="minMax"/>
         </c:scaling>
@@ -885,14 +893,14 @@
           <c:layout/>
         </c:title>
         <c:tickLblPos val="nextTo"/>
-        <c:crossAx val="69142400"/>
+        <c:crossAx val="838554184"/>
         <c:crosses val="autoZero"/>
         <c:auto val="1"/>
         <c:lblAlgn val="ctr"/>
         <c:lblOffset val="100"/>
       </c:catAx>
       <c:valAx>
-        <c:axId val="69142400"/>
+        <c:axId val="838554184"/>
         <c:scaling>
           <c:orientation val="minMax"/>
         </c:scaling>
@@ -918,7 +926,7 @@
         </c:title>
         <c:numFmt formatCode="General" sourceLinked="1"/>
         <c:tickLblPos val="nextTo"/>
-        <c:crossAx val="69140480"/>
+        <c:crossAx val="698754104"/>
         <c:crosses val="autoZero"/>
         <c:crossBetween val="between"/>
       </c:valAx>
@@ -934,7 +942,7 @@
 </file>
 
 <file path=ppt/notesMasters/notesMaster1.xml><?xml version="1.0" encoding="utf-8"?>
-<p:notesMaster xmlns:a="http://schemas.openxmlformats.org/drawingml/2006/main" xmlns:r="http://schemas.openxmlformats.org/officeDocument/2006/relationships" xmlns:p="http://schemas.openxmlformats.org/presentationml/2006/main">
+<p:notesMaster xmlns:a="http://schemas.openxmlformats.org/drawingml/2006/main" xmlns:r="http://schemas.openxmlformats.org/officeDocument/2006/relationships" xmlns:mc="http://schemas.openxmlformats.org/markup-compatibility/2006" xmlns:mv="urn:schemas-microsoft-com:mac:vml" xmlns:p="http://schemas.openxmlformats.org/presentationml/2006/main" mc:Ignorable="mv" mc:PreserveAttributes="mv:*">
   <p:cSld>
     <p:bg>
       <p:bgRef idx="1001">
@@ -1016,7 +1024,7 @@
             <a:fld id="{8E161E8F-4E15-A840-9658-105F9DD3DE22}" type="datetimeFigureOut">
               <a:rPr lang="en-US" smtClean="0"/>
               <a:pPr/>
-              <a:t>12/8/2009</a:t>
+              <a:t>12/8/09</a:t>
             </a:fld>
             <a:endParaRPr lang="en-US"/>
           </a:p>
@@ -1283,7 +1291,7 @@
 </file>
 
 <file path=ppt/notesSlides/notesSlide1.xml><?xml version="1.0" encoding="utf-8"?>
-<p:notes xmlns:a="http://schemas.openxmlformats.org/drawingml/2006/main" xmlns:r="http://schemas.openxmlformats.org/officeDocument/2006/relationships" xmlns:p="http://schemas.openxmlformats.org/presentationml/2006/main">
+<p:notes xmlns:a="http://schemas.openxmlformats.org/drawingml/2006/main" xmlns:r="http://schemas.openxmlformats.org/officeDocument/2006/relationships" xmlns:mc="http://schemas.openxmlformats.org/markup-compatibility/2006" xmlns:mv="urn:schemas-microsoft-com:mac:vml" xmlns:p="http://schemas.openxmlformats.org/presentationml/2006/main" mc:Ignorable="mv" mc:PreserveAttributes="mv:*">
   <p:cSld>
     <p:spTree>
       <p:nvGrpSpPr>
@@ -1358,7 +1366,7 @@
             <a:fld id="{D344DA2A-F2F4-D74A-8AEC-1933B33E97E0}" type="slidenum">
               <a:rPr lang="en-US" smtClean="0"/>
               <a:pPr/>
-              <a:t>14</a:t>
+              <a:t>15</a:t>
             </a:fld>
             <a:endParaRPr lang="en-US"/>
           </a:p>
@@ -1373,7 +1381,7 @@
 </file>
 
 <file path=ppt/notesSlides/notesSlide2.xml><?xml version="1.0" encoding="utf-8"?>
-<p:notes xmlns:a="http://schemas.openxmlformats.org/drawingml/2006/main" xmlns:r="http://schemas.openxmlformats.org/officeDocument/2006/relationships" xmlns:p="http://schemas.openxmlformats.org/presentationml/2006/main">
+<p:notes xmlns:a="http://schemas.openxmlformats.org/drawingml/2006/main" xmlns:r="http://schemas.openxmlformats.org/officeDocument/2006/relationships" xmlns:mc="http://schemas.openxmlformats.org/markup-compatibility/2006" xmlns:mv="urn:schemas-microsoft-com:mac:vml" xmlns:p="http://schemas.openxmlformats.org/presentationml/2006/main" mc:Ignorable="mv" mc:PreserveAttributes="mv:*">
   <p:cSld>
     <p:spTree>
       <p:nvGrpSpPr>
@@ -1489,7 +1497,7 @@
             <a:fld id="{D344DA2A-F2F4-D74A-8AEC-1933B33E97E0}" type="slidenum">
               <a:rPr lang="en-US" smtClean="0"/>
               <a:pPr/>
-              <a:t>15</a:t>
+              <a:t>16</a:t>
             </a:fld>
             <a:endParaRPr lang="en-US"/>
           </a:p>
@@ -1504,7 +1512,7 @@
 </file>
 
 <file path=ppt/slideLayouts/slideLayout1.xml><?xml version="1.0" encoding="utf-8"?>
-<p:sldLayout xmlns:a="http://schemas.openxmlformats.org/drawingml/2006/main" xmlns:r="http://schemas.openxmlformats.org/officeDocument/2006/relationships" xmlns:p="http://schemas.openxmlformats.org/presentationml/2006/main" type="title" preserve="1">
+<p:sldLayout xmlns:a="http://schemas.openxmlformats.org/drawingml/2006/main" xmlns:r="http://schemas.openxmlformats.org/officeDocument/2006/relationships" xmlns:mc="http://schemas.openxmlformats.org/markup-compatibility/2006" xmlns:mv="urn:schemas-microsoft-com:mac:vml" xmlns:p="http://schemas.openxmlformats.org/presentationml/2006/main" mc:Ignorable="mv" mc:PreserveAttributes="mv:*" type="title" preserve="1">
   <p:cSld name="Title Slide">
     <p:spTree>
       <p:nvGrpSpPr>
@@ -1729,7 +1737,7 @@
             <a:fld id="{4C4AD4EB-88D0-C141-9474-CCD86A78CB94}" type="datetimeFigureOut">
               <a:rPr lang="en-US" smtClean="0"/>
               <a:pPr/>
-              <a:t>12/8/2009</a:t>
+              <a:t>12/8/09</a:t>
             </a:fld>
             <a:endParaRPr lang="en-US" dirty="0"/>
           </a:p>
@@ -1787,7 +1795,7 @@
 </file>
 
 <file path=ppt/slideLayouts/slideLayout10.xml><?xml version="1.0" encoding="utf-8"?>
-<p:sldLayout xmlns:a="http://schemas.openxmlformats.org/drawingml/2006/main" xmlns:r="http://schemas.openxmlformats.org/officeDocument/2006/relationships" xmlns:p="http://schemas.openxmlformats.org/presentationml/2006/main" type="picTx" preserve="1">
+<p:sldLayout xmlns:a="http://schemas.openxmlformats.org/drawingml/2006/main" xmlns:r="http://schemas.openxmlformats.org/officeDocument/2006/relationships" xmlns:mc="http://schemas.openxmlformats.org/markup-compatibility/2006" xmlns:mv="urn:schemas-microsoft-com:mac:vml" xmlns:p="http://schemas.openxmlformats.org/presentationml/2006/main" mc:Ignorable="mv" mc:PreserveAttributes="mv:*" type="picTx" preserve="1">
   <p:cSld name="Picture with Caption">
     <p:spTree>
       <p:nvGrpSpPr>
@@ -2052,7 +2060,7 @@
             <a:fld id="{4C4AD4EB-88D0-C141-9474-CCD86A78CB94}" type="datetimeFigureOut">
               <a:rPr lang="en-US" smtClean="0"/>
               <a:pPr/>
-              <a:t>12/8/2009</a:t>
+              <a:t>12/8/09</a:t>
             </a:fld>
             <a:endParaRPr lang="en-US"/>
           </a:p>
@@ -2110,7 +2118,7 @@
 </file>
 
 <file path=ppt/slideLayouts/slideLayout11.xml><?xml version="1.0" encoding="utf-8"?>
-<p:sldLayout xmlns:a="http://schemas.openxmlformats.org/drawingml/2006/main" xmlns:r="http://schemas.openxmlformats.org/officeDocument/2006/relationships" xmlns:p="http://schemas.openxmlformats.org/presentationml/2006/main" preserve="1">
+<p:sldLayout xmlns:a="http://schemas.openxmlformats.org/drawingml/2006/main" xmlns:r="http://schemas.openxmlformats.org/officeDocument/2006/relationships" xmlns:mc="http://schemas.openxmlformats.org/markup-compatibility/2006" xmlns:mv="urn:schemas-microsoft-com:mac:vml" xmlns:p="http://schemas.openxmlformats.org/presentationml/2006/main" mc:Ignorable="mv" mc:PreserveAttributes="mv:*" preserve="1">
   <p:cSld name="Picture above Caption">
     <p:spTree>
       <p:nvGrpSpPr>
@@ -2328,7 +2336,7 @@
             <a:fld id="{4C4AD4EB-88D0-C141-9474-CCD86A78CB94}" type="datetimeFigureOut">
               <a:rPr lang="en-US" smtClean="0"/>
               <a:pPr/>
-              <a:t>12/8/2009</a:t>
+              <a:t>12/8/09</a:t>
             </a:fld>
             <a:endParaRPr lang="en-US"/>
           </a:p>
@@ -2397,7 +2405,7 @@
 </file>
 
 <file path=ppt/slideLayouts/slideLayout12.xml><?xml version="1.0" encoding="utf-8"?>
-<p:sldLayout xmlns:a="http://schemas.openxmlformats.org/drawingml/2006/main" xmlns:r="http://schemas.openxmlformats.org/officeDocument/2006/relationships" xmlns:p="http://schemas.openxmlformats.org/presentationml/2006/main" preserve="1">
+<p:sldLayout xmlns:a="http://schemas.openxmlformats.org/drawingml/2006/main" xmlns:r="http://schemas.openxmlformats.org/officeDocument/2006/relationships" xmlns:mc="http://schemas.openxmlformats.org/markup-compatibility/2006" xmlns:mv="urn:schemas-microsoft-com:mac:vml" xmlns:p="http://schemas.openxmlformats.org/presentationml/2006/main" mc:Ignorable="mv" mc:PreserveAttributes="mv:*" preserve="1">
   <p:cSld name="2 Pictures with Caption">
     <p:spTree>
       <p:nvGrpSpPr>
@@ -2620,7 +2628,7 @@
             <a:fld id="{4C4AD4EB-88D0-C141-9474-CCD86A78CB94}" type="datetimeFigureOut">
               <a:rPr lang="en-US" smtClean="0"/>
               <a:pPr/>
-              <a:t>12/8/2009</a:t>
+              <a:t>12/8/09</a:t>
             </a:fld>
             <a:endParaRPr lang="en-US"/>
           </a:p>
@@ -2724,7 +2732,7 @@
 </file>
 
 <file path=ppt/slideLayouts/slideLayout13.xml><?xml version="1.0" encoding="utf-8"?>
-<p:sldLayout xmlns:a="http://schemas.openxmlformats.org/drawingml/2006/main" xmlns:r="http://schemas.openxmlformats.org/officeDocument/2006/relationships" xmlns:p="http://schemas.openxmlformats.org/presentationml/2006/main" preserve="1">
+<p:sldLayout xmlns:a="http://schemas.openxmlformats.org/drawingml/2006/main" xmlns:r="http://schemas.openxmlformats.org/officeDocument/2006/relationships" xmlns:mc="http://schemas.openxmlformats.org/markup-compatibility/2006" xmlns:mv="urn:schemas-microsoft-com:mac:vml" xmlns:p="http://schemas.openxmlformats.org/presentationml/2006/main" mc:Ignorable="mv" mc:PreserveAttributes="mv:*" preserve="1">
   <p:cSld name="3 Pictures with Caption">
     <p:spTree>
       <p:nvGrpSpPr>
@@ -2947,7 +2955,7 @@
             <a:fld id="{4C4AD4EB-88D0-C141-9474-CCD86A78CB94}" type="datetimeFigureOut">
               <a:rPr lang="en-US" smtClean="0"/>
               <a:pPr/>
-              <a:t>12/8/2009</a:t>
+              <a:t>12/8/09</a:t>
             </a:fld>
             <a:endParaRPr lang="en-US"/>
           </a:p>
@@ -3086,7 +3094,7 @@
 </file>
 
 <file path=ppt/slideLayouts/slideLayout14.xml><?xml version="1.0" encoding="utf-8"?>
-<p:sldLayout xmlns:a="http://schemas.openxmlformats.org/drawingml/2006/main" xmlns:r="http://schemas.openxmlformats.org/officeDocument/2006/relationships" xmlns:p="http://schemas.openxmlformats.org/presentationml/2006/main" type="vertTx" preserve="1">
+<p:sldLayout xmlns:a="http://schemas.openxmlformats.org/drawingml/2006/main" xmlns:r="http://schemas.openxmlformats.org/officeDocument/2006/relationships" xmlns:mc="http://schemas.openxmlformats.org/markup-compatibility/2006" xmlns:mv="urn:schemas-microsoft-com:mac:vml" xmlns:p="http://schemas.openxmlformats.org/presentationml/2006/main" mc:Ignorable="mv" mc:PreserveAttributes="mv:*" type="vertTx" preserve="1">
   <p:cSld name="Title and Vertical Text">
     <p:spTree>
       <p:nvGrpSpPr>
@@ -3195,7 +3203,7 @@
             <a:fld id="{4C4AD4EB-88D0-C141-9474-CCD86A78CB94}" type="datetimeFigureOut">
               <a:rPr lang="en-US" smtClean="0"/>
               <a:pPr/>
-              <a:t>12/8/2009</a:t>
+              <a:t>12/8/09</a:t>
             </a:fld>
             <a:endParaRPr lang="en-US"/>
           </a:p>
@@ -3253,7 +3261,7 @@
 </file>
 
 <file path=ppt/slideLayouts/slideLayout15.xml><?xml version="1.0" encoding="utf-8"?>
-<p:sldLayout xmlns:a="http://schemas.openxmlformats.org/drawingml/2006/main" xmlns:r="http://schemas.openxmlformats.org/officeDocument/2006/relationships" xmlns:p="http://schemas.openxmlformats.org/presentationml/2006/main" type="vertTitleAndTx" preserve="1">
+<p:sldLayout xmlns:a="http://schemas.openxmlformats.org/drawingml/2006/main" xmlns:r="http://schemas.openxmlformats.org/officeDocument/2006/relationships" xmlns:mc="http://schemas.openxmlformats.org/markup-compatibility/2006" xmlns:mv="urn:schemas-microsoft-com:mac:vml" xmlns:p="http://schemas.openxmlformats.org/presentationml/2006/main" mc:Ignorable="mv" mc:PreserveAttributes="mv:*" type="vertTitleAndTx" preserve="1">
   <p:cSld name="Vertical Title and Text">
     <p:spTree>
       <p:nvGrpSpPr>
@@ -3372,7 +3380,7 @@
             <a:fld id="{4C4AD4EB-88D0-C141-9474-CCD86A78CB94}" type="datetimeFigureOut">
               <a:rPr lang="en-US" smtClean="0"/>
               <a:pPr/>
-              <a:t>12/8/2009</a:t>
+              <a:t>12/8/09</a:t>
             </a:fld>
             <a:endParaRPr lang="en-US"/>
           </a:p>
@@ -3430,7 +3438,7 @@
 </file>
 
 <file path=ppt/slideLayouts/slideLayout16.xml><?xml version="1.0" encoding="utf-8"?>
-<p:sldLayout xmlns:a="http://schemas.openxmlformats.org/drawingml/2006/main" xmlns:r="http://schemas.openxmlformats.org/officeDocument/2006/relationships" xmlns:p="http://schemas.openxmlformats.org/presentationml/2006/main">
+<p:sldLayout xmlns:a="http://schemas.openxmlformats.org/drawingml/2006/main" xmlns:r="http://schemas.openxmlformats.org/officeDocument/2006/relationships" xmlns:mc="http://schemas.openxmlformats.org/markup-compatibility/2006" xmlns:mv="urn:schemas-microsoft-com:mac:vml" xmlns:p="http://schemas.openxmlformats.org/presentationml/2006/main" mc:Ignorable="mv" mc:PreserveAttributes="mv:*">
   <p:cSld name="Custom Layout">
     <p:spTree>
       <p:nvGrpSpPr>
@@ -3592,7 +3600,7 @@
 </file>
 
 <file path=ppt/slideLayouts/slideLayout2.xml><?xml version="1.0" encoding="utf-8"?>
-<p:sldLayout xmlns:a="http://schemas.openxmlformats.org/drawingml/2006/main" xmlns:r="http://schemas.openxmlformats.org/officeDocument/2006/relationships" xmlns:p="http://schemas.openxmlformats.org/presentationml/2006/main" type="obj" preserve="1">
+<p:sldLayout xmlns:a="http://schemas.openxmlformats.org/drawingml/2006/main" xmlns:r="http://schemas.openxmlformats.org/officeDocument/2006/relationships" xmlns:mc="http://schemas.openxmlformats.org/markup-compatibility/2006" xmlns:mv="urn:schemas-microsoft-com:mac:vml" xmlns:p="http://schemas.openxmlformats.org/presentationml/2006/main" mc:Ignorable="mv" mc:PreserveAttributes="mv:*" type="obj" preserve="1">
   <p:cSld name="Title and Content">
     <p:spTree>
       <p:nvGrpSpPr>
@@ -3749,7 +3757,7 @@
             <a:fld id="{4C4AD4EB-88D0-C141-9474-CCD86A78CB94}" type="datetimeFigureOut">
               <a:rPr lang="en-US" smtClean="0"/>
               <a:pPr/>
-              <a:t>12/8/2009</a:t>
+              <a:t>12/8/09</a:t>
             </a:fld>
             <a:endParaRPr lang="en-US"/>
           </a:p>
@@ -3839,7 +3847,7 @@
 </file>
 
 <file path=ppt/slideLayouts/slideLayout3.xml><?xml version="1.0" encoding="utf-8"?>
-<p:sldLayout xmlns:a="http://schemas.openxmlformats.org/drawingml/2006/main" xmlns:r="http://schemas.openxmlformats.org/officeDocument/2006/relationships" xmlns:p="http://schemas.openxmlformats.org/presentationml/2006/main" preserve="1">
+<p:sldLayout xmlns:a="http://schemas.openxmlformats.org/drawingml/2006/main" xmlns:r="http://schemas.openxmlformats.org/officeDocument/2006/relationships" xmlns:mc="http://schemas.openxmlformats.org/markup-compatibility/2006" xmlns:mv="urn:schemas-microsoft-com:mac:vml" xmlns:p="http://schemas.openxmlformats.org/presentationml/2006/main" mc:Ignorable="mv" mc:PreserveAttributes="mv:*" preserve="1">
   <p:cSld name="Title Slide with Picture">
     <p:spTree>
       <p:nvGrpSpPr>
@@ -4052,7 +4060,7 @@
             <a:fld id="{4C4AD4EB-88D0-C141-9474-CCD86A78CB94}" type="datetimeFigureOut">
               <a:rPr lang="en-US" smtClean="0"/>
               <a:pPr/>
-              <a:t>12/8/2009</a:t>
+              <a:t>12/8/09</a:t>
             </a:fld>
             <a:endParaRPr lang="en-US"/>
           </a:p>
@@ -4121,7 +4129,7 @@
 </file>
 
 <file path=ppt/slideLayouts/slideLayout4.xml><?xml version="1.0" encoding="utf-8"?>
-<p:sldLayout xmlns:a="http://schemas.openxmlformats.org/drawingml/2006/main" xmlns:r="http://schemas.openxmlformats.org/officeDocument/2006/relationships" xmlns:p="http://schemas.openxmlformats.org/presentationml/2006/main" type="secHead" preserve="1">
+<p:sldLayout xmlns:a="http://schemas.openxmlformats.org/drawingml/2006/main" xmlns:r="http://schemas.openxmlformats.org/officeDocument/2006/relationships" xmlns:mc="http://schemas.openxmlformats.org/markup-compatibility/2006" xmlns:mv="urn:schemas-microsoft-com:mac:vml" xmlns:p="http://schemas.openxmlformats.org/presentationml/2006/main" mc:Ignorable="mv" mc:PreserveAttributes="mv:*" type="secHead" preserve="1">
   <p:cSld name="Section Header">
     <p:spTree>
       <p:nvGrpSpPr>
@@ -4360,7 +4368,7 @@
             <a:fld id="{4C4AD4EB-88D0-C141-9474-CCD86A78CB94}" type="datetimeFigureOut">
               <a:rPr lang="en-US" smtClean="0"/>
               <a:pPr/>
-              <a:t>12/8/2009</a:t>
+              <a:t>12/8/09</a:t>
             </a:fld>
             <a:endParaRPr lang="en-US"/>
           </a:p>
@@ -4418,7 +4426,7 @@
 </file>
 
 <file path=ppt/slideLayouts/slideLayout5.xml><?xml version="1.0" encoding="utf-8"?>
-<p:sldLayout xmlns:a="http://schemas.openxmlformats.org/drawingml/2006/main" xmlns:r="http://schemas.openxmlformats.org/officeDocument/2006/relationships" xmlns:p="http://schemas.openxmlformats.org/presentationml/2006/main" type="twoObj" preserve="1">
+<p:sldLayout xmlns:a="http://schemas.openxmlformats.org/drawingml/2006/main" xmlns:r="http://schemas.openxmlformats.org/officeDocument/2006/relationships" xmlns:mc="http://schemas.openxmlformats.org/markup-compatibility/2006" xmlns:mv="urn:schemas-microsoft-com:mac:vml" xmlns:p="http://schemas.openxmlformats.org/presentationml/2006/main" mc:Ignorable="mv" mc:PreserveAttributes="mv:*" type="twoObj" preserve="1">
   <p:cSld name="Two Content">
     <p:spTree>
       <p:nvGrpSpPr>
@@ -4654,7 +4662,7 @@
             <a:fld id="{4C4AD4EB-88D0-C141-9474-CCD86A78CB94}" type="datetimeFigureOut">
               <a:rPr lang="en-US" smtClean="0"/>
               <a:pPr/>
-              <a:t>12/8/2009</a:t>
+              <a:t>12/8/09</a:t>
             </a:fld>
             <a:endParaRPr lang="en-US"/>
           </a:p>
@@ -4712,7 +4720,7 @@
 </file>
 
 <file path=ppt/slideLayouts/slideLayout6.xml><?xml version="1.0" encoding="utf-8"?>
-<p:sldLayout xmlns:a="http://schemas.openxmlformats.org/drawingml/2006/main" xmlns:r="http://schemas.openxmlformats.org/officeDocument/2006/relationships" xmlns:p="http://schemas.openxmlformats.org/presentationml/2006/main" type="twoTxTwoObj" preserve="1">
+<p:sldLayout xmlns:a="http://schemas.openxmlformats.org/drawingml/2006/main" xmlns:r="http://schemas.openxmlformats.org/officeDocument/2006/relationships" xmlns:mc="http://schemas.openxmlformats.org/markup-compatibility/2006" xmlns:mv="urn:schemas-microsoft-com:mac:vml" xmlns:p="http://schemas.openxmlformats.org/presentationml/2006/main" mc:Ignorable="mv" mc:PreserveAttributes="mv:*" type="twoTxTwoObj" preserve="1">
   <p:cSld name="Comparison">
     <p:spTree>
       <p:nvGrpSpPr>
@@ -5086,7 +5094,7 @@
             <a:fld id="{4C4AD4EB-88D0-C141-9474-CCD86A78CB94}" type="datetimeFigureOut">
               <a:rPr lang="en-US" smtClean="0"/>
               <a:pPr/>
-              <a:t>12/8/2009</a:t>
+              <a:t>12/8/09</a:t>
             </a:fld>
             <a:endParaRPr lang="en-US"/>
           </a:p>
@@ -5377,7 +5385,7 @@
 </file>
 
 <file path=ppt/slideLayouts/slideLayout7.xml><?xml version="1.0" encoding="utf-8"?>
-<p:sldLayout xmlns:a="http://schemas.openxmlformats.org/drawingml/2006/main" xmlns:r="http://schemas.openxmlformats.org/officeDocument/2006/relationships" xmlns:p="http://schemas.openxmlformats.org/presentationml/2006/main" type="titleOnly" preserve="1">
+<p:sldLayout xmlns:a="http://schemas.openxmlformats.org/drawingml/2006/main" xmlns:r="http://schemas.openxmlformats.org/officeDocument/2006/relationships" xmlns:mc="http://schemas.openxmlformats.org/markup-compatibility/2006" xmlns:mv="urn:schemas-microsoft-com:mac:vml" xmlns:p="http://schemas.openxmlformats.org/presentationml/2006/main" mc:Ignorable="mv" mc:PreserveAttributes="mv:*" type="titleOnly" preserve="1">
   <p:cSld name="Title Only">
     <p:spTree>
       <p:nvGrpSpPr>
@@ -5434,7 +5442,7 @@
             <a:fld id="{4C4AD4EB-88D0-C141-9474-CCD86A78CB94}" type="datetimeFigureOut">
               <a:rPr lang="en-US" smtClean="0"/>
               <a:pPr/>
-              <a:t>12/8/2009</a:t>
+              <a:t>12/8/09</a:t>
             </a:fld>
             <a:endParaRPr lang="en-US"/>
           </a:p>
@@ -5492,7 +5500,7 @@
 </file>
 
 <file path=ppt/slideLayouts/slideLayout8.xml><?xml version="1.0" encoding="utf-8"?>
-<p:sldLayout xmlns:a="http://schemas.openxmlformats.org/drawingml/2006/main" xmlns:r="http://schemas.openxmlformats.org/officeDocument/2006/relationships" xmlns:p="http://schemas.openxmlformats.org/presentationml/2006/main" type="blank" preserve="1">
+<p:sldLayout xmlns:a="http://schemas.openxmlformats.org/drawingml/2006/main" xmlns:r="http://schemas.openxmlformats.org/officeDocument/2006/relationships" xmlns:mc="http://schemas.openxmlformats.org/markup-compatibility/2006" xmlns:mv="urn:schemas-microsoft-com:mac:vml" xmlns:p="http://schemas.openxmlformats.org/presentationml/2006/main" mc:Ignorable="mv" mc:PreserveAttributes="mv:*" type="blank" preserve="1">
   <p:cSld name="Blank">
     <p:spTree>
       <p:nvGrpSpPr>
@@ -5526,7 +5534,7 @@
             <a:fld id="{4C4AD4EB-88D0-C141-9474-CCD86A78CB94}" type="datetimeFigureOut">
               <a:rPr lang="en-US" smtClean="0"/>
               <a:pPr/>
-              <a:t>12/8/2009</a:t>
+              <a:t>12/8/09</a:t>
             </a:fld>
             <a:endParaRPr lang="en-US"/>
           </a:p>
@@ -5584,7 +5592,7 @@
 </file>
 
 <file path=ppt/slideLayouts/slideLayout9.xml><?xml version="1.0" encoding="utf-8"?>
-<p:sldLayout xmlns:a="http://schemas.openxmlformats.org/drawingml/2006/main" xmlns:r="http://schemas.openxmlformats.org/officeDocument/2006/relationships" xmlns:p="http://schemas.openxmlformats.org/presentationml/2006/main" type="objTx" preserve="1">
+<p:sldLayout xmlns:a="http://schemas.openxmlformats.org/drawingml/2006/main" xmlns:r="http://schemas.openxmlformats.org/officeDocument/2006/relationships" xmlns:mc="http://schemas.openxmlformats.org/markup-compatibility/2006" xmlns:mv="urn:schemas-microsoft-com:mac:vml" xmlns:p="http://schemas.openxmlformats.org/presentationml/2006/main" mc:Ignorable="mv" mc:PreserveAttributes="mv:*" type="objTx" preserve="1">
   <p:cSld name="Content with Caption">
     <p:spTree>
       <p:nvGrpSpPr>
@@ -5865,7 +5873,7 @@
             <a:fld id="{4C4AD4EB-88D0-C141-9474-CCD86A78CB94}" type="datetimeFigureOut">
               <a:rPr lang="en-US" smtClean="0"/>
               <a:pPr/>
-              <a:t>12/8/2009</a:t>
+              <a:t>12/8/09</a:t>
             </a:fld>
             <a:endParaRPr lang="en-US"/>
           </a:p>
@@ -5923,7 +5931,7 @@
 </file>
 
 <file path=ppt/slideMasters/slideMaster1.xml><?xml version="1.0" encoding="utf-8"?>
-<p:sldMaster xmlns:a="http://schemas.openxmlformats.org/drawingml/2006/main" xmlns:r="http://schemas.openxmlformats.org/officeDocument/2006/relationships" xmlns:p="http://schemas.openxmlformats.org/presentationml/2006/main">
+<p:sldMaster xmlns:a="http://schemas.openxmlformats.org/drawingml/2006/main" xmlns:r="http://schemas.openxmlformats.org/officeDocument/2006/relationships" xmlns:mc="http://schemas.openxmlformats.org/markup-compatibility/2006" xmlns:mv="urn:schemas-microsoft-com:mac:vml" xmlns:p="http://schemas.openxmlformats.org/presentationml/2006/main" mc:Ignorable="mv" mc:PreserveAttributes="mv:*">
   <p:cSld>
     <p:bg>
       <p:bgRef idx="1001">
@@ -6079,7 +6087,7 @@
             <a:fld id="{4C4AD4EB-88D0-C141-9474-CCD86A78CB94}" type="datetimeFigureOut">
               <a:rPr lang="en-US" smtClean="0"/>
               <a:pPr/>
-              <a:t>12/8/2009</a:t>
+              <a:t>12/8/09</a:t>
             </a:fld>
             <a:endParaRPr lang="en-US"/>
           </a:p>
@@ -6613,7 +6621,7 @@
 </file>
 
 <file path=ppt/slides/slide1.xml><?xml version="1.0" encoding="utf-8"?>
-<p:sld xmlns:a="http://schemas.openxmlformats.org/drawingml/2006/main" xmlns:r="http://schemas.openxmlformats.org/officeDocument/2006/relationships" xmlns:p="http://schemas.openxmlformats.org/presentationml/2006/main">
+<p:sld xmlns:a="http://schemas.openxmlformats.org/drawingml/2006/main" xmlns:r="http://schemas.openxmlformats.org/officeDocument/2006/relationships" xmlns:mc="http://schemas.openxmlformats.org/markup-compatibility/2006" xmlns:mv="urn:schemas-microsoft-com:mac:vml" xmlns:p="http://schemas.openxmlformats.org/presentationml/2006/main" mc:Ignorable="mv" mc:PreserveAttributes="mv:*">
   <p:cSld>
     <p:spTree>
       <p:nvGrpSpPr>
@@ -6805,7 +6813,7 @@
 </file>
 
 <file path=ppt/slides/slide10.xml><?xml version="1.0" encoding="utf-8"?>
-<p:sld xmlns:a="http://schemas.openxmlformats.org/drawingml/2006/main" xmlns:r="http://schemas.openxmlformats.org/officeDocument/2006/relationships" xmlns:p="http://schemas.openxmlformats.org/presentationml/2006/main">
+<p:sld xmlns:a="http://schemas.openxmlformats.org/drawingml/2006/main" xmlns:r="http://schemas.openxmlformats.org/officeDocument/2006/relationships" xmlns:mc="http://schemas.openxmlformats.org/markup-compatibility/2006" xmlns:mv="urn:schemas-microsoft-com:mac:vml" xmlns:p="http://schemas.openxmlformats.org/presentationml/2006/main" mc:Ignorable="mv" mc:PreserveAttributes="mv:*">
   <p:cSld>
     <p:spTree>
       <p:nvGrpSpPr>
@@ -6840,6 +6848,138 @@
           <a:p>
             <a:r>
               <a:rPr lang="en-US" dirty="0" smtClean="0"/>
+              <a:t>Distributed Model (Conventional)</a:t>
+            </a:r>
+            <a:endParaRPr lang="en-US" dirty="0"/>
+          </a:p>
+        </p:txBody>
+      </p:sp>
+      <p:sp>
+        <p:nvSpPr>
+          <p:cNvPr id="3" name="Content Placeholder 2"/>
+          <p:cNvSpPr>
+            <a:spLocks noGrp="1"/>
+          </p:cNvSpPr>
+          <p:nvPr>
+            <p:ph idx="1"/>
+          </p:nvPr>
+        </p:nvSpPr>
+        <p:spPr>
+          <a:xfrm>
+            <a:off x="757947" y="1529880"/>
+            <a:ext cx="3382732" cy="4608884"/>
+          </a:xfrm>
+        </p:spPr>
+        <p:txBody>
+          <a:bodyPr>
+            <a:normAutofit lnSpcReduction="10000"/>
+          </a:bodyPr>
+          <a:lstStyle/>
+          <a:p>
+            <a:r>
+              <a:rPr lang="en-US" dirty="0" smtClean="0"/>
+              <a:t>Each assignment reads 2.3 gigabytes of data</a:t>
+            </a:r>
+          </a:p>
+          <a:p>
+            <a:r>
+              <a:rPr lang="en-US" dirty="0" smtClean="0"/>
+              <a:t>8x8 matrix.  Each file 287 megabytes</a:t>
+            </a:r>
+          </a:p>
+          <a:p>
+            <a:r>
+              <a:rPr lang="en-US" dirty="0" smtClean="0"/>
+              <a:t>Times decrease with respect to number of workers</a:t>
+            </a:r>
+          </a:p>
+          <a:p>
+            <a:r>
+              <a:rPr lang="en-US" dirty="0" smtClean="0"/>
+              <a:t>Remote data is expensive</a:t>
+            </a:r>
+          </a:p>
+          <a:p>
+            <a:r>
+              <a:rPr lang="en-US" dirty="0" smtClean="0"/>
+              <a:t>Minimum time required to handle requests from same server</a:t>
+            </a:r>
+          </a:p>
+          <a:p>
+            <a:endParaRPr lang="en-US" dirty="0" smtClean="0"/>
+          </a:p>
+          <a:p>
+            <a:endParaRPr lang="en-US" dirty="0" smtClean="0"/>
+          </a:p>
+        </p:txBody>
+      </p:sp>
+      <p:graphicFrame>
+        <p:nvGraphicFramePr>
+          <p:cNvPr id="6" name="Chart 5"/>
+          <p:cNvGraphicFramePr/>
+          <p:nvPr/>
+        </p:nvGraphicFramePr>
+        <p:xfrm>
+          <a:off x="4352295" y="1571626"/>
+          <a:ext cx="4474684" cy="3814762"/>
+        </p:xfrm>
+        <a:graphic>
+          <a:graphicData uri="http://schemas.openxmlformats.org/drawingml/2006/chart">
+            <c:chart xmlns:c="http://schemas.openxmlformats.org/drawingml/2006/chart" xmlns:r="http://schemas.openxmlformats.org/officeDocument/2006/relationships" r:id="rId2"/>
+          </a:graphicData>
+        </a:graphic>
+      </p:graphicFrame>
+    </p:spTree>
+  </p:cSld>
+  <p:clrMapOvr>
+    <a:masterClrMapping/>
+  </p:clrMapOvr>
+  <p:timing>
+    <p:tnLst>
+      <p:par>
+        <p:cTn id="1" dur="indefinite" restart="never" nodeType="tmRoot"/>
+      </p:par>
+    </p:tnLst>
+  </p:timing>
+</p:sld>
+</file>
+
+<file path=ppt/slides/slide11.xml><?xml version="1.0" encoding="utf-8"?>
+<p:sld xmlns:a="http://schemas.openxmlformats.org/drawingml/2006/main" xmlns:r="http://schemas.openxmlformats.org/officeDocument/2006/relationships" xmlns:mc="http://schemas.openxmlformats.org/markup-compatibility/2006" xmlns:mv="urn:schemas-microsoft-com:mac:vml" xmlns:p="http://schemas.openxmlformats.org/presentationml/2006/main" mc:Ignorable="mv" mc:PreserveAttributes="mv:*">
+  <p:cSld>
+    <p:spTree>
+      <p:nvGrpSpPr>
+        <p:cNvPr id="1" name=""/>
+        <p:cNvGrpSpPr/>
+        <p:nvPr/>
+      </p:nvGrpSpPr>
+      <p:grpSpPr>
+        <a:xfrm>
+          <a:off x="0" y="0"/>
+          <a:ext cx="0" cy="0"/>
+          <a:chOff x="0" y="0"/>
+          <a:chExt cx="0" cy="0"/>
+        </a:xfrm>
+      </p:grpSpPr>
+      <p:sp>
+        <p:nvSpPr>
+          <p:cNvPr id="2" name="Title 1"/>
+          <p:cNvSpPr>
+            <a:spLocks noGrp="1"/>
+          </p:cNvSpPr>
+          <p:nvPr>
+            <p:ph type="title"/>
+          </p:nvPr>
+        </p:nvSpPr>
+        <p:spPr/>
+        <p:txBody>
+          <a:bodyPr>
+            <a:normAutofit/>
+          </a:bodyPr>
+          <a:lstStyle/>
+          <a:p>
+            <a:r>
+              <a:rPr lang="en-US" dirty="0" smtClean="0"/>
               <a:t>Distributed Model (Intelligent)</a:t>
             </a:r>
             <a:endParaRPr lang="en-US" dirty="0"/>
@@ -6870,15 +7010,7 @@
           <a:p>
             <a:r>
               <a:rPr lang="en-US" dirty="0" smtClean="0"/>
-              <a:t>Each </a:t>
-            </a:r>
-            <a:r>
-              <a:rPr lang="en-US" dirty="0" smtClean="0"/>
-              <a:t>assignment reads </a:t>
-            </a:r>
-            <a:r>
-              <a:rPr lang="en-US" dirty="0" smtClean="0"/>
-              <a:t>2.3 gigabytes of data</a:t>
+              <a:t>Each assignment reads 2.3 gigabytes of data</a:t>
             </a:r>
           </a:p>
           <a:p>
@@ -6948,8 +7080,8 @@
 </p:sld>
 </file>
 
-<file path=ppt/slides/slide11.xml><?xml version="1.0" encoding="utf-8"?>
-<p:sld xmlns:a="http://schemas.openxmlformats.org/drawingml/2006/main" xmlns:r="http://schemas.openxmlformats.org/officeDocument/2006/relationships" xmlns:p="http://schemas.openxmlformats.org/presentationml/2006/main">
+<file path=ppt/slides/slide12.xml><?xml version="1.0" encoding="utf-8"?>
+<p:sld xmlns:a="http://schemas.openxmlformats.org/drawingml/2006/main" xmlns:r="http://schemas.openxmlformats.org/officeDocument/2006/relationships" xmlns:mc="http://schemas.openxmlformats.org/markup-compatibility/2006" xmlns:mv="urn:schemas-microsoft-com:mac:vml" xmlns:p="http://schemas.openxmlformats.org/presentationml/2006/main" mc:Ignorable="mv" mc:PreserveAttributes="mv:*">
   <p:cSld>
     <p:spTree>
       <p:nvGrpSpPr>
@@ -7066,8 +7198,8 @@
 </p:sld>
 </file>
 
-<file path=ppt/slides/slide12.xml><?xml version="1.0" encoding="utf-8"?>
-<p:sld xmlns:a="http://schemas.openxmlformats.org/drawingml/2006/main" xmlns:r="http://schemas.openxmlformats.org/officeDocument/2006/relationships" xmlns:p="http://schemas.openxmlformats.org/presentationml/2006/main">
+<file path=ppt/slides/slide13.xml><?xml version="1.0" encoding="utf-8"?>
+<p:sld xmlns:a="http://schemas.openxmlformats.org/drawingml/2006/main" xmlns:r="http://schemas.openxmlformats.org/officeDocument/2006/relationships" xmlns:mc="http://schemas.openxmlformats.org/markup-compatibility/2006" xmlns:mv="urn:schemas-microsoft-com:mac:vml" xmlns:p="http://schemas.openxmlformats.org/presentationml/2006/main" mc:Ignorable="mv" mc:PreserveAttributes="mv:*">
   <p:cSld>
     <p:spTree>
       <p:nvGrpSpPr>
@@ -7173,144 +7305,6 @@
             <a:r>
               <a:rPr lang="en-US" dirty="0" smtClean="0"/>
               <a:t>Ignoring data dependencies is no longer an option</a:t>
-            </a:r>
-          </a:p>
-        </p:txBody>
-      </p:sp>
-    </p:spTree>
-  </p:cSld>
-  <p:clrMapOvr>
-    <a:masterClrMapping/>
-  </p:clrMapOvr>
-  <p:timing>
-    <p:tnLst>
-      <p:par>
-        <p:cTn id="1" dur="indefinite" restart="never" nodeType="tmRoot"/>
-      </p:par>
-    </p:tnLst>
-  </p:timing>
-</p:sld>
-</file>
-
-<file path=ppt/slides/slide13.xml><?xml version="1.0" encoding="utf-8"?>
-<p:sld xmlns:a="http://schemas.openxmlformats.org/drawingml/2006/main" xmlns:r="http://schemas.openxmlformats.org/officeDocument/2006/relationships" xmlns:p="http://schemas.openxmlformats.org/presentationml/2006/main">
-  <p:cSld>
-    <p:spTree>
-      <p:nvGrpSpPr>
-        <p:cNvPr id="1" name=""/>
-        <p:cNvGrpSpPr/>
-        <p:nvPr/>
-      </p:nvGrpSpPr>
-      <p:grpSpPr>
-        <a:xfrm>
-          <a:off x="0" y="0"/>
-          <a:ext cx="0" cy="0"/>
-          <a:chOff x="0" y="0"/>
-          <a:chExt cx="0" cy="0"/>
-        </a:xfrm>
-      </p:grpSpPr>
-      <p:sp>
-        <p:nvSpPr>
-          <p:cNvPr id="2" name="Title 1"/>
-          <p:cNvSpPr>
-            <a:spLocks noGrp="1"/>
-          </p:cNvSpPr>
-          <p:nvPr>
-            <p:ph type="title"/>
-          </p:nvPr>
-        </p:nvSpPr>
-        <p:spPr/>
-        <p:txBody>
-          <a:bodyPr/>
-          <a:lstStyle/>
-          <a:p>
-            <a:r>
-              <a:rPr lang="en-US" dirty="0" smtClean="0"/>
-              <a:t>Distributed Filesystem Model</a:t>
-            </a:r>
-            <a:endParaRPr lang="en-US" dirty="0"/>
-          </a:p>
-        </p:txBody>
-      </p:sp>
-      <p:sp>
-        <p:nvSpPr>
-          <p:cNvPr id="3" name="Content Placeholder 2"/>
-          <p:cNvSpPr>
-            <a:spLocks noGrp="1"/>
-          </p:cNvSpPr>
-          <p:nvPr>
-            <p:ph idx="1"/>
-          </p:nvPr>
-        </p:nvSpPr>
-        <p:spPr/>
-        <p:txBody>
-          <a:bodyPr>
-            <a:normAutofit/>
-          </a:bodyPr>
-          <a:lstStyle/>
-          <a:p>
-            <a:r>
-              <a:rPr lang="en-US" dirty="0" smtClean="0"/>
-              <a:t>Abstract layer between application and local filesystems</a:t>
-            </a:r>
-          </a:p>
-          <a:p>
-            <a:r>
-              <a:rPr lang="en-US" dirty="0" smtClean="0"/>
-              <a:t>Some examples include</a:t>
-            </a:r>
-          </a:p>
-          <a:p>
-            <a:pPr lvl="1"/>
-            <a:r>
-              <a:rPr lang="en-US" dirty="0" smtClean="0"/>
-              <a:t>HDFS – </a:t>
-            </a:r>
-            <a:r>
-              <a:rPr lang="en-US" dirty="0" err="1" smtClean="0"/>
-              <a:t>Hadoop’s</a:t>
-            </a:r>
-            <a:r>
-              <a:rPr lang="en-US" dirty="0" smtClean="0"/>
-              <a:t> filesystem</a:t>
-            </a:r>
-          </a:p>
-          <a:p>
-            <a:pPr lvl="1"/>
-            <a:r>
-              <a:rPr lang="en-US" dirty="0" smtClean="0"/>
-              <a:t>GFS – Google’s filesystem</a:t>
-            </a:r>
-          </a:p>
-          <a:p>
-            <a:pPr lvl="1"/>
-            <a:r>
-              <a:rPr lang="en-US" dirty="0" err="1" smtClean="0"/>
-              <a:t>KosmosFS</a:t>
-            </a:r>
-            <a:r>
-              <a:rPr lang="en-US" dirty="0" smtClean="0"/>
-              <a:t> – open source C++ filesystem</a:t>
-            </a:r>
-          </a:p>
-          <a:p>
-            <a:r>
-              <a:rPr lang="en-US" dirty="0" smtClean="0"/>
-              <a:t>Encapsulates Handling Data</a:t>
-            </a:r>
-          </a:p>
-          <a:p>
-            <a:pPr lvl="1"/>
-            <a:r>
-              <a:rPr lang="en-US" dirty="0" smtClean="0"/>
-              <a:t>Handles data displacement</a:t>
-            </a:r>
-          </a:p>
-          <a:p>
-            <a:pPr lvl="1"/>
-            <a:r>
-              <a:rPr lang="en-US" dirty="0" smtClean="0"/>
-              <a:t>Handles data requests</a:t>
             </a:r>
           </a:p>
         </p:txBody>
@@ -7331,7 +7325,7 @@
 </file>
 
 <file path=ppt/slides/slide14.xml><?xml version="1.0" encoding="utf-8"?>
-<p:sld xmlns:a="http://schemas.openxmlformats.org/drawingml/2006/main" xmlns:r="http://schemas.openxmlformats.org/officeDocument/2006/relationships" xmlns:p="http://schemas.openxmlformats.org/presentationml/2006/main">
+<p:sld xmlns:a="http://schemas.openxmlformats.org/drawingml/2006/main" xmlns:r="http://schemas.openxmlformats.org/officeDocument/2006/relationships" xmlns:mc="http://schemas.openxmlformats.org/markup-compatibility/2006" xmlns:mv="urn:schemas-microsoft-com:mac:vml" xmlns:p="http://schemas.openxmlformats.org/presentationml/2006/main" mc:Ignorable="mv" mc:PreserveAttributes="mv:*">
   <p:cSld>
     <p:spTree>
       <p:nvGrpSpPr>
@@ -7364,7 +7358,7 @@
           <a:p>
             <a:r>
               <a:rPr lang="en-US" dirty="0" smtClean="0"/>
-              <a:t>Distributed Filesystem</a:t>
+              <a:t>Distributed Filesystem Model</a:t>
             </a:r>
             <a:endParaRPr lang="en-US" dirty="0"/>
           </a:p>
@@ -7389,60 +7383,66 @@
           <a:p>
             <a:r>
               <a:rPr lang="en-US" dirty="0" smtClean="0"/>
-              <a:t>Pros</a:t>
+              <a:t>Abstract layer between application and local filesystems</a:t>
+            </a:r>
+          </a:p>
+          <a:p>
+            <a:r>
+              <a:rPr lang="en-US" dirty="0" smtClean="0"/>
+              <a:t>Some examples include</a:t>
             </a:r>
           </a:p>
           <a:p>
             <a:pPr lvl="1"/>
             <a:r>
               <a:rPr lang="en-US" dirty="0" smtClean="0"/>
-              <a:t>Replication</a:t>
+              <a:t>HDFS – </a:t>
+            </a:r>
+            <a:r>
+              <a:rPr lang="en-US" dirty="0" err="1" smtClean="0"/>
+              <a:t>Hadoop’s</a:t>
+            </a:r>
+            <a:r>
+              <a:rPr lang="en-US" dirty="0" smtClean="0"/>
+              <a:t> filesystem</a:t>
             </a:r>
           </a:p>
           <a:p>
             <a:pPr lvl="1"/>
             <a:r>
               <a:rPr lang="en-US" dirty="0" smtClean="0"/>
-              <a:t>Fault tolerance</a:t>
+              <a:t>GFS – Google’s filesystem</a:t>
             </a:r>
           </a:p>
           <a:p>
             <a:pPr lvl="1"/>
             <a:r>
-              <a:rPr lang="en-US" dirty="0" smtClean="0"/>
-              <a:t>Capability to handle data dependencies </a:t>
-            </a:r>
-          </a:p>
-          <a:p>
-            <a:r>
-              <a:rPr lang="en-US" dirty="0" smtClean="0"/>
-              <a:t>Cons</a:t>
+              <a:rPr lang="en-US" dirty="0" err="1" smtClean="0"/>
+              <a:t>KosmosFS</a:t>
+            </a:r>
+            <a:r>
+              <a:rPr lang="en-US" dirty="0" smtClean="0"/>
+              <a:t> – open source C++ filesystem</a:t>
+            </a:r>
+          </a:p>
+          <a:p>
+            <a:r>
+              <a:rPr lang="en-US" dirty="0" smtClean="0"/>
+              <a:t>Encapsulates Handling Data</a:t>
             </a:r>
           </a:p>
           <a:p>
             <a:pPr lvl="1"/>
             <a:r>
               <a:rPr lang="en-US" dirty="0" smtClean="0"/>
-              <a:t>Overhead</a:t>
+              <a:t>Handles data displacement</a:t>
             </a:r>
           </a:p>
           <a:p>
             <a:pPr lvl="1"/>
             <a:r>
               <a:rPr lang="en-US" dirty="0" smtClean="0"/>
-              <a:t>Inability to control work placement</a:t>
-            </a:r>
-          </a:p>
-          <a:p>
-            <a:r>
-              <a:rPr lang="en-US" dirty="0" smtClean="0"/>
-              <a:t>Is it worth it to use a distributed filesystem?</a:t>
-            </a:r>
-          </a:p>
-          <a:p>
-            <a:r>
-              <a:rPr lang="en-US" dirty="0" smtClean="0"/>
-              <a:t>What does a distributed filesystem worry about?</a:t>
+              <a:t>Handles data requests</a:t>
             </a:r>
           </a:p>
         </p:txBody>
@@ -7463,7 +7463,139 @@
 </file>
 
 <file path=ppt/slides/slide15.xml><?xml version="1.0" encoding="utf-8"?>
-<p:sld xmlns:a="http://schemas.openxmlformats.org/drawingml/2006/main" xmlns:r="http://schemas.openxmlformats.org/officeDocument/2006/relationships" xmlns:p="http://schemas.openxmlformats.org/presentationml/2006/main">
+<p:sld xmlns:a="http://schemas.openxmlformats.org/drawingml/2006/main" xmlns:r="http://schemas.openxmlformats.org/officeDocument/2006/relationships" xmlns:mc="http://schemas.openxmlformats.org/markup-compatibility/2006" xmlns:mv="urn:schemas-microsoft-com:mac:vml" xmlns:p="http://schemas.openxmlformats.org/presentationml/2006/main" mc:Ignorable="mv" mc:PreserveAttributes="mv:*">
+  <p:cSld>
+    <p:spTree>
+      <p:nvGrpSpPr>
+        <p:cNvPr id="1" name=""/>
+        <p:cNvGrpSpPr/>
+        <p:nvPr/>
+      </p:nvGrpSpPr>
+      <p:grpSpPr>
+        <a:xfrm>
+          <a:off x="0" y="0"/>
+          <a:ext cx="0" cy="0"/>
+          <a:chOff x="0" y="0"/>
+          <a:chExt cx="0" cy="0"/>
+        </a:xfrm>
+      </p:grpSpPr>
+      <p:sp>
+        <p:nvSpPr>
+          <p:cNvPr id="2" name="Title 1"/>
+          <p:cNvSpPr>
+            <a:spLocks noGrp="1"/>
+          </p:cNvSpPr>
+          <p:nvPr>
+            <p:ph type="title"/>
+          </p:nvPr>
+        </p:nvSpPr>
+        <p:spPr/>
+        <p:txBody>
+          <a:bodyPr/>
+          <a:lstStyle/>
+          <a:p>
+            <a:r>
+              <a:rPr lang="en-US" dirty="0" smtClean="0"/>
+              <a:t>Distributed Filesystem</a:t>
+            </a:r>
+            <a:endParaRPr lang="en-US" dirty="0"/>
+          </a:p>
+        </p:txBody>
+      </p:sp>
+      <p:sp>
+        <p:nvSpPr>
+          <p:cNvPr id="3" name="Content Placeholder 2"/>
+          <p:cNvSpPr>
+            <a:spLocks noGrp="1"/>
+          </p:cNvSpPr>
+          <p:nvPr>
+            <p:ph idx="1"/>
+          </p:nvPr>
+        </p:nvSpPr>
+        <p:spPr/>
+        <p:txBody>
+          <a:bodyPr>
+            <a:normAutofit/>
+          </a:bodyPr>
+          <a:lstStyle/>
+          <a:p>
+            <a:r>
+              <a:rPr lang="en-US" dirty="0" smtClean="0"/>
+              <a:t>Pros</a:t>
+            </a:r>
+          </a:p>
+          <a:p>
+            <a:pPr lvl="1"/>
+            <a:r>
+              <a:rPr lang="en-US" dirty="0" smtClean="0"/>
+              <a:t>Replication</a:t>
+            </a:r>
+          </a:p>
+          <a:p>
+            <a:pPr lvl="1"/>
+            <a:r>
+              <a:rPr lang="en-US" dirty="0" smtClean="0"/>
+              <a:t>Fault tolerance</a:t>
+            </a:r>
+          </a:p>
+          <a:p>
+            <a:pPr lvl="1"/>
+            <a:r>
+              <a:rPr lang="en-US" dirty="0" smtClean="0"/>
+              <a:t>Capability to handle data dependencies </a:t>
+            </a:r>
+          </a:p>
+          <a:p>
+            <a:r>
+              <a:rPr lang="en-US" dirty="0" smtClean="0"/>
+              <a:t>Cons</a:t>
+            </a:r>
+          </a:p>
+          <a:p>
+            <a:pPr lvl="1"/>
+            <a:r>
+              <a:rPr lang="en-US" dirty="0" smtClean="0"/>
+              <a:t>Overhead</a:t>
+            </a:r>
+          </a:p>
+          <a:p>
+            <a:pPr lvl="1"/>
+            <a:r>
+              <a:rPr lang="en-US" dirty="0" smtClean="0"/>
+              <a:t>Inability to control work placement</a:t>
+            </a:r>
+          </a:p>
+          <a:p>
+            <a:r>
+              <a:rPr lang="en-US" dirty="0" smtClean="0"/>
+              <a:t>Is it worth it to use a distributed filesystem?</a:t>
+            </a:r>
+          </a:p>
+          <a:p>
+            <a:r>
+              <a:rPr lang="en-US" dirty="0" smtClean="0"/>
+              <a:t>What does a distributed filesystem worry about?</a:t>
+            </a:r>
+          </a:p>
+        </p:txBody>
+      </p:sp>
+    </p:spTree>
+  </p:cSld>
+  <p:clrMapOvr>
+    <a:masterClrMapping/>
+  </p:clrMapOvr>
+  <p:timing>
+    <p:tnLst>
+      <p:par>
+        <p:cTn id="1" dur="indefinite" restart="never" nodeType="tmRoot"/>
+      </p:par>
+    </p:tnLst>
+  </p:timing>
+</p:sld>
+</file>
+
+<file path=ppt/slides/slide16.xml><?xml version="1.0" encoding="utf-8"?>
+<p:sld xmlns:a="http://schemas.openxmlformats.org/drawingml/2006/main" xmlns:r="http://schemas.openxmlformats.org/officeDocument/2006/relationships" xmlns:mc="http://schemas.openxmlformats.org/markup-compatibility/2006" xmlns:mv="urn:schemas-microsoft-com:mac:vml" xmlns:p="http://schemas.openxmlformats.org/presentationml/2006/main" mc:Ignorable="mv" mc:PreserveAttributes="mv:*">
   <p:cSld>
     <p:spTree>
       <p:nvGrpSpPr>
@@ -7580,8 +7712,8 @@
 </p:sld>
 </file>
 
-<file path=ppt/slides/slide16.xml><?xml version="1.0" encoding="utf-8"?>
-<p:sld xmlns:a="http://schemas.openxmlformats.org/drawingml/2006/main" xmlns:r="http://schemas.openxmlformats.org/officeDocument/2006/relationships" xmlns:p="http://schemas.openxmlformats.org/presentationml/2006/main">
+<file path=ppt/slides/slide17.xml><?xml version="1.0" encoding="utf-8"?>
+<p:sld xmlns:a="http://schemas.openxmlformats.org/drawingml/2006/main" xmlns:r="http://schemas.openxmlformats.org/officeDocument/2006/relationships" xmlns:mc="http://schemas.openxmlformats.org/markup-compatibility/2006" xmlns:mv="urn:schemas-microsoft-com:mac:vml" xmlns:p="http://schemas.openxmlformats.org/presentationml/2006/main" mc:Ignorable="mv" mc:PreserveAttributes="mv:*">
   <p:cSld>
     <p:spTree>
       <p:nvGrpSpPr>
@@ -7689,165 +7821,6 @@
             <a:r>
               <a:rPr lang="en-US" dirty="0" smtClean="0"/>
               <a:t>Intelligent</a:t>
-            </a:r>
-          </a:p>
-        </p:txBody>
-      </p:sp>
-    </p:spTree>
-  </p:cSld>
-  <p:clrMapOvr>
-    <a:masterClrMapping/>
-  </p:clrMapOvr>
-  <p:timing>
-    <p:tnLst>
-      <p:par>
-        <p:cTn id="1" dur="indefinite" restart="never" nodeType="tmRoot"/>
-      </p:par>
-    </p:tnLst>
-  </p:timing>
-</p:sld>
-</file>
-
-<file path=ppt/slides/slide17.xml><?xml version="1.0" encoding="utf-8"?>
-<p:sld xmlns:a="http://schemas.openxmlformats.org/drawingml/2006/main" xmlns:r="http://schemas.openxmlformats.org/officeDocument/2006/relationships" xmlns:p="http://schemas.openxmlformats.org/presentationml/2006/main">
-  <p:cSld>
-    <p:spTree>
-      <p:nvGrpSpPr>
-        <p:cNvPr id="1" name=""/>
-        <p:cNvGrpSpPr/>
-        <p:nvPr/>
-      </p:nvGrpSpPr>
-      <p:grpSpPr>
-        <a:xfrm>
-          <a:off x="0" y="0"/>
-          <a:ext cx="0" cy="0"/>
-          <a:chOff x="0" y="0"/>
-          <a:chExt cx="0" cy="0"/>
-        </a:xfrm>
-      </p:grpSpPr>
-      <p:sp>
-        <p:nvSpPr>
-          <p:cNvPr id="2" name="Title 1"/>
-          <p:cNvSpPr>
-            <a:spLocks noGrp="1"/>
-          </p:cNvSpPr>
-          <p:nvPr>
-            <p:ph type="title"/>
-          </p:nvPr>
-        </p:nvSpPr>
-        <p:spPr/>
-        <p:txBody>
-          <a:bodyPr/>
-          <a:lstStyle/>
-          <a:p>
-            <a:r>
-              <a:rPr lang="en-US" dirty="0" smtClean="0"/>
-              <a:t>Conclusions</a:t>
-            </a:r>
-            <a:endParaRPr lang="en-US" dirty="0"/>
-          </a:p>
-        </p:txBody>
-      </p:sp>
-      <p:sp>
-        <p:nvSpPr>
-          <p:cNvPr id="3" name="Content Placeholder 2"/>
-          <p:cNvSpPr>
-            <a:spLocks noGrp="1"/>
-          </p:cNvSpPr>
-          <p:nvPr>
-            <p:ph idx="1"/>
-          </p:nvPr>
-        </p:nvSpPr>
-        <p:spPr/>
-        <p:txBody>
-          <a:bodyPr>
-            <a:normAutofit/>
-          </a:bodyPr>
-          <a:lstStyle/>
-          <a:p>
-            <a:r>
-              <a:rPr lang="en-US" dirty="0" smtClean="0"/>
-              <a:t>Data intensive applications need overhead for efficiency</a:t>
-            </a:r>
-          </a:p>
-          <a:p>
-            <a:pPr lvl="1"/>
-            <a:r>
-              <a:rPr lang="en-US" dirty="0" smtClean="0"/>
-              <a:t>Distributed Filesystem Model</a:t>
-            </a:r>
-          </a:p>
-          <a:p>
-            <a:pPr lvl="1"/>
-            <a:r>
-              <a:rPr lang="en-US" dirty="0" smtClean="0"/>
-              <a:t>Intelligent Distributed Model</a:t>
-            </a:r>
-          </a:p>
-          <a:p>
-            <a:r>
-              <a:rPr lang="en-US" dirty="0" smtClean="0"/>
-              <a:t>We were able to improve performance up to </a:t>
-            </a:r>
-            <a:r>
-              <a:rPr lang="en-US" dirty="0" smtClean="0">
-                <a:solidFill>
-                  <a:srgbClr val="FF0000"/>
-                </a:solidFill>
-              </a:rPr>
-              <a:t>50%</a:t>
-            </a:r>
-            <a:r>
-              <a:rPr lang="en-US" dirty="0" smtClean="0">
-                <a:solidFill>
-                  <a:schemeClr val="tx1"/>
-                </a:solidFill>
-              </a:rPr>
-              <a:t> </a:t>
-            </a:r>
-            <a:r>
-              <a:rPr lang="en-US" dirty="0" smtClean="0"/>
-              <a:t>on some cases</a:t>
-            </a:r>
-          </a:p>
-          <a:p>
-            <a:r>
-              <a:rPr lang="en-US" dirty="0" smtClean="0"/>
-              <a:t>Distributed filesystems should also be able to move work around the data to achieve even better performance</a:t>
-            </a:r>
-          </a:p>
-          <a:p>
-            <a:r>
-              <a:rPr lang="en-US" dirty="0" smtClean="0"/>
-              <a:t>More distribution does not always improve performance</a:t>
-            </a:r>
-          </a:p>
-          <a:p>
-            <a:pPr lvl="1"/>
-            <a:r>
-              <a:rPr lang="en-US" dirty="0" smtClean="0"/>
-              <a:t>Amdahl’s Law</a:t>
-            </a:r>
-          </a:p>
-          <a:p>
-            <a:pPr lvl="2"/>
-            <a:r>
-              <a:rPr lang="en-US" sz="2000" dirty="0" smtClean="0">
-                <a:solidFill>
-                  <a:schemeClr val="tx1">
-                    <a:lumMod val="65000"/>
-                    <a:lumOff val="35000"/>
-                  </a:schemeClr>
-                </a:solidFill>
-              </a:rPr>
-              <a:t>Work takes a specified amount of time</a:t>
-            </a:r>
-          </a:p>
-          <a:p>
-            <a:pPr lvl="1"/>
-            <a:r>
-              <a:rPr lang="en-US" dirty="0" smtClean="0"/>
-              <a:t>Network latency and data/work transfers</a:t>
             </a:r>
           </a:p>
         </p:txBody>
@@ -7868,7 +7841,166 @@
 </file>
 
 <file path=ppt/slides/slide18.xml><?xml version="1.0" encoding="utf-8"?>
-<p:sld xmlns:a="http://schemas.openxmlformats.org/drawingml/2006/main" xmlns:r="http://schemas.openxmlformats.org/officeDocument/2006/relationships" xmlns:p="http://schemas.openxmlformats.org/presentationml/2006/main">
+<p:sld xmlns:a="http://schemas.openxmlformats.org/drawingml/2006/main" xmlns:r="http://schemas.openxmlformats.org/officeDocument/2006/relationships" xmlns:mc="http://schemas.openxmlformats.org/markup-compatibility/2006" xmlns:mv="urn:schemas-microsoft-com:mac:vml" xmlns:p="http://schemas.openxmlformats.org/presentationml/2006/main" mc:Ignorable="mv" mc:PreserveAttributes="mv:*">
+  <p:cSld>
+    <p:spTree>
+      <p:nvGrpSpPr>
+        <p:cNvPr id="1" name=""/>
+        <p:cNvGrpSpPr/>
+        <p:nvPr/>
+      </p:nvGrpSpPr>
+      <p:grpSpPr>
+        <a:xfrm>
+          <a:off x="0" y="0"/>
+          <a:ext cx="0" cy="0"/>
+          <a:chOff x="0" y="0"/>
+          <a:chExt cx="0" cy="0"/>
+        </a:xfrm>
+      </p:grpSpPr>
+      <p:sp>
+        <p:nvSpPr>
+          <p:cNvPr id="2" name="Title 1"/>
+          <p:cNvSpPr>
+            <a:spLocks noGrp="1"/>
+          </p:cNvSpPr>
+          <p:nvPr>
+            <p:ph type="title"/>
+          </p:nvPr>
+        </p:nvSpPr>
+        <p:spPr/>
+        <p:txBody>
+          <a:bodyPr/>
+          <a:lstStyle/>
+          <a:p>
+            <a:r>
+              <a:rPr lang="en-US" dirty="0" smtClean="0"/>
+              <a:t>Conclusions</a:t>
+            </a:r>
+            <a:endParaRPr lang="en-US" dirty="0"/>
+          </a:p>
+        </p:txBody>
+      </p:sp>
+      <p:sp>
+        <p:nvSpPr>
+          <p:cNvPr id="3" name="Content Placeholder 2"/>
+          <p:cNvSpPr>
+            <a:spLocks noGrp="1"/>
+          </p:cNvSpPr>
+          <p:nvPr>
+            <p:ph idx="1"/>
+          </p:nvPr>
+        </p:nvSpPr>
+        <p:spPr/>
+        <p:txBody>
+          <a:bodyPr>
+            <a:normAutofit/>
+          </a:bodyPr>
+          <a:lstStyle/>
+          <a:p>
+            <a:r>
+              <a:rPr lang="en-US" dirty="0" smtClean="0"/>
+              <a:t>Data intensive applications need overhead for efficiency</a:t>
+            </a:r>
+          </a:p>
+          <a:p>
+            <a:pPr lvl="1"/>
+            <a:r>
+              <a:rPr lang="en-US" dirty="0" smtClean="0"/>
+              <a:t>Distributed Filesystem Model</a:t>
+            </a:r>
+          </a:p>
+          <a:p>
+            <a:pPr lvl="1"/>
+            <a:r>
+              <a:rPr lang="en-US" dirty="0" smtClean="0"/>
+              <a:t>Intelligent Distributed Model</a:t>
+            </a:r>
+          </a:p>
+          <a:p>
+            <a:r>
+              <a:rPr lang="en-US" dirty="0" smtClean="0"/>
+              <a:t>We were able to improve performance up to </a:t>
+            </a:r>
+            <a:r>
+              <a:rPr lang="en-US" dirty="0" smtClean="0">
+                <a:solidFill>
+                  <a:srgbClr val="FF0000"/>
+                </a:solidFill>
+              </a:rPr>
+              <a:t>50%</a:t>
+            </a:r>
+            <a:r>
+              <a:rPr lang="en-US" dirty="0" smtClean="0">
+                <a:solidFill>
+                  <a:schemeClr val="tx1"/>
+                </a:solidFill>
+              </a:rPr>
+              <a:t> </a:t>
+            </a:r>
+            <a:r>
+              <a:rPr lang="en-US" dirty="0" smtClean="0"/>
+              <a:t>on some cases</a:t>
+            </a:r>
+          </a:p>
+          <a:p>
+            <a:r>
+              <a:rPr lang="en-US" dirty="0" smtClean="0"/>
+              <a:t>Distributed filesystems should also be able to move work around the data to achieve even better performance</a:t>
+            </a:r>
+          </a:p>
+          <a:p>
+            <a:r>
+              <a:rPr lang="en-US" dirty="0" smtClean="0"/>
+              <a:t>More distribution does not always improve performance</a:t>
+            </a:r>
+          </a:p>
+          <a:p>
+            <a:pPr lvl="1"/>
+            <a:r>
+              <a:rPr lang="en-US" dirty="0" smtClean="0"/>
+              <a:t>Amdahl’s Law</a:t>
+            </a:r>
+          </a:p>
+          <a:p>
+            <a:pPr lvl="2"/>
+            <a:r>
+              <a:rPr lang="en-US" sz="2000" dirty="0" smtClean="0">
+                <a:solidFill>
+                  <a:schemeClr val="tx1">
+                    <a:lumMod val="65000"/>
+                    <a:lumOff val="35000"/>
+                  </a:schemeClr>
+                </a:solidFill>
+              </a:rPr>
+              <a:t>Work takes a specified amount of time</a:t>
+            </a:r>
+          </a:p>
+          <a:p>
+            <a:pPr lvl="1"/>
+            <a:r>
+              <a:rPr lang="en-US" dirty="0" smtClean="0"/>
+              <a:t>Network latency and data/work transfers</a:t>
+            </a:r>
+          </a:p>
+        </p:txBody>
+      </p:sp>
+    </p:spTree>
+  </p:cSld>
+  <p:clrMapOvr>
+    <a:masterClrMapping/>
+  </p:clrMapOvr>
+  <p:timing>
+    <p:tnLst>
+      <p:par>
+        <p:cTn id="1" dur="indefinite" restart="never" nodeType="tmRoot"/>
+      </p:par>
+    </p:tnLst>
+  </p:timing>
+</p:sld>
+</file>
+
+<file path=ppt/slides/slide19.xml><?xml version="1.0" encoding="utf-8"?>
+<p:sld xmlns:a="http://schemas.openxmlformats.org/drawingml/2006/main" xmlns:r="http://schemas.openxmlformats.org/officeDocument/2006/relationships" xmlns:mc="http://schemas.openxmlformats.org/markup-compatibility/2006" xmlns:mv="urn:schemas-microsoft-com:mac:vml" xmlns:p="http://schemas.openxmlformats.org/presentationml/2006/main" mc:Ignorable="mv" mc:PreserveAttributes="mv:*">
   <p:cSld>
     <p:spTree>
       <p:nvGrpSpPr>
@@ -8029,7 +8161,7 @@
 </file>
 
 <file path=ppt/slides/slide2.xml><?xml version="1.0" encoding="utf-8"?>
-<p:sld xmlns:a="http://schemas.openxmlformats.org/drawingml/2006/main" xmlns:r="http://schemas.openxmlformats.org/officeDocument/2006/relationships" xmlns:p="http://schemas.openxmlformats.org/presentationml/2006/main">
+<p:sld xmlns:a="http://schemas.openxmlformats.org/drawingml/2006/main" xmlns:r="http://schemas.openxmlformats.org/officeDocument/2006/relationships" xmlns:mc="http://schemas.openxmlformats.org/markup-compatibility/2006" xmlns:mv="urn:schemas-microsoft-com:mac:vml" xmlns:p="http://schemas.openxmlformats.org/presentationml/2006/main" mc:Ignorable="mv" mc:PreserveAttributes="mv:*">
   <p:cSld>
     <p:spTree>
       <p:nvGrpSpPr>
@@ -8047,7 +8179,7 @@
       </p:grpSpPr>
       <p:sp>
         <p:nvSpPr>
-          <p:cNvPr id="2" name="Title 1"/>
+          <p:cNvPr id="80898" name="Title 2"/>
           <p:cNvSpPr>
             <a:spLocks noGrp="1"/>
           </p:cNvSpPr>
@@ -8055,81 +8187,53 @@
             <p:ph type="title"/>
           </p:nvPr>
         </p:nvSpPr>
-        <p:spPr/>
-        <p:txBody>
-          <a:bodyPr>
-            <a:normAutofit/>
-          </a:bodyPr>
-          <a:lstStyle/>
-          <a:p>
-            <a:r>
-              <a:rPr lang="en-US" dirty="0" smtClean="0"/>
-              <a:t>Data-Intensive Applications</a:t>
-            </a:r>
-            <a:endParaRPr lang="en-US" dirty="0"/>
-          </a:p>
-        </p:txBody>
-      </p:sp>
-      <p:sp>
-        <p:nvSpPr>
-          <p:cNvPr id="3" name="Content Placeholder 2"/>
-          <p:cNvSpPr>
-            <a:spLocks noGrp="1"/>
-          </p:cNvSpPr>
-          <p:nvPr>
-            <p:ph idx="1"/>
-          </p:nvPr>
-        </p:nvSpPr>
-        <p:spPr/>
+        <p:spPr>
+          <a:xfrm>
+            <a:off x="1256242" y="0"/>
+            <a:ext cx="7735357" cy="1219200"/>
+          </a:xfrm>
+        </p:spPr>
         <p:txBody>
           <a:bodyPr/>
           <a:lstStyle/>
           <a:p>
             <a:r>
-              <a:rPr lang="en-US" dirty="0" smtClean="0"/>
-              <a:t>There are Grids, Clouds and Cloud-like infrastructure supporting the solution of large problems</a:t>
-            </a:r>
-          </a:p>
-          <a:p>
-            <a:pPr lvl="1"/>
-            <a:r>
-              <a:rPr lang="en-US" dirty="0" smtClean="0"/>
-              <a:t>Google processes 20 </a:t>
-            </a:r>
-            <a:r>
-              <a:rPr lang="en-US" dirty="0" err="1" smtClean="0"/>
-              <a:t>petabytes</a:t>
-            </a:r>
-            <a:r>
-              <a:rPr lang="en-US" dirty="0" smtClean="0"/>
-              <a:t> of data per day</a:t>
-            </a:r>
-          </a:p>
-          <a:p>
-            <a:r>
-              <a:rPr lang="en-US" dirty="0" smtClean="0"/>
-              <a:t>Unique performance issues arise as data sets become large</a:t>
-            </a:r>
-          </a:p>
-          <a:p>
-            <a:r>
-              <a:rPr lang="en-US" dirty="0" smtClean="0"/>
-              <a:t>Developers should take precautions when placing, scheduling and managing such large volumes of data</a:t>
-            </a:r>
-          </a:p>
-          <a:p>
-            <a:r>
-              <a:rPr lang="en-US" dirty="0" smtClean="0"/>
-              <a:t>Scalable placement and management techniques are required (e.g., distributed file-systems)</a:t>
-            </a:r>
-          </a:p>
-        </p:txBody>
-      </p:sp>
+              <a:rPr lang="en-US" smtClean="0"/>
+              <a:t>SAGA-based frameworks: Logical ordering</a:t>
+            </a:r>
+          </a:p>
+        </p:txBody>
+      </p:sp>
+      <p:pic>
+        <p:nvPicPr>
+          <p:cNvPr id="80899" name="Content Placeholder 3" descr="framework-1.pdf"/>
+          <p:cNvPicPr>
+            <a:picLocks noGrp="1" noChangeAspect="1"/>
+          </p:cNvPicPr>
+          <p:nvPr>
+            <p:ph idx="4294967295"/>
+          </p:nvPr>
+        </p:nvPicPr>
+        <p:blipFill>
+          <a:blip r:embed="rId2"/>
+          <a:srcRect l="-7680" r="-7680"/>
+          <a:stretch>
+            <a:fillRect/>
+          </a:stretch>
+        </p:blipFill>
+        <p:spPr>
+          <a:xfrm>
+            <a:off x="304800" y="1338263"/>
+            <a:ext cx="7988300" cy="5443537"/>
+          </a:xfrm>
+        </p:spPr>
+      </p:pic>
     </p:spTree>
   </p:cSld>
   <p:clrMapOvr>
     <a:masterClrMapping/>
   </p:clrMapOvr>
+  <p:transition/>
   <p:timing>
     <p:tnLst>
       <p:par>
@@ -8141,7 +8245,7 @@
 </file>
 
 <file path=ppt/slides/slide3.xml><?xml version="1.0" encoding="utf-8"?>
-<p:sld xmlns:a="http://schemas.openxmlformats.org/drawingml/2006/main" xmlns:r="http://schemas.openxmlformats.org/officeDocument/2006/relationships" xmlns:p="http://schemas.openxmlformats.org/presentationml/2006/main">
+<p:sld xmlns:a="http://schemas.openxmlformats.org/drawingml/2006/main" xmlns:r="http://schemas.openxmlformats.org/officeDocument/2006/relationships" xmlns:mc="http://schemas.openxmlformats.org/markup-compatibility/2006" xmlns:mv="urn:schemas-microsoft-com:mac:vml" xmlns:p="http://schemas.openxmlformats.org/presentationml/2006/main" mc:Ignorable="mv" mc:PreserveAttributes="mv:*">
   <p:cSld>
     <p:spTree>
       <p:nvGrpSpPr>
@@ -8170,92 +8274,69 @@
         <p:spPr/>
         <p:txBody>
           <a:bodyPr>
-            <a:normAutofit fontScale="90000"/>
-          </a:bodyPr>
-          <a:lstStyle/>
-          <a:p>
-            <a:r>
-              <a:rPr lang="en-US" dirty="0" smtClean="0"/>
-              <a:t>SAGA – Simple API for Grid Applications</a:t>
-            </a:r>
-            <a:endParaRPr lang="en-US" dirty="0"/>
-          </a:p>
-        </p:txBody>
-      </p:sp>
-      <p:sp>
-        <p:nvSpPr>
-          <p:cNvPr id="3" name="Content Placeholder 2"/>
-          <p:cNvSpPr>
-            <a:spLocks noGrp="1"/>
-          </p:cNvSpPr>
-          <p:nvPr>
-            <p:ph idx="1"/>
-          </p:nvPr>
-        </p:nvSpPr>
-        <p:spPr/>
-        <p:txBody>
-          <a:bodyPr>
             <a:normAutofit/>
           </a:bodyPr>
           <a:lstStyle/>
           <a:p>
             <a:r>
               <a:rPr lang="en-US" dirty="0" smtClean="0"/>
-              <a:t>The SAGA Philosophy</a:t>
+              <a:t>Data-Intensive Applications</a:t>
+            </a:r>
+            <a:endParaRPr lang="en-US" dirty="0"/>
+          </a:p>
+        </p:txBody>
+      </p:sp>
+      <p:sp>
+        <p:nvSpPr>
+          <p:cNvPr id="3" name="Content Placeholder 2"/>
+          <p:cNvSpPr>
+            <a:spLocks noGrp="1"/>
+          </p:cNvSpPr>
+          <p:nvPr>
+            <p:ph idx="1"/>
+          </p:nvPr>
+        </p:nvSpPr>
+        <p:spPr/>
+        <p:txBody>
+          <a:bodyPr/>
+          <a:lstStyle/>
+          <a:p>
+            <a:r>
+              <a:rPr lang="en-US" dirty="0" smtClean="0"/>
+              <a:t>There are Grids, Clouds and Cloud-like infrastructure supporting the solution of large problems</a:t>
             </a:r>
           </a:p>
           <a:p>
             <a:pPr lvl="1"/>
             <a:r>
               <a:rPr lang="en-US" dirty="0" smtClean="0"/>
-              <a:t>A Fresh Perspective on Distributed Applications</a:t>
-            </a:r>
-          </a:p>
-          <a:p>
-            <a:r>
-              <a:rPr lang="en-US" dirty="0" smtClean="0"/>
-              <a:t>SAGA in a Nutshell</a:t>
-            </a:r>
-          </a:p>
-          <a:p>
-            <a:pPr lvl="1"/>
-            <a:r>
-              <a:rPr lang="en-US" dirty="0" smtClean="0"/>
-              <a:t>SAGA Landscape</a:t>
-            </a:r>
-          </a:p>
-          <a:p>
-            <a:pPr lvl="1"/>
-            <a:r>
-              <a:rPr lang="en-US" dirty="0" smtClean="0"/>
-              <a:t>Individual APIs</a:t>
-            </a:r>
-          </a:p>
-          <a:p>
-            <a:pPr lvl="1"/>
-            <a:r>
-              <a:rPr lang="en-US" dirty="0" smtClean="0"/>
-              <a:t>OGF standard</a:t>
-            </a:r>
-          </a:p>
-          <a:p>
-            <a:r>
-              <a:rPr lang="en-US" dirty="0" smtClean="0"/>
-              <a:t>SAGA in action</a:t>
-            </a:r>
-          </a:p>
-          <a:p>
-            <a:pPr lvl="1"/>
-            <a:r>
-              <a:rPr lang="en-US" dirty="0" smtClean="0"/>
-              <a:t>Applications</a:t>
-            </a:r>
-          </a:p>
-          <a:p>
-            <a:pPr lvl="1"/>
-            <a:r>
-              <a:rPr lang="en-US" dirty="0" smtClean="0"/>
-              <a:t>Tools, Frameworks, Gateways, Access Layers.</a:t>
+              <a:t>Google processes 20 </a:t>
+            </a:r>
+            <a:r>
+              <a:rPr lang="en-US" dirty="0" err="1" smtClean="0"/>
+              <a:t>petabytes</a:t>
+            </a:r>
+            <a:r>
+              <a:rPr lang="en-US" dirty="0" smtClean="0"/>
+              <a:t> of data per day</a:t>
+            </a:r>
+          </a:p>
+          <a:p>
+            <a:r>
+              <a:rPr lang="en-US" dirty="0" smtClean="0"/>
+              <a:t>Unique performance issues arise as data sets become large</a:t>
+            </a:r>
+          </a:p>
+          <a:p>
+            <a:r>
+              <a:rPr lang="en-US" dirty="0" smtClean="0"/>
+              <a:t>Developers should take precautions when placing, scheduling and managing such large volumes of data</a:t>
+            </a:r>
+          </a:p>
+          <a:p>
+            <a:r>
+              <a:rPr lang="en-US" dirty="0" smtClean="0"/>
+              <a:t>Scalable placement and management techniques are required (e.g., distributed file-systems)</a:t>
             </a:r>
           </a:p>
         </p:txBody>
@@ -8276,7 +8357,7 @@
 </file>
 
 <file path=ppt/slides/slide4.xml><?xml version="1.0" encoding="utf-8"?>
-<p:sld xmlns:a="http://schemas.openxmlformats.org/drawingml/2006/main" xmlns:r="http://schemas.openxmlformats.org/officeDocument/2006/relationships" xmlns:p="http://schemas.openxmlformats.org/presentationml/2006/main">
+<p:sld xmlns:a="http://schemas.openxmlformats.org/drawingml/2006/main" xmlns:r="http://schemas.openxmlformats.org/officeDocument/2006/relationships" xmlns:mc="http://schemas.openxmlformats.org/markup-compatibility/2006" xmlns:mv="urn:schemas-microsoft-com:mac:vml" xmlns:p="http://schemas.openxmlformats.org/presentationml/2006/main" mc:Ignorable="mv" mc:PreserveAttributes="mv:*">
   <p:cSld>
     <p:spTree>
       <p:nvGrpSpPr>
@@ -8304,12 +8385,14 @@
         </p:nvSpPr>
         <p:spPr/>
         <p:txBody>
-          <a:bodyPr/>
-          <a:lstStyle/>
-          <a:p>
-            <a:r>
-              <a:rPr lang="en-US" dirty="0" smtClean="0"/>
-              <a:t>All-Pair Abstraction</a:t>
+          <a:bodyPr>
+            <a:normAutofit fontScale="90000"/>
+          </a:bodyPr>
+          <a:lstStyle/>
+          <a:p>
+            <a:r>
+              <a:rPr lang="en-US" dirty="0" smtClean="0"/>
+              <a:t>SAGA – Simple API for Grid Applications</a:t>
             </a:r>
             <a:endParaRPr lang="en-US" dirty="0"/>
           </a:p>
@@ -8334,47 +8417,61 @@
           <a:p>
             <a:r>
               <a:rPr lang="en-US" dirty="0" smtClean="0"/>
-              <a:t>We want to understand</a:t>
+              <a:t>The SAGA Philosophy</a:t>
             </a:r>
           </a:p>
           <a:p>
             <a:pPr lvl="1"/>
             <a:r>
               <a:rPr lang="en-US" dirty="0" smtClean="0"/>
-              <a:t>Performance tradeoffs of a DFS compared to “regular” distribution and placement techniques</a:t>
+              <a:t>A Fresh Perspective on Distributed Applications</a:t>
+            </a:r>
+          </a:p>
+          <a:p>
+            <a:r>
+              <a:rPr lang="en-US" dirty="0" smtClean="0"/>
+              <a:t>SAGA in a Nutshell</a:t>
             </a:r>
           </a:p>
           <a:p>
             <a:pPr lvl="1"/>
             <a:r>
               <a:rPr lang="en-US" dirty="0" smtClean="0"/>
-              <a:t>How sensitive the performance is in the context of a real data-intensive distributed application.</a:t>
-            </a:r>
-          </a:p>
-          <a:p>
-            <a:r>
-              <a:rPr lang="en-US" dirty="0" smtClean="0"/>
-              <a:t>We use a grid-enabled All-Pair abstraction</a:t>
+              <a:t>SAGA Landscape</a:t>
             </a:r>
           </a:p>
           <a:p>
             <a:pPr lvl="1"/>
             <a:r>
               <a:rPr lang="en-US" dirty="0" smtClean="0"/>
-              <a:t>Applies an operation on the input data-set such that every possible pair in the set is input to the operation.</a:t>
-            </a:r>
-          </a:p>
-          <a:p>
-            <a:r>
-              <a:rPr lang="en-US" dirty="0" smtClean="0"/>
-              <a:t>Our application compares ‘genome’ files that consist of random combinations of ACGT</a:t>
+              <a:t>Individual APIs</a:t>
             </a:r>
           </a:p>
           <a:p>
             <a:pPr lvl="1"/>
             <a:r>
               <a:rPr lang="en-US" dirty="0" smtClean="0"/>
-              <a:t>Use a weight measure to measure to similarity of the strings </a:t>
+              <a:t>OGF standard</a:t>
+            </a:r>
+          </a:p>
+          <a:p>
+            <a:r>
+              <a:rPr lang="en-US" dirty="0" smtClean="0"/>
+              <a:t>SAGA in action</a:t>
+            </a:r>
+          </a:p>
+          <a:p>
+            <a:pPr lvl="1"/>
+            <a:r>
+              <a:rPr lang="en-US" dirty="0" smtClean="0"/>
+              <a:t>Applications</a:t>
+            </a:r>
+          </a:p>
+          <a:p>
+            <a:pPr lvl="1"/>
+            <a:r>
+              <a:rPr lang="en-US" dirty="0" smtClean="0"/>
+              <a:t>Tools, Frameworks, Gateways, Access Layers.</a:t>
             </a:r>
           </a:p>
         </p:txBody>
@@ -8395,7 +8492,7 @@
 </file>
 
 <file path=ppt/slides/slide5.xml><?xml version="1.0" encoding="utf-8"?>
-<p:sld xmlns:a="http://schemas.openxmlformats.org/drawingml/2006/main" xmlns:r="http://schemas.openxmlformats.org/officeDocument/2006/relationships" xmlns:p="http://schemas.openxmlformats.org/presentationml/2006/main">
+<p:sld xmlns:a="http://schemas.openxmlformats.org/drawingml/2006/main" xmlns:r="http://schemas.openxmlformats.org/officeDocument/2006/relationships" xmlns:mc="http://schemas.openxmlformats.org/markup-compatibility/2006" xmlns:mv="urn:schemas-microsoft-com:mac:vml" xmlns:p="http://schemas.openxmlformats.org/presentationml/2006/main" mc:Ignorable="mv" mc:PreserveAttributes="mv:*">
   <p:cSld>
     <p:spTree>
       <p:nvGrpSpPr>
@@ -8423,6 +8520,29 @@
         </p:nvSpPr>
         <p:spPr/>
         <p:txBody>
+          <a:bodyPr/>
+          <a:lstStyle/>
+          <a:p>
+            <a:r>
+              <a:rPr lang="en-US" dirty="0" smtClean="0"/>
+              <a:t>All-Pair Abstraction</a:t>
+            </a:r>
+            <a:endParaRPr lang="en-US" dirty="0"/>
+          </a:p>
+        </p:txBody>
+      </p:sp>
+      <p:sp>
+        <p:nvSpPr>
+          <p:cNvPr id="3" name="Content Placeholder 2"/>
+          <p:cNvSpPr>
+            <a:spLocks noGrp="1"/>
+          </p:cNvSpPr>
+          <p:nvPr>
+            <p:ph idx="1"/>
+          </p:nvPr>
+        </p:nvSpPr>
+        <p:spPr/>
+        <p:txBody>
           <a:bodyPr>
             <a:normAutofit/>
           </a:bodyPr>
@@ -8430,83 +8550,48 @@
           <a:p>
             <a:r>
               <a:rPr lang="en-US" dirty="0" smtClean="0"/>
-              <a:t>All-Pairs + Large Data</a:t>
-            </a:r>
-            <a:endParaRPr lang="en-US" dirty="0"/>
-          </a:p>
-        </p:txBody>
-      </p:sp>
-      <p:sp>
-        <p:nvSpPr>
-          <p:cNvPr id="3" name="Content Placeholder 2"/>
-          <p:cNvSpPr>
-            <a:spLocks noGrp="1"/>
-          </p:cNvSpPr>
-          <p:nvPr>
-            <p:ph idx="1"/>
-          </p:nvPr>
-        </p:nvSpPr>
-        <p:spPr/>
-        <p:txBody>
-          <a:bodyPr>
-            <a:normAutofit/>
-          </a:bodyPr>
-          <a:lstStyle/>
-          <a:p>
-            <a:r>
-              <a:rPr lang="en-US" dirty="0" smtClean="0"/>
-              <a:t>The application spawns distributed jobs to run sets of these pairs. </a:t>
-            </a:r>
-          </a:p>
-          <a:p>
-            <a:r>
-              <a:rPr lang="en-US" dirty="0" smtClean="0"/>
-              <a:t>The problem becomes:</a:t>
+              <a:t>We want to understand</a:t>
             </a:r>
           </a:p>
           <a:p>
             <a:pPr lvl="1"/>
             <a:r>
               <a:rPr lang="en-US" dirty="0" smtClean="0"/>
-              <a:t>Determining which pairs to put into a set, and with which distributed resource to run that set. </a:t>
+              <a:t>Performance tradeoffs of a DFS compared to “regular” distribution and placement techniques</a:t>
             </a:r>
           </a:p>
           <a:p>
             <a:pPr lvl="1"/>
             <a:r>
               <a:rPr lang="en-US" dirty="0" smtClean="0"/>
-              <a:t>Data management vs. computation</a:t>
-            </a:r>
-          </a:p>
-          <a:p>
-            <a:pPr lvl="2"/>
-            <a:r>
-              <a:rPr lang="en-US" dirty="0" smtClean="0"/>
-              <a:t>Data transfer times become important</a:t>
-            </a:r>
-          </a:p>
-          <a:p>
-            <a:r>
-              <a:rPr lang="en-US" dirty="0" smtClean="0"/>
-              <a:t>We used </a:t>
-            </a:r>
-            <a:r>
-              <a:rPr lang="en-US" dirty="0" err="1" smtClean="0"/>
-              <a:t>CloudStore</a:t>
-            </a:r>
-            <a:r>
-              <a:rPr lang="en-US" dirty="0" smtClean="0"/>
-              <a:t> (formerly </a:t>
-            </a:r>
-            <a:r>
-              <a:rPr lang="en-US" dirty="0" err="1" smtClean="0"/>
-              <a:t>KosmosFS</a:t>
-            </a:r>
-            <a:r>
-              <a:rPr lang="en-US" dirty="0" smtClean="0"/>
-              <a:t>), an open-source high performance DFS based on Google's distributed filesystem GFS.</a:t>
-            </a:r>
-            <a:endParaRPr lang="en-US" dirty="0"/>
+              <a:t>How sensitive the performance is in the context of a real data-intensive distributed application.</a:t>
+            </a:r>
+          </a:p>
+          <a:p>
+            <a:r>
+              <a:rPr lang="en-US" dirty="0" smtClean="0"/>
+              <a:t>We use a grid-enabled All-Pair abstraction</a:t>
+            </a:r>
+          </a:p>
+          <a:p>
+            <a:pPr lvl="1"/>
+            <a:r>
+              <a:rPr lang="en-US" dirty="0" smtClean="0"/>
+              <a:t>Applies an operation on the input data-set such that every possible pair in the set is input to the operation.</a:t>
+            </a:r>
+          </a:p>
+          <a:p>
+            <a:r>
+              <a:rPr lang="en-US" dirty="0" smtClean="0"/>
+              <a:t>Our application compares ‘genome’ files that consist of random combinations of ACGT</a:t>
+            </a:r>
+          </a:p>
+          <a:p>
+            <a:pPr lvl="1"/>
+            <a:r>
+              <a:rPr lang="en-US" dirty="0" smtClean="0"/>
+              <a:t>Use a weight measure to measure to similarity of the strings </a:t>
+            </a:r>
           </a:p>
         </p:txBody>
       </p:sp>
@@ -8526,7 +8611,7 @@
 </file>
 
 <file path=ppt/slides/slide6.xml><?xml version="1.0" encoding="utf-8"?>
-<p:sld xmlns:a="http://schemas.openxmlformats.org/drawingml/2006/main" xmlns:r="http://schemas.openxmlformats.org/officeDocument/2006/relationships" xmlns:p="http://schemas.openxmlformats.org/presentationml/2006/main">
+<p:sld xmlns:a="http://schemas.openxmlformats.org/drawingml/2006/main" xmlns:r="http://schemas.openxmlformats.org/officeDocument/2006/relationships" xmlns:mc="http://schemas.openxmlformats.org/markup-compatibility/2006" xmlns:mv="urn:schemas-microsoft-com:mac:vml" xmlns:p="http://schemas.openxmlformats.org/presentationml/2006/main" mc:Ignorable="mv" mc:PreserveAttributes="mv:*">
   <p:cSld>
     <p:spTree>
       <p:nvGrpSpPr>
@@ -8554,29 +8639,6 @@
         </p:nvSpPr>
         <p:spPr/>
         <p:txBody>
-          <a:bodyPr/>
-          <a:lstStyle/>
-          <a:p>
-            <a:r>
-              <a:rPr lang="en-US" dirty="0" smtClean="0"/>
-              <a:t>Central Model</a:t>
-            </a:r>
-            <a:endParaRPr lang="en-US" dirty="0"/>
-          </a:p>
-        </p:txBody>
-      </p:sp>
-      <p:sp>
-        <p:nvSpPr>
-          <p:cNvPr id="3" name="Content Placeholder 2"/>
-          <p:cNvSpPr>
-            <a:spLocks noGrp="1"/>
-          </p:cNvSpPr>
-          <p:nvPr>
-            <p:ph idx="1"/>
-          </p:nvPr>
-        </p:nvSpPr>
-        <p:spPr/>
-        <p:txBody>
           <a:bodyPr>
             <a:normAutofit/>
           </a:bodyPr>
@@ -8584,39 +8646,83 @@
           <a:p>
             <a:r>
               <a:rPr lang="en-US" dirty="0" smtClean="0"/>
-              <a:t>Model traditionally used</a:t>
-            </a:r>
-          </a:p>
-          <a:p>
-            <a:r>
-              <a:rPr lang="en-US" dirty="0" smtClean="0"/>
-              <a:t>Data at central site</a:t>
-            </a:r>
-          </a:p>
-          <a:p>
-            <a:r>
-              <a:rPr lang="en-US" dirty="0" smtClean="0"/>
-              <a:t>Data Access	</a:t>
+              <a:t>All-Pairs + Large Data</a:t>
+            </a:r>
+            <a:endParaRPr lang="en-US" dirty="0"/>
+          </a:p>
+        </p:txBody>
+      </p:sp>
+      <p:sp>
+        <p:nvSpPr>
+          <p:cNvPr id="3" name="Content Placeholder 2"/>
+          <p:cNvSpPr>
+            <a:spLocks noGrp="1"/>
+          </p:cNvSpPr>
+          <p:nvPr>
+            <p:ph idx="1"/>
+          </p:nvPr>
+        </p:nvSpPr>
+        <p:spPr/>
+        <p:txBody>
+          <a:bodyPr>
+            <a:normAutofit/>
+          </a:bodyPr>
+          <a:lstStyle/>
+          <a:p>
+            <a:r>
+              <a:rPr lang="en-US" dirty="0" smtClean="0"/>
+              <a:t>The application spawns distributed jobs to run sets of these pairs. </a:t>
+            </a:r>
+          </a:p>
+          <a:p>
+            <a:r>
+              <a:rPr lang="en-US" dirty="0" smtClean="0"/>
+              <a:t>The problem becomes:</a:t>
             </a:r>
           </a:p>
           <a:p>
             <a:pPr lvl="1"/>
             <a:r>
               <a:rPr lang="en-US" dirty="0" smtClean="0"/>
-              <a:t>Resource requests data from central site</a:t>
-            </a:r>
-          </a:p>
-          <a:p>
-            <a:r>
-              <a:rPr lang="en-US" dirty="0" smtClean="0"/>
-              <a:t>Compute assumed large, data I/O assumed small</a:t>
-            </a:r>
-          </a:p>
-          <a:p>
-            <a:r>
-              <a:rPr lang="en-US" dirty="0" smtClean="0"/>
-              <a:t>Bottleneck forms when data becomes larger</a:t>
-            </a:r>
+              <a:t>Determining which pairs to put into a set, and with which distributed resource to run that set. </a:t>
+            </a:r>
+          </a:p>
+          <a:p>
+            <a:pPr lvl="1"/>
+            <a:r>
+              <a:rPr lang="en-US" dirty="0" smtClean="0"/>
+              <a:t>Data management vs. computation</a:t>
+            </a:r>
+          </a:p>
+          <a:p>
+            <a:pPr lvl="2"/>
+            <a:r>
+              <a:rPr lang="en-US" dirty="0" smtClean="0"/>
+              <a:t>Data transfer times become important</a:t>
+            </a:r>
+          </a:p>
+          <a:p>
+            <a:r>
+              <a:rPr lang="en-US" dirty="0" smtClean="0"/>
+              <a:t>We used </a:t>
+            </a:r>
+            <a:r>
+              <a:rPr lang="en-US" dirty="0" err="1" smtClean="0"/>
+              <a:t>CloudStore</a:t>
+            </a:r>
+            <a:r>
+              <a:rPr lang="en-US" dirty="0" smtClean="0"/>
+              <a:t> (formerly </a:t>
+            </a:r>
+            <a:r>
+              <a:rPr lang="en-US" dirty="0" err="1" smtClean="0"/>
+              <a:t>KosmosFS</a:t>
+            </a:r>
+            <a:r>
+              <a:rPr lang="en-US" dirty="0" smtClean="0"/>
+              <a:t>), an open-source high performance DFS based on Google's distributed filesystem GFS.</a:t>
+            </a:r>
+            <a:endParaRPr lang="en-US" dirty="0"/>
           </a:p>
         </p:txBody>
       </p:sp>
@@ -8636,7 +8742,7 @@
 </file>
 
 <file path=ppt/slides/slide7.xml><?xml version="1.0" encoding="utf-8"?>
-<p:sld xmlns:a="http://schemas.openxmlformats.org/drawingml/2006/main" xmlns:r="http://schemas.openxmlformats.org/officeDocument/2006/relationships" xmlns:p="http://schemas.openxmlformats.org/presentationml/2006/main">
+<p:sld xmlns:a="http://schemas.openxmlformats.org/drawingml/2006/main" xmlns:r="http://schemas.openxmlformats.org/officeDocument/2006/relationships" xmlns:mc="http://schemas.openxmlformats.org/markup-compatibility/2006" xmlns:mv="urn:schemas-microsoft-com:mac:vml" xmlns:p="http://schemas.openxmlformats.org/presentationml/2006/main" mc:Ignorable="mv" mc:PreserveAttributes="mv:*">
   <p:cSld>
     <p:spTree>
       <p:nvGrpSpPr>
@@ -8669,7 +8775,7 @@
           <a:p>
             <a:r>
               <a:rPr lang="en-US" dirty="0" smtClean="0"/>
-              <a:t>Distributed Model</a:t>
+              <a:t>Central Model</a:t>
             </a:r>
             <a:endParaRPr lang="en-US" dirty="0"/>
           </a:p>
@@ -8694,53 +8800,38 @@
           <a:p>
             <a:r>
               <a:rPr lang="en-US" dirty="0" smtClean="0"/>
-              <a:t>Data is spread over many machines</a:t>
-            </a:r>
-          </a:p>
-          <a:p>
-            <a:r>
-              <a:rPr lang="en-US" dirty="0" smtClean="0"/>
-              <a:t>Data Access</a:t>
+              <a:t>Model traditionally used</a:t>
+            </a:r>
+          </a:p>
+          <a:p>
+            <a:r>
+              <a:rPr lang="en-US" dirty="0" smtClean="0"/>
+              <a:t>Data at central site</a:t>
+            </a:r>
+          </a:p>
+          <a:p>
+            <a:r>
+              <a:rPr lang="en-US" dirty="0" smtClean="0"/>
+              <a:t>Data Access	</a:t>
             </a:r>
           </a:p>
           <a:p>
             <a:pPr lvl="1"/>
             <a:r>
               <a:rPr lang="en-US" dirty="0" smtClean="0"/>
-              <a:t>Resources share data with other resources</a:t>
-            </a:r>
-          </a:p>
-          <a:p>
-            <a:r>
-              <a:rPr lang="en-US" dirty="0" smtClean="0"/>
-              <a:t>Conventional Model</a:t>
-            </a:r>
-          </a:p>
-          <a:p>
-            <a:pPr lvl="1"/>
-            <a:r>
-              <a:rPr lang="en-US" dirty="0" smtClean="0"/>
-              <a:t>No planning when placing data</a:t>
-            </a:r>
-          </a:p>
-          <a:p>
-            <a:r>
-              <a:rPr lang="en-US" dirty="0" smtClean="0"/>
-              <a:t>Intelligent Model</a:t>
-            </a:r>
-          </a:p>
-          <a:p>
-            <a:pPr lvl="1"/>
-            <a:r>
-              <a:rPr lang="en-US" dirty="0" smtClean="0"/>
-              <a:t>Data is dynamic</a:t>
-            </a:r>
-          </a:p>
-          <a:p>
-            <a:pPr lvl="1"/>
-            <a:r>
-              <a:rPr lang="en-US" dirty="0" smtClean="0"/>
-              <a:t>Task is mapped to a resource based on tasks’ data dependencies</a:t>
+              <a:t>Resource requests data from central site</a:t>
+            </a:r>
+          </a:p>
+          <a:p>
+            <a:r>
+              <a:rPr lang="en-US" dirty="0" smtClean="0"/>
+              <a:t>Compute assumed large, data I/O assumed small</a:t>
+            </a:r>
+          </a:p>
+          <a:p>
+            <a:r>
+              <a:rPr lang="en-US" dirty="0" smtClean="0"/>
+              <a:t>Bottleneck forms when data becomes larger</a:t>
             </a:r>
           </a:p>
         </p:txBody>
@@ -8761,7 +8852,7 @@
 </file>
 
 <file path=ppt/slides/slide8.xml><?xml version="1.0" encoding="utf-8"?>
-<p:sld xmlns:a="http://schemas.openxmlformats.org/drawingml/2006/main" xmlns:r="http://schemas.openxmlformats.org/officeDocument/2006/relationships" xmlns:p="http://schemas.openxmlformats.org/presentationml/2006/main">
+<p:sld xmlns:a="http://schemas.openxmlformats.org/drawingml/2006/main" xmlns:r="http://schemas.openxmlformats.org/officeDocument/2006/relationships" xmlns:mc="http://schemas.openxmlformats.org/markup-compatibility/2006" xmlns:mv="urn:schemas-microsoft-com:mac:vml" xmlns:p="http://schemas.openxmlformats.org/presentationml/2006/main" mc:Ignorable="mv" mc:PreserveAttributes="mv:*">
   <p:cSld>
     <p:spTree>
       <p:nvGrpSpPr>
@@ -8794,7 +8885,7 @@
           <a:p>
             <a:r>
               <a:rPr lang="en-US" dirty="0" smtClean="0"/>
-              <a:t>Central vs. Distributed</a:t>
+              <a:t>Distributed Model</a:t>
             </a:r>
             <a:endParaRPr lang="en-US" dirty="0"/>
           </a:p>
@@ -8819,62 +8910,53 @@
           <a:p>
             <a:r>
               <a:rPr lang="en-US" dirty="0" smtClean="0"/>
-              <a:t>Central</a:t>
+              <a:t>Data is spread over many machines</a:t>
+            </a:r>
+          </a:p>
+          <a:p>
+            <a:r>
+              <a:rPr lang="en-US" dirty="0" smtClean="0"/>
+              <a:t>Data Access</a:t>
             </a:r>
           </a:p>
           <a:p>
             <a:pPr lvl="1"/>
             <a:r>
               <a:rPr lang="en-US" dirty="0" smtClean="0"/>
-              <a:t>Ignore dependencies</a:t>
-            </a:r>
-          </a:p>
-          <a:p>
-            <a:r>
-              <a:rPr lang="en-US" dirty="0" smtClean="0"/>
-              <a:t>Distributed</a:t>
+              <a:t>Resources share data with other resources</a:t>
+            </a:r>
+          </a:p>
+          <a:p>
+            <a:r>
+              <a:rPr lang="en-US" dirty="0" smtClean="0"/>
+              <a:t>Conventional Model</a:t>
             </a:r>
           </a:p>
           <a:p>
             <a:pPr lvl="1"/>
             <a:r>
               <a:rPr lang="en-US" dirty="0" smtClean="0"/>
-              <a:t>Conventional</a:t>
-            </a:r>
-          </a:p>
-          <a:p>
-            <a:pPr lvl="2"/>
-            <a:r>
-              <a:rPr lang="en-US" dirty="0" smtClean="0"/>
-              <a:t>Removes central dependency</a:t>
-            </a:r>
-          </a:p>
-          <a:p>
-            <a:pPr lvl="2"/>
-            <a:r>
-              <a:rPr lang="en-US" dirty="0" smtClean="0"/>
-              <a:t>Ignore dependencies</a:t>
+              <a:t>No planning when placing data</a:t>
+            </a:r>
+          </a:p>
+          <a:p>
+            <a:r>
+              <a:rPr lang="en-US" dirty="0" smtClean="0"/>
+              <a:t>Intelligent Model</a:t>
             </a:r>
           </a:p>
           <a:p>
             <a:pPr lvl="1"/>
             <a:r>
               <a:rPr lang="en-US" dirty="0" smtClean="0"/>
-              <a:t>Intelligent</a:t>
-            </a:r>
-          </a:p>
-          <a:p>
-            <a:pPr lvl="2"/>
-            <a:r>
-              <a:rPr lang="en-US" dirty="0" smtClean="0"/>
-              <a:t>Minimize data transfer time</a:t>
-            </a:r>
-          </a:p>
-          <a:p>
-            <a:pPr lvl="2"/>
-            <a:r>
-              <a:rPr lang="en-US" dirty="0" smtClean="0"/>
-              <a:t>Utilize knowledge of network latency and data dependencies</a:t>
+              <a:t>Data is dynamic</a:t>
+            </a:r>
+          </a:p>
+          <a:p>
+            <a:pPr lvl="1"/>
+            <a:r>
+              <a:rPr lang="en-US" dirty="0" smtClean="0"/>
+              <a:t>Task is mapped to a resource based on tasks’ data dependencies</a:t>
             </a:r>
           </a:p>
         </p:txBody>
@@ -8895,7 +8977,7 @@
 </file>
 
 <file path=ppt/slides/slide9.xml><?xml version="1.0" encoding="utf-8"?>
-<p:sld xmlns:a="http://schemas.openxmlformats.org/drawingml/2006/main" xmlns:r="http://schemas.openxmlformats.org/officeDocument/2006/relationships" xmlns:p="http://schemas.openxmlformats.org/presentationml/2006/main">
+<p:sld xmlns:a="http://schemas.openxmlformats.org/drawingml/2006/main" xmlns:r="http://schemas.openxmlformats.org/officeDocument/2006/relationships" xmlns:mc="http://schemas.openxmlformats.org/markup-compatibility/2006" xmlns:mv="urn:schemas-microsoft-com:mac:vml" xmlns:p="http://schemas.openxmlformats.org/presentationml/2006/main" mc:Ignorable="mv" mc:PreserveAttributes="mv:*">
   <p:cSld>
     <p:spTree>
       <p:nvGrpSpPr>
@@ -8923,6 +9005,29 @@
         </p:nvSpPr>
         <p:spPr/>
         <p:txBody>
+          <a:bodyPr/>
+          <a:lstStyle/>
+          <a:p>
+            <a:r>
+              <a:rPr lang="en-US" dirty="0" smtClean="0"/>
+              <a:t>Central vs. Distributed</a:t>
+            </a:r>
+            <a:endParaRPr lang="en-US" dirty="0"/>
+          </a:p>
+        </p:txBody>
+      </p:sp>
+      <p:sp>
+        <p:nvSpPr>
+          <p:cNvPr id="3" name="Content Placeholder 2"/>
+          <p:cNvSpPr>
+            <a:spLocks noGrp="1"/>
+          </p:cNvSpPr>
+          <p:nvPr>
+            <p:ph idx="1"/>
+          </p:nvPr>
+        </p:nvSpPr>
+        <p:spPr/>
+        <p:txBody>
           <a:bodyPr>
             <a:normAutofit/>
           </a:bodyPr>
@@ -8930,95 +9035,66 @@
           <a:p>
             <a:r>
               <a:rPr lang="en-US" dirty="0" smtClean="0"/>
-              <a:t>Distributed Model (Conventional)</a:t>
-            </a:r>
-            <a:endParaRPr lang="en-US" dirty="0"/>
-          </a:p>
-        </p:txBody>
-      </p:sp>
-      <p:sp>
-        <p:nvSpPr>
-          <p:cNvPr id="3" name="Content Placeholder 2"/>
-          <p:cNvSpPr>
-            <a:spLocks noGrp="1"/>
-          </p:cNvSpPr>
-          <p:nvPr>
-            <p:ph idx="1"/>
-          </p:nvPr>
-        </p:nvSpPr>
-        <p:spPr>
-          <a:xfrm>
-            <a:off x="757947" y="1529880"/>
-            <a:ext cx="3382732" cy="4608884"/>
-          </a:xfrm>
-        </p:spPr>
-        <p:txBody>
-          <a:bodyPr>
-            <a:normAutofit lnSpcReduction="10000"/>
-          </a:bodyPr>
-          <a:lstStyle/>
-          <a:p>
-            <a:r>
-              <a:rPr lang="en-US" dirty="0" smtClean="0"/>
-              <a:t>Each </a:t>
-            </a:r>
-            <a:r>
-              <a:rPr lang="en-US" dirty="0" smtClean="0"/>
-              <a:t>assignment reads </a:t>
-            </a:r>
-            <a:r>
-              <a:rPr lang="en-US" dirty="0" smtClean="0"/>
-              <a:t>2.3 gigabytes of data</a:t>
-            </a:r>
-          </a:p>
-          <a:p>
-            <a:r>
-              <a:rPr lang="en-US" dirty="0" smtClean="0"/>
-              <a:t>8x8 matrix.  Each file 287 megabytes</a:t>
-            </a:r>
-          </a:p>
-          <a:p>
-            <a:r>
-              <a:rPr lang="en-US" dirty="0" smtClean="0"/>
-              <a:t>Times decrease with respect to number of workers</a:t>
-            </a:r>
-          </a:p>
-          <a:p>
-            <a:r>
-              <a:rPr lang="en-US" dirty="0" smtClean="0"/>
-              <a:t>Remote data is expensive</a:t>
-            </a:r>
-          </a:p>
-          <a:p>
-            <a:r>
-              <a:rPr lang="en-US" dirty="0" smtClean="0"/>
-              <a:t>Minimum time required to handle requests from same server</a:t>
-            </a:r>
-          </a:p>
-          <a:p>
-            <a:endParaRPr lang="en-US" dirty="0" smtClean="0"/>
-          </a:p>
-          <a:p>
-            <a:endParaRPr lang="en-US" dirty="0" smtClean="0"/>
-          </a:p>
-        </p:txBody>
-      </p:sp>
-      <p:graphicFrame>
-        <p:nvGraphicFramePr>
-          <p:cNvPr id="6" name="Chart 5"/>
-          <p:cNvGraphicFramePr/>
-          <p:nvPr/>
-        </p:nvGraphicFramePr>
-        <p:xfrm>
-          <a:off x="4352295" y="1571626"/>
-          <a:ext cx="4474684" cy="3814762"/>
-        </p:xfrm>
-        <a:graphic>
-          <a:graphicData uri="http://schemas.openxmlformats.org/drawingml/2006/chart">
-            <c:chart xmlns:c="http://schemas.openxmlformats.org/drawingml/2006/chart" xmlns:r="http://schemas.openxmlformats.org/officeDocument/2006/relationships" r:id="rId2"/>
-          </a:graphicData>
-        </a:graphic>
-      </p:graphicFrame>
+              <a:t>Central</a:t>
+            </a:r>
+          </a:p>
+          <a:p>
+            <a:pPr lvl="1"/>
+            <a:r>
+              <a:rPr lang="en-US" dirty="0" smtClean="0"/>
+              <a:t>Ignore dependencies</a:t>
+            </a:r>
+          </a:p>
+          <a:p>
+            <a:r>
+              <a:rPr lang="en-US" dirty="0" smtClean="0"/>
+              <a:t>Distributed</a:t>
+            </a:r>
+          </a:p>
+          <a:p>
+            <a:pPr lvl="1"/>
+            <a:r>
+              <a:rPr lang="en-US" dirty="0" smtClean="0"/>
+              <a:t>Conventional</a:t>
+            </a:r>
+          </a:p>
+          <a:p>
+            <a:pPr lvl="2"/>
+            <a:r>
+              <a:rPr lang="en-US" dirty="0" smtClean="0"/>
+              <a:t>Removes central dependency</a:t>
+            </a:r>
+          </a:p>
+          <a:p>
+            <a:pPr lvl="2"/>
+            <a:r>
+              <a:rPr lang="en-US" dirty="0" smtClean="0"/>
+              <a:t>Ignore dependencies</a:t>
+            </a:r>
+          </a:p>
+          <a:p>
+            <a:pPr lvl="1"/>
+            <a:r>
+              <a:rPr lang="en-US" dirty="0" smtClean="0"/>
+              <a:t>Intelligent</a:t>
+            </a:r>
+          </a:p>
+          <a:p>
+            <a:pPr lvl="2"/>
+            <a:r>
+              <a:rPr lang="en-US" dirty="0" smtClean="0"/>
+              <a:t>Minimize data transfer time</a:t>
+            </a:r>
+          </a:p>
+          <a:p>
+            <a:pPr lvl="2"/>
+            <a:r>
+              <a:rPr lang="en-US" dirty="0" smtClean="0"/>
+              <a:t>Utilize knowledge of network latency and data dependencies</a:t>
+            </a:r>
+          </a:p>
+        </p:txBody>
+      </p:sp>
     </p:spTree>
   </p:cSld>
   <p:clrMapOvr>

</xml_diff>